<commit_message>
final code for ehcache with spring boot
</commit_message>
<xml_diff>
--- a/spring boot caching.pptx
+++ b/spring boot caching.pptx
@@ -16,11 +16,13 @@
     <p:sldId id="284" r:id="rId10"/>
     <p:sldId id="285" r:id="rId11"/>
     <p:sldId id="259" r:id="rId12"/>
-    <p:sldId id="273" r:id="rId13"/>
-    <p:sldId id="274" r:id="rId14"/>
-    <p:sldId id="275" r:id="rId15"/>
-    <p:sldId id="276" r:id="rId16"/>
-    <p:sldId id="277" r:id="rId17"/>
+    <p:sldId id="286" r:id="rId13"/>
+    <p:sldId id="287" r:id="rId14"/>
+    <p:sldId id="273" r:id="rId15"/>
+    <p:sldId id="274" r:id="rId16"/>
+    <p:sldId id="275" r:id="rId17"/>
+    <p:sldId id="276" r:id="rId18"/>
+    <p:sldId id="277" r:id="rId19"/>
   </p:sldIdLst>
   <p:sldSz cx="12192000" cy="6858000"/>
   <p:notesSz cx="6858000" cy="9144000"/>
@@ -160,7 +162,7 @@
   <inkml:trace contextRef="#ctx0" brushRef="#br0" timeOffset="135613.612">7444 6080 750 0,'-10'-1'156'0,"-4"-6"72"16,3 1-224-16,2 1-1 16,3 2-1-16,4 2-3 15,0-1 1-15,2 1-3 16,0 1 1-16,0-1-3 0,0-1 0 15,0 1-3-15,1-1-1 16,12-18 0-16,31-40 1 16,-10 26 0-16,4-2 1 15,14-10 0-15,3 4 1 16,12-8 0-16,-6 2 3 16,17-6-1-16,-5 5 2 0,12-8 0 15,-8 6 1-15,9-3 0 16,-12 9 1-16,3-2 0 15,-12 9 1-15,1 2 1 16,-17 9 2-16,-2-2 0 16,-14 9 1-16,-7 4 0 15,-10 2 0-15,-4 5-3 16,-6 6-4-16,-3-1-29 16,-2 3-42-16,-1 1-62 15,-1 0-11-15,0 1-67 16,-4 16-14-16</inkml:trace>
   <inkml:trace contextRef="#ctx0" brushRef="#br0" timeOffset="135978.072">8341 5908 398 0,'12'4'280'0,"-6"-4"-68"15,6-7-14-15,6-3-216 0,18-8 0 16,5-4 7 0,16-8 3-16,0 2 1 0,7-8 1 15,-7 1 4-15,10-5 2 16,-10 3 2-16,3-8 2 15,-8 4 6-15,1 0 7 16,-10 8 2-16,-5 1 3 16,-11 8-3-16,-1 5-2 15,-12 7-9-15,-4 4-4 16,-4 5-5-16,0 2-36 16,-2 3-14-16,-4-2-141 15,1 0-36-15,6 1-44 16</inkml:trace>
   <inkml:trace contextRef="#ctx0" brushRef="#br0" timeOffset="152241.803">26574 6749 493 0,'-6'-2'142'0,"0"-4"50"15,3 2-146-15,0 4-8 16,2-1-22-16,1 1-17 16,0-1-19-16,0 0 0 15,1 0 7-15,21-4 4 16,40-10 10-16,-26 6 0 15,-1-1 0-15,9-10 1 16,-4 3 0-16,13-11 1 16,-1-1 1-16,9-5 0 15,-5 1 1-15,11-4 4 0,-8 7-1 16,9-3 0 0,-6 5 0-16,11 0-1 0,-11 3-4 15,5 2 2-15,-14 6 0 16,-3 1 13-16,-16 5 10 15,-6 3 28-15,-14 3 17 16,-6 0 29-16,-5 4-5 16,-3 0-6-16,-1 2-27 15,1-2-21-15,0 1-30 16,0 0-13-16,0 0-10 0,0-1-24 16,0 1-27-16,0 0-124 15,-1 0-63-15,1 1-49 16,0 0-104-16</inkml:trace>
-  <inkml:trace contextRef="#ctx0" brushRef="#br0" timeOffset="153350.926">17848 12245 786 0,'-22'1'69'0,"4"-12"124"16,0-2-238-16,8 2-3 15,-1 0 14-15,3 5 11 16,-1-2-41-16,1 4-22 0,-6 1-71 15,1 2-7-15,-1 1 21 16,4 1 74-16,-1-1 75 16,6 0 92-16,3-1 53 15,-1 0-6-15,2-1-39 16,1 1-53-16,0 0-16 16,-1 0-30-16,1 1-15 15,0 0-5-15,0 0 1 16,1-1 3-16,3 0 3 15,22-2 6-15,48-5 2 16,-33 4-2-16,18-2 0 16,0 1 0-16,13-2 0 15,-6 3 0-15,17-3 0 16,-7 3-1-16,12 2-1 16,-4 4 1-16,17 3 0 0,-13 0-1 15,21 2 1-15,-7-1 1 16,17-2 0-16,-11-1 0 15,20 2 5-15,-11-2 6 16,7 4 0-16,-13 1 0 16,10 3 0-16,-23 2-4 15,6 1-7-15,-19 1 1 16,0 2 0-16,-17-5 4 16,2 2 18-16,-20-3 10 0,-1-3 18 15,-13-3 3-15,-8 2 11 16,-10-3 0-16,-8-4 36 15,-8 1 3-15,-1-2 28 16,-1 2-4-16,-1-2-7 16,1 1-42-16,0 0-17 15,0 0-31-15,0 0-18 16,-1 0-24-16,0-1-49 16,0-1-55-16,0 1-267 15,0-1 33-15</inkml:trace>
+  <inkml:trace contextRef="#ctx0" brushRef="#br0" timeOffset="153350.925">17848 12245 786 0,'-22'1'69'0,"4"-12"124"16,0-2-238-16,8 2-3 15,-1 0 14-15,3 5 11 16,-1-2-41-16,1 4-22 0,-6 1-71 15,1 2-7-15,-1 1 21 16,4 1 74-16,-1-1 75 16,6 0 92-16,3-1 53 15,-1 0-6-15,2-1-39 16,1 1-53-16,0 0-16 16,-1 0-30-16,1 1-15 15,0 0-5-15,0 0 1 16,1-1 3-16,3 0 3 15,22-2 6-15,48-5 2 16,-33 4-2-16,18-2 0 16,0 1 0-16,13-2 0 15,-6 3 0-15,17-3 0 16,-7 3-1-16,12 2-1 16,-4 4 1-16,17 3 0 0,-13 0-1 15,21 2 1-15,-7-1 1 16,17-2 0-16,-11-1 0 15,20 2 5-15,-11-2 6 16,7 4 0-16,-13 1 0 16,10 3 0-16,-23 2-4 15,6 1-7-15,-19 1 1 16,0 2 0-16,-17-5 4 16,2 2 18-16,-20-3 10 0,-1-3 18 15,-13-3 3-15,-8 2 11 16,-10-3 0-16,-8-4 36 15,-8 1 3-15,-1-2 28 16,-1 2-4-16,-1-2-7 16,1 1-42-16,0 0-17 15,0 0-31-15,0 0-18 16,-1 0-24-16,0-1-49 16,0-1-55-16,0 1-267 15,0-1 33-15</inkml:trace>
   <inkml:trace contextRef="#ctx0" brushRef="#br0" timeOffset="160360.046">17842 12574 746 0,'1'-3'181'15,"-1"1"58"-15,2 2-220 16,-2-2-16-16,0 1-8 0,4-1-6 16,21-6 2-16,47-49-1 15,-36 39 3-15,9-5 1 16,-1 3 1-16,8-10-1 15,-1 3 1-15,8-16-1 16,-4 5 1-16,4-7-2 16,-9 8 4-16,2-6 1 15,-9 13 2-15,0-4 1 16,-9 9-1-16,3-2-20 16,-8 10-21-16,1-1-53 15,-5 8-40-15,2 3-86 16,-4 8-18-16</inkml:trace>
   <inkml:trace contextRef="#ctx0" brushRef="#br0" timeOffset="160726.947">18304 12692 686 0,'-1'9'159'0,"1"-10"49"0,5 0-189 15,0-3-37-15,-5 3 4 16,5-2 11-16,34-23 9 16,55-53 8-16,-31 25-3 15,-2 4-1-15,5-1-1 16,-17 10-4-16,2-1-2 15,-3 1 11-15,4-5 1 16,-6 4 1-16,3 5-3 16,-10 12-3-16,-9 9-12 15,-6 8-1-15,0 2-2 16,-9 4-1-16,3 3-5 16,-1 2-18-16,10 3-127 15,0 3-72-15,18-2-36 16</inkml:trace>
 </inkml:ink>
@@ -193,7 +195,7 @@
     </inkml:brush>
   </inkml:definitions>
   <inkml:trace contextRef="#ctx0" brushRef="#br0">19743 14073 1028 0,'8'7'195'15,"6"-6"66"-15,4-10-289 16,19-8-43-16,15-6 10 16,30-15 31-16,8-4 26 0,25-9 1 15,-1-2 2-15,16-17 2 16,-14 7 0-16,9-4-2 15,-19 7-1-15,3-1 1 16,-19 18-3-16,3-4 2 16,-13 10 1-16,7 1 1 15,-8 7 0-15,4-3 0 16,-13 5-3-16,5 1-58 16,-14 2-42-16,1 6-96 15,-11 9-56-15,-5 10-54 16</inkml:trace>
-  <inkml:trace contextRef="#ctx0" brushRef="#br0" timeOffset="461.708">20802 14183 382 0,'-15'21'213'0,"8"-16"-28"16,6-4-65-16,2-1-124 16,-1-1-26-16,0 0-2 15,2 0 4-15,25-13 9 16,53-31 16-16,-25 15 23 0,14-11 12 16,1-1 6-16,10-6 1 15,-1 5-6-15,9-3-6 16,-5 9-3-16,11-6-4 15,-8 6-4-15,12-5 0 16,-14 3-1-16,4-5-9 16,-11 10-6-16,-1 3 2 15,-17 9 3-15,0 4 22 16,-15 6 8-16,-11 2 9 16,-13 5 6-16,-5 1 14 15,-12 1-14-15,0 1 10 16,-3 2-4-16,0-1 2 15,-2 1-15-15,2 0-6 0,0 0-17 16,0 0-12 0,0 0-26-16,0 0-85 0,-1 0-82 15,0 0-144-15,0 0-56 16</inkml:trace>
+  <inkml:trace contextRef="#ctx0" brushRef="#br0" timeOffset="461.707">20802 14183 382 0,'-15'21'213'0,"8"-16"-28"16,6-4-65-16,2-1-124 16,-1-1-26-16,0 0-2 15,2 0 4-15,25-13 9 16,53-31 16-16,-25 15 23 0,14-11 12 16,1-1 6-16,10-6 1 15,-1 5-6-15,9-3-6 16,-5 9-3-16,11-6-4 15,-8 6-4-15,12-5 0 16,-14 3-1-16,4-5-9 16,-11 10-6-16,-1 3 2 15,-17 9 3-15,0 4 22 16,-15 6 8-16,-11 2 9 16,-13 5 6-16,-5 1 14 15,-12 1-14-15,0 1 10 16,-3 2-4-16,0-1 2 15,-2 1-15-15,2 0-6 0,0 0-17 16,0 0-12 0,0 0-26-16,0 0-85 0,-1 0-82 15,0 0-144-15,0 0-56 16</inkml:trace>
 </inkml:ink>
 </file>
 
@@ -228,10 +230,163 @@
   <inkml:trace contextRef="#ctx0" brushRef="#br0" timeOffset="5886.905">21058 10067 496 0,'0'4'221'15,"-1"-4"-41"-15,6 3-68 16,-5-3-166-16,1 0 7 15,9 2 31-15,16 7 14 16,34 17 1-16,-30-13 0 16,-5 1-1-16,6 5-1 15,-3-2 1-15,3 7-1 16,-2-3 2-16,2 4-1 16,-2 0 2-16,3 5 1 15,-4-2 0-15,2 7-1 16,-5-4 0-16,0 7 1 15,-4-4-1-15,-1-1 1 16,-4-4-1-16,-2 2-48 16,-6-6-33-16,-1 0-65 15,-6-6-31-15,-7 3-45 0</inkml:trace>
   <inkml:trace contextRef="#ctx0" brushRef="#br0" timeOffset="6555.182">21163 10921 3 0,'-30'24'8'15,"1"4"2"-15,4-8 0 16,3 2 6-16,7-8 10 0,2-3 43 16,8-5 8-16,2-2 13 15,3-4 5-15,0-1 11 16,0 0-41-16,0 1-11 15,-1 0-13-15,1-1-9 16,0 0-23-16,0-1-1 16,1 0 2-16,13-2 1 15,13-16-2-15,42-42-2 16,-34 36-2-16,11-9-2 16,0-1-1-16,13-6-1 15,-8 2-1-15,7-5 1 16,-12 7 1-16,5 0 1 15,-12 5 10-15,1-2 8 16,-7 8 6-16,-1-1 10 0,-8 6-1 16,0 0-7-16,-9 9-6 15,0 0-2-15,-7 3-6 16,-2 8 5-16,-5 2-1 16,1 0-1-16,-2 0-5 15,-2 0-4-15,2 0-6 16,-1 0-3-16,1 0 0 15,-1 0 2-15,1 0 0 0,-1 0 1 16,1 0 1-16,0 0 1 16,0 0-2-16,0 0-1 15,0 0 0-15,0 0-2 16,0 0 0-16,0 0 1 16,0 0 1-16,0 0 0 15,0 0 0-15,0 0-1 16,0 0 0-16,0 0-2 15,0 0-1-15,0 0-1 16,0 0 0-16,0 0 0 16,0-1 0-16,0-1-6 15,0 1-9-15,0 0-31 16,0 0-25-16,0 1-75 16,0 0-59-16,-1 0 7 15,0-1-69-15</inkml:trace>
   <inkml:trace contextRef="#ctx0" brushRef="#br0" timeOffset="8201.343">20557 9999 935 0,'-15'-32'147'15,"23"-1"100"-15,6-14-276 16,11 4-15-16,14-5 14 16,4 9 22-16,10 1 4 15,-6 11 1-15,6 3 1 16,-3 10 1-16,6 8 2 16,-8 8-2-16,5 8-1 15,-12 6-1-15,2 16-1 16,-12 9-2-16,-3 21 0 15,-12 5-1-15,-12 19 3 16,-9 1 0-16,-8 15 1 16,-7-11 1-16,1 9 1 15,5-19 0-15,5-2-1 16,7-19-1-16,13-4 1 16,5-15-1-16,9-1-1 15,8-8 1-15,9-3 1 0,0-6-1 16,9 6 1-16,-4-3 0 15,0 9 1-15,-10 3-1 16,1 13 0-16,-11 2 1 16,-2 16-1-16,-8 2 0 15,-4 18 1-15,-10-3-1 16,-8 13-2-16,-4-4-2 0,-3 22-15 16,-3-10-20-1,1 23-78-15,6-11-33 0,8 18-68 16,5-19-50-1</inkml:trace>
-  <inkml:trace contextRef="#ctx0" brushRef="#br0" timeOffset="8484.156">21168 11949 297 0,'7'-61'0'0</inkml:trace>
+  <inkml:trace contextRef="#ctx0" brushRef="#br0" timeOffset="8484.154">21168 11949 297 0,'7'-61'0'0</inkml:trace>
   <inkml:trace contextRef="#ctx0" brushRef="#br0" timeOffset="9068.347">21229 10148 744 0,'-38'-60'237'0,"-15"-13"-39"15,2 15-164-15,-18-15-124 16,-3 2-34-16,-19-4 4 16,4 16 57-16,-22-4 62 15,11 11 17-15,-25-5 26 16,8 5 26-16,-21-5-6 15,4 4-63-15,-26-4-40 16,13 6-6-16,-22-2 88 16,16 9 11-16,-31 0-52 0,13 12 28 15,-12-3 82-15,15 9-79 16,-32-2-12-16,29 8 50 16,-28 5 4-16,16 6-74 15,-36 9 0-15,23 6-1 16,-35 6 2-16,27 0-1 0,-34 8 1 15,29-3 0-15,-26 0 2 16,33 0-1-16,-33 0 0 16,21-1-1-16,-15 4 3 15,27-1-1-15,-25 5-2 16,28 4 0-16,-23 9 0 16,19 4-4-16,-28 15 1 15,26-1 1-15,-24 12 1 16,33-12 0-16,-14 8 1 15,27-9-1-15,-17 10 0 16,36-8 0-16,-20 9 0 16,28-5 0-16,-7 3 2 15,26-15 0-15,-9 6-1 16,28-10-2-16,-15 4-2 16,28-6-8-16,-3 4-34 15,21-10-30-15,2 2-188 16,19-9 21-16</inkml:trace>
   <inkml:trace contextRef="#ctx0" brushRef="#br0" timeOffset="9554.611">12006 9411 682 0,'-29'30'89'15,"4"-7"87"-15,-10 10-204 16,3 7-9-16,-7 10 24 15,2-2 5-15,-8 7 1 16,5-2 4-16,-4 8 2 16,6-2 1-16,-4 3 0 15,8-8 0-15,-2 3 0 0,8-10-1 16,1 1 1-16,6-4 0 16,2 7-1-1,7-7-1-15,4 4 1 0,5-7 0 16,9 1-2-16,2-8 1 15,11 0-1-15,2-7 1 16,17-1-1-16,7-6 1 16,25 1 1-16,6-5 2 15,21-1 2-15,-3-3-1 16,19 1 1-16,-7 1-32 0,14 8-81 16,-9 4-58-16,7 16-39 15</inkml:trace>
   <inkml:trace contextRef="#ctx0" brushRef="#br0" timeOffset="11878.078">12150 13200 195 0,'-6'-40'-6'0,"-5"-14"32"16,-5 2-58-16,-2-3-1 15,1 5 27-15,-4 7 58 16,4 13 18-16,-1 7 52 15,3 11 3-15,-2 2-7 16,1 0-59-16,-6 16-77 16,0 3-64-16,-9 12-6 15,1 10 6-15,-4 15 28 16,4-1 71-16,-1 11 17 0,6-4 1 16,1 14-6-1,9-4-17-15,-2 10-5 0,5 2-6 16,0 12 0-16,3-4 0 15,-2 16-2-15,3-5 1 16,-1 9-1-16,2-11 1 16,1 16 0-16,2-14 0 15,-3 20 0-15,4-9 0 16,1 23 0-16,-3-14 0 16,-1 17 0-16,3-17 0 0,4 14 5 15,3-24 2-15,4 6 3 16,8-18-1-16,9 10 2 15,2-20-5-15,10 7-3 16,5-12-2-16,9-3-1 16,-2-18 0-16,9-4 0 15,-3-17 1-15,9-9-1 16,-4-12 1-16,13-13-2 16,-9-8 1-16,14-14 27 15,-14-9 9-15,8-10 2 16,-14-1 2-16,9-16 2 15,-13-1-24-15,8-17 13 16,-9 2 6-16,0-21 8 16,-13 5 0-16,0-16 17 15,-14 11-12-15,-7-16 4 0,-8 7-4 16,-3-25-3-16,-9 7-19 16,-7-28-11-16,-2 4-11 15,-4-8-3-15,-3 27-2 16,-6-5 2-16,-2 30-1 15,-6 1 2-15,-1 23 5 16,-6-2 8-16,4 21-3 0,-10-4-11 16,1 12-11-16,-7-8-11 15,1 10-11-15,-10-4-33 16,8 15 13 0,-7 10 8-16,5 18-2 0,-9 22-34 15,7 17 29-15,0 22 0 16,7 5 0-16,-3 22 6 15,14-6 38-15,-3 18 5 16,3-5 1-16,0 21 1 16,8-5-1-16,-4 23 1 15,6-10-2-15,5 22 0 16,6-12 0-16,2 29-1 16,7-16-1-16,5 21 2 15,1-16-1-15,4 15 2 16,4-27 1-16,3 12 6 0,-1-27-1 15,9 3 1-15,5-26-2 16,10 1-2-16,0-27-6 16,11-4 0-16,-5-20-2 15,2-9-1-15,-6-20-1 16,7-10 1-16,-8-12 1 16,6-11 4-16,-1-8 7 15,4-11 8-15,-2-7 10 16,6-24 6-16,-4-8-3 15,3-23-3-15,-7-2-6 16,0-29-1-16,-4 5-3 0,0-21 3 16,-8 12-1-16,4-30 4 15,-7 22-10-15,-6-18 0 16,-7 15-5-16,-6-13 5 16,-10 15-6-16,-6-19 31 15,-6 29 11-15,-4 7 16 16,-5 26 0-16,-6 10 6 15,1 34-9-15,-5 8 17 16,4 10-26-16,-10 11-9 16,2 17-11-16,-11 14-33 15,-3 14-40-15,-13 20-5 16,6 11-2-16,-7 24 0 16,9 1 10-16,-7 18 12 15,9-6 13-15,-4 19 6 0,9-10 1 16,-3 16 0-1,14-10-2-15,7 13 1 16,8-14-1-16,9 17-1 0,11-12-22 16,7 18-4-16,6-11-1 15,11 15-6-15,5-19-11 16,13 13 5-16,7-21-5 16,18 9-22-16,2-18 3 0,14 9 9 15,-5-24 17-15,9-6 6 16,-12-25 22-16,6-10 4 15,-13-25 6-15,-2-11 1 16,-11-12 5-16,5-13 6 16,-8-6 4-16,12-7 3 15,-2-1 1-15,11-9 3 16,-3 9 1-16,5-12 12 16,-9-4 8-16,4-22 18 15,-10-3-5-15,-4-30-11 16,-14-4-15-16,-5-26-11 15,-13 14-16-15,-12-3 21 16,-11 25 44-16,-7 11 75 16,-8 36 20-16,-9 9 18 15,-1 14-15-15,-5 6-30 16,-1 5-73-16,-10 3-28 16,0 7-24-16,-15 7-19 0,1 9-13 15,-18 11-22-15,2 11-5 16,-10 21-9-16,6 6 6 15,-7 16-18-15,13 3 16 16,0 10-25-16,18-8-33 16,7 11-163-16,19-3 26 0</inkml:trace>
+</inkml:ink>
+</file>
+
+<file path=ppt/ink/ink12.xml><?xml version="1.0" encoding="utf-8"?>
+<inkml:ink xmlns:inkml="http://www.w3.org/2003/InkML">
+  <inkml:definitions>
+    <inkml:context xml:id="ctx0">
+      <inkml:inkSource xml:id="inkSrc0">
+        <inkml:traceFormat>
+          <inkml:channel name="X" type="integer" max="29376" units="cm"/>
+          <inkml:channel name="Y" type="integer" max="16524" units="cm"/>
+          <inkml:channel name="F" type="integer" max="4095" units="dev"/>
+          <inkml:channel name="T" type="integer" max="2.14748E9" units="dev"/>
+        </inkml:traceFormat>
+        <inkml:channelProperties>
+          <inkml:channelProperty channel="X" name="resolution" value="1000.20428" units="1/cm"/>
+          <inkml:channelProperty channel="Y" name="resolution" value="1000.24213" units="1/cm"/>
+          <inkml:channelProperty channel="F" name="resolution" value="0" units="1/dev"/>
+          <inkml:channelProperty channel="T" name="resolution" value="1" units="1/dev"/>
+        </inkml:channelProperties>
+      </inkml:inkSource>
+      <inkml:timestamp xml:id="ts0" timeString="2020-01-19T18:07:41.308"/>
+    </inkml:context>
+    <inkml:brush xml:id="br0">
+      <inkml:brushProperty name="width" value="0.05292" units="cm"/>
+      <inkml:brushProperty name="height" value="0.05292" units="cm"/>
+      <inkml:brushProperty name="color" value="#FF0000"/>
+    </inkml:brush>
+  </inkml:definitions>
+  <inkml:trace contextRef="#ctx0" brushRef="#br0">29818 7415 648 0,'-12'18'139'15,"3"-9"21"-15,7-9-198 0,1 1-56 16,3 0-4-16,-2-1 9 16,0-1 37-16,1 0 22 15,22-7 28-15,53-29 13 16,-30 8 0-16,19-11 5 15,4-3-1-15,20-10 5 16,1 0-3-16,19-15 0 16,-5 3-3-16,15-10-1 15,-14 7-4-15,11-4 1 16,-16 13 3-16,12-4 3 16,-14 11-2-16,8-3 1 15,-17 9-3-15,1 0-3 16,-21 12-5-16,-4-1 0 15,-21 11 2-15,-5 3 14 16,-15 7 14-16,-6 4 23 0,-10 5 6 16,-3 4 9-16,-5 1-11 15,1 0-8-15,-2 0-22 16,1 0-6-16,-1 0-12 16,0 0-6-16,1 0-11 15,0 0-40-15,0 0-61 16,0 0-142-16,0 0-8 15</inkml:trace>
+  <inkml:trace contextRef="#ctx0" brushRef="#br0" timeOffset="4046.05">24946 12718 997 0,'-5'10'118'0,"4"-11"111"16,6-4-300-16,10-4-3 15,8-4 28-15,14-11 19 16,8-4 18-16,18-15 1 15,5-4 3-15,18-12 1 16,-5-3 3-16,22-16 0 16,-10 6 0-16,9-8 0 15,-15 5 2-15,9-1-2 16,-15 13 0-16,6-6 1 16,-10 11-1-16,9-4 0 15,-7 8 1-15,5-1-1 16,-13 12 0-16,6 0-1 0,-12 12 1 15,-2 4-6-15,-16 9-19 16,-5 3-69-16,-19 8-53 16,-7 2-70-16,-10 6-56 15</inkml:trace>
+  <inkml:trace contextRef="#ctx0" brushRef="#br0" timeOffset="4449.709">25248 12879 859 0,'-1'38'199'16,"3"-34"71"-16,-1-4-257 15,1 2-29-15,-2-4-13 16,0 1-1-16,2 0-1 16,22-13 10-16,60-45 6 15,-22 12 11-15,24-15 1 16,1-4 2-16,20-17-1 16,-5 12 2-16,23-19 0 15,-13 4 0-15,22-10-1 16,-12 9 5-16,21-6-1 0,-25 18 1 15,9-1-2-15,-25 16 1 16,4 1-2-16,-25 14-1 16,1 4-2-16,-19 12 2 0,-1 5-27 15,-15 7-51-15,-6 4-163 16,-11 7 10-16</inkml:trace>
+  <inkml:trace contextRef="#ctx0" brushRef="#br0" timeOffset="84676.631">6974 8014 616 0,'1'17'163'0,"-3"-21"50"15,-3 1-176-15,5 2-30 16,0 0 0-16,1-2-16 16,18-8-2-16,50-55 1 15,-19 21 6-15,2 0 0 16,11-12 1-16,-3-3 3 15,17-16 2-15,-3-1-1 16,10-18 10-16,-4 5 0 0,13-14 7 16,-10 6 4-16,13-11 1 15,-11 14-8-15,9-8 0 16,-13 22-5-16,5-7-6 16,-16 20-1-16,7-2 2 15,-16 14 0-15,-3-1-1 16,-18 17 0-16,-3 7 1 15,-17 13-3-15,-6 5 0 16,-6 7-5-16,2 0-64 16,-2 0-77-16,22-7-89 15,5-7-59-15</inkml:trace>
+  <inkml:trace contextRef="#ctx0" brushRef="#br0" timeOffset="135613.612">7444 6080 750 0,'-10'-1'156'0,"-4"-6"72"16,3 1-224-16,2 1-1 16,3 2-1-16,4 2-3 15,0-1 1-15,2 1-3 16,0 1 1-16,0-1-3 0,0-1 0 15,0 1-3-15,1-1-1 16,12-18 0-16,31-40 1 16,-10 26 0-16,4-2 1 15,14-10 0-15,3 4 1 16,12-8 0-16,-6 2 3 16,17-6-1-16,-5 5 2 0,12-8 0 15,-8 6 1-15,9-3 0 16,-12 9 1-16,3-2 0 15,-12 9 1-15,1 2 1 16,-17 9 2-16,-2-2 0 16,-14 9 1-16,-7 4 0 15,-10 2 0-15,-4 5-3 16,-6 6-4-16,-3-1-29 16,-2 3-42-16,-1 1-62 15,-1 0-11-15,0 1-67 16,-4 16-14-16</inkml:trace>
+  <inkml:trace contextRef="#ctx0" brushRef="#br0" timeOffset="135978.072">8341 5908 398 0,'12'4'280'0,"-6"-4"-68"15,6-7-14-15,6-3-216 0,18-8 0 16,5-4 7 0,16-8 3-16,0 2 1 0,7-8 1 15,-7 1 4-15,10-5 2 16,-10 3 2-16,3-8 2 15,-8 4 6-15,1 0 7 16,-10 8 2-16,-5 1 3 16,-11 8-3-16,-1 5-2 15,-12 7-9-15,-4 4-4 16,-4 5-5-16,0 2-36 16,-2 3-14-16,-4-2-141 15,1 0-36-15,6 1-44 16</inkml:trace>
+  <inkml:trace contextRef="#ctx0" brushRef="#br0" timeOffset="152241.803">26574 6749 493 0,'-6'-2'142'0,"0"-4"50"15,3 2-146-15,0 4-8 16,2-1-22-16,1 1-17 16,0-1-19-16,0 0 0 15,1 0 7-15,21-4 4 16,40-10 10-16,-26 6 0 15,-1-1 0-15,9-10 1 16,-4 3 0-16,13-11 1 16,-1-1 1-16,9-5 0 15,-5 1 1-15,11-4 4 0,-8 7-1 16,9-3 0 0,-6 5 0-16,11 0-1 0,-11 3-4 15,5 2 2-15,-14 6 0 16,-3 1 13-16,-16 5 10 15,-6 3 28-15,-14 3 17 16,-6 0 29-16,-5 4-5 16,-3 0-6-16,-1 2-27 15,1-2-21-15,0 1-30 16,0 0-13-16,0 0-10 0,0-1-24 16,0 1-27-16,0 0-124 15,-1 0-63-15,1 1-49 16,0 0-104-16</inkml:trace>
+  <inkml:trace contextRef="#ctx0" brushRef="#br0" timeOffset="153350.925">17848 12245 786 0,'-22'1'69'0,"4"-12"124"16,0-2-238-16,8 2-3 15,-1 0 14-15,3 5 11 16,-1-2-41-16,1 4-22 0,-6 1-71 15,1 2-7-15,-1 1 21 16,4 1 74-16,-1-1 75 16,6 0 92-16,3-1 53 15,-1 0-6-15,2-1-39 16,1 1-53-16,0 0-16 16,-1 0-30-16,1 1-15 15,0 0-5-15,0 0 1 16,1-1 3-16,3 0 3 15,22-2 6-15,48-5 2 16,-33 4-2-16,18-2 0 16,0 1 0-16,13-2 0 15,-6 3 0-15,17-3 0 16,-7 3-1-16,12 2-1 16,-4 4 1-16,17 3 0 0,-13 0-1 15,21 2 1-15,-7-1 1 16,17-2 0-16,-11-1 0 15,20 2 5-15,-11-2 6 16,7 4 0-16,-13 1 0 16,10 3 0-16,-23 2-4 15,6 1-7-15,-19 1 1 16,0 2 0-16,-17-5 4 16,2 2 18-16,-20-3 10 0,-1-3 18 15,-13-3 3-15,-8 2 11 16,-10-3 0-16,-8-4 36 15,-8 1 3-15,-1-2 28 16,-1 2-4-16,-1-2-7 16,1 1-42-16,0 0-17 15,0 0-31-15,0 0-18 16,-1 0-24-16,0-1-49 16,0-1-55-16,0 1-267 15,0-1 33-15</inkml:trace>
+  <inkml:trace contextRef="#ctx0" brushRef="#br0" timeOffset="160360.046">17842 12574 746 0,'1'-3'181'15,"-1"1"58"-15,2 2-220 16,-2-2-16-16,0 1-8 0,4-1-6 16,21-6 2-16,47-49-1 15,-36 39 3-15,9-5 1 16,-1 3 1-16,8-10-1 15,-1 3 1-15,8-16-1 16,-4 5 1-16,4-7-2 16,-9 8 4-16,2-6 1 15,-9 13 2-15,0-4 1 16,-9 9-1-16,3-2-20 16,-8 10-21-16,1-1-53 15,-5 8-40-15,2 3-86 16,-4 8-18-16</inkml:trace>
+  <inkml:trace contextRef="#ctx0" brushRef="#br0" timeOffset="160726.947">18304 12692 686 0,'-1'9'159'0,"1"-10"49"0,5 0-189 15,0-3-37-15,-5 3 4 16,5-2 11-16,34-23 9 16,55-53 8-16,-31 25-3 15,-2 4-1-15,5-1-1 16,-17 10-4-16,2-1-2 15,-3 1 11-15,4-5 1 16,-6 4 1-16,3 5-3 16,-10 12-3-16,-9 9-12 15,-6 8-1-15,0 2-2 16,-9 4-1-16,3 3-5 16,-1 2-18-16,10 3-127 15,0 3-72-15,18-2-36 16</inkml:trace>
+</inkml:ink>
+</file>
+
+<file path=ppt/ink/ink13.xml><?xml version="1.0" encoding="utf-8"?>
+<inkml:ink xmlns:inkml="http://www.w3.org/2003/InkML">
+  <inkml:definitions>
+    <inkml:context xml:id="ctx0">
+      <inkml:inkSource xml:id="inkSrc0">
+        <inkml:traceFormat>
+          <inkml:channel name="X" type="integer" max="29376" units="cm"/>
+          <inkml:channel name="Y" type="integer" max="16524" units="cm"/>
+          <inkml:channel name="F" type="integer" max="4095" units="dev"/>
+          <inkml:channel name="T" type="integer" max="2.14748E9" units="dev"/>
+        </inkml:traceFormat>
+        <inkml:channelProperties>
+          <inkml:channelProperty channel="X" name="resolution" value="1000.20428" units="1/cm"/>
+          <inkml:channelProperty channel="Y" name="resolution" value="1000.24213" units="1/cm"/>
+          <inkml:channelProperty channel="F" name="resolution" value="0" units="1/dev"/>
+          <inkml:channelProperty channel="T" name="resolution" value="1" units="1/dev"/>
+        </inkml:channelProperties>
+      </inkml:inkSource>
+      <inkml:timestamp xml:id="ts0" timeString="2020-01-22T12:02:14.415"/>
+    </inkml:context>
+    <inkml:brush xml:id="br0">
+      <inkml:brushProperty name="width" value="0.05292" units="cm"/>
+      <inkml:brushProperty name="height" value="0.05292" units="cm"/>
+      <inkml:brushProperty name="color" value="#FF0000"/>
+    </inkml:brush>
+  </inkml:definitions>
+  <inkml:trace contextRef="#ctx0" brushRef="#br0">32497 1653 702 0,'2'5'152'0,"-5"-6"63"16,2 0-212-16,0 1-2 15,1-2-4-15,0 2 3 16,0-1 2-16,0 1 3 16,0 0 4-16,0-1 1 15,1 0-1-15,3-3 4 16,23 0 2-16,48-57 3 16,-33 34 1-16,14-3-1 15,-3 1-3-15,13-2-6 16,-5 1-6-16,14-1-2 15,-5-2-4-15,14-4-9 0,-4-1-3 16,11-4-11-16,-18 2-1 16,-4 2-5-16,-22 7 4 15,-14 4-13-15,-14 13 1 16,-9 5-40-16,-7 6-34 16,-6 2-90-16,-11 4-8 15</inkml:trace>
+  <inkml:trace contextRef="#ctx0" brushRef="#br0" timeOffset="371.835">32133 2006 681 0,'-9'6'185'16,"3"-5"41"-16,16-3-187 0,18-4-35 16,9-3-5-16,26-6-9 15,11-3 7-15,16-4-2 16,-6 3 3-16,13-12 4 16,-14 1 5-16,10-9 12 15,-12 2 6-15,17-8 12 16,-13 8 1-16,14-1 2 15,-12 7-9-15,3 3-7 16,-28 9-10-16,-8 5-6 0,-23 7-5 16,-11 1-3-16,-12 4-3 15,-3 2-4-15,-3 0-11 16,-2 0-44-16,0 0-62 16,0 1-146-16,0 4-12 15</inkml:trace>
+  <inkml:trace contextRef="#ctx0" brushRef="#br0" timeOffset="3301.65">18690 12645 1181 0,'1'-10'231'0,"8"-15"116"16,7-1-351-16,16-9-15 16,7-2 4-16,18-6 3 0,4 10 2 15,13-5 1-15,-4 5-1 16,16-6-10-16,-4 1 0 15,15-10 1-15,-4 1 3 16,16-11 1-16,-10 0 12 0,20-7 1 16,-13 2 0-16,17-10 0 15,-11 7-1-15,19-9 3 16,-20 8-1-16,10-2 1 16,-23 14 0-16,1-1 1 15,-25 21-1-15,-1 2-22 16,-20 11-27-16,-1 5-99 15,-16 9-70-15,-1 3-98 16,-11 5-69-16</inkml:trace>
+  <inkml:trace contextRef="#ctx0" brushRef="#br0" timeOffset="4050.081">23323 15021 655 0,'23'-15'130'15,"0"-9"73"1,4-4-196-16,19-12 2 0,5 0 1 16,19-3 1-16,7 3-6 15,15-9 2-15,-5 5-1 16,21-6 1-16,-10 3 0 16,13-5 3-16,-7 5 1 15,20-7 3-15,-8 6-2 0,15-5-1 16,-11 6-2-16,18-6 2 15,-15 10-1-15,14-8 11 16,-11 7 11-16,17-9 7 16,-16 10-2-16,9-9 36 15,-22 11-5-15,-2 0-9 16,-26 7 3-16,-9 0 16 16,-26 14-31-16,-6 0 9 15,-19 5 1-15,-7 7-8 16,-11 1-19-16,1 4-65 15,-3-1-124-15,5 2-215 16,-9-2-28-16</inkml:trace>
+  <inkml:trace contextRef="#ctx0" brushRef="#br0" timeOffset="6140.222">521 12210 1040 0,'-28'8'212'15,"0"1"114"-15,29-1-319 0,-13-1 6 16,10-4-11-16,8 4-14 16,8 2-9-16,19 6-5 15,8 3 7-15,32 9 6 16,4-3 2-16,24 11 1 16,-8-4 2-16,20 11-2 15,-14-3 2-15,13 12-3 16,-12-9 1-16,14 7 2 15,-11-7 2-15,13 2 1 16,-12-8 2-16,10 1 0 16,-15-5 3-16,11-3 1 15,-19-3 0-15,2 0 1 16,-14-1 3-16,0-2-1 16,-22-5-1-16,-4-3-99 15,-14-7-71-15,-11-3-120 16,-20-4-84-16</inkml:trace>
+  <inkml:trace contextRef="#ctx0" brushRef="#br0" timeOffset="6707.206">736 12189 1034 0,'-25'33'193'0,"-9"-1"111"15,3-6-320-15,-4-4 21 16,5-8-2-16,-3-6-3 15,3-8-1-15,-4-8-8 16,9-8-3-16,-2-17-6 16,7-12-3-16,0-23 0 15,8-6 6-15,2-18 4 0,8-1 7 16,16-16-2 0,5 14-1-16,20-9-3 0,11 20-3 15,26-4-4-15,8 21 2 16,27 1 3-16,-3 19 3 15,27 8 2-15,-7 26 2 16,19 26 5-16,-13 23-1 16,21 37 3-16,-20 22 0 15,12 46 2-15,-20 9-1 0,7 44 4 16,-28-3-3-16,2 34 2 16,-25-30-2-16,-9 16 5 15,-22-43 0-15,-8-9 8 16,-19-50 7-16,-11-21 44 15,-9-39 16-15,-5-17 11 16,-8-24-29-16,-22-16-154 16,-14-26-205-16,-33-37-65 15,-16-23-199-15</inkml:trace>
+  <inkml:trace contextRef="#ctx0" brushRef="#br0" timeOffset="7084.225">998 9821 1079 0,'13'8'338'0,"-19"4"34"16,7-2-272-16,14 4-136 15,22 15-3-15,16 9 1 0,37 22 10 16,13 8 13-16,34 20 6 16,0-2 5-16,21 17 4 15,-19-13 1-15,12 1 0 16,-29-19 0-16,-3-9-1 16,-30-27-1-16,0-17 0 15,-23-25 0-15,-1-27 1 16,-15-17 3-16,1-40 5 15,-16-18 3-15,-15-39 2 16,-12-6-1-16,-15-37-31 16,-10 20-68-16,-12-12-268 15,-5 35 37-15</inkml:trace>
+  <inkml:trace contextRef="#ctx0" brushRef="#br0" timeOffset="7326.582">1809 10628 1378 0,'13'59'301'0,"-16"-51"104"16,-5-32-393-16,5-19-52 0,-7-36-1 15,-1-27 20-15,-3-41 13 16,1-4 5-16,-5-40-8 15,5 20-20-15,-1-20-65 16,2 20-50-16,-7-3-218 16,1 36-24-16,-10-3-87 15</inkml:trace>
+  <inkml:trace contextRef="#ctx0" brushRef="#br0" timeOffset="7545.992">832 10013 1489 0,'-10'4'279'0,"-13"-34"146"16,-21-43-425-16,4-27-50 15,-6-47-10-15,12-25-12 16,2-40-113-16,16 11-120 15,7-30-115-15,7 27-85 16</inkml:trace>
+  <inkml:trace contextRef="#ctx0" brushRef="#br0" timeOffset="8100.655">1216 8045 1197 0,'56'44'175'0,"12"-1"144"16,5-5-361-16,45 18 6 15,8 1 27-15,17 10 5 16,-3-8 8-16,17 7 0 16,-31-7 1-16,4 10 0 15,-23-8 4-15,-11 11-4 16,-29-5 2-16,-11-2 4 15,-26-16 4-15,-12-8 14 16,-20-18 12-16,-13-7 19 16,-9-6-5-16,-28-15-15 0,-9-10-18 15,-25-20-11-15,-9-12-21 16,-24-20 2-16,11-1 10 16,-13-6 11-16,8 7 3 15,-18-11 0-15,18 6-4 16,-6-16 7-16,12 1 3 15,2-10 1-15,32 9 0 16,1-20 0-16,18 16-7 16,15-9-16-16,15 10-5 0,7-6-5 15,20 22 0-15,18-1-7 16,10 16-1-16,33-3-6 16,12 20 3-16,34 2-1 15,11 19 8-15,36 11 1 16,-5 12 6-16,35 8 4 15,-19 9 0-15,10-3-23 16,-26-6-27-16,-1-6-69 16,-39-9-50-16,-8-18-62 15,-35-8-67-15,-32-31-31 16,-37-14-4-16</inkml:trace>
+  <inkml:trace contextRef="#ctx0" brushRef="#br0" timeOffset="8366.414">1630 5474 1162 0,'-31'-30'217'16,"0"16"133"-16,6 17-342 15,0 7-30-15,6 6 9 16,8 29-15-16,9 14-11 16,12 44 0-16,16 21 11 0,23 47 7 15,10 5 11 1,20 34 5-16,1-27 1 15,9 11 0-15,-15-43 3 0,-5-25-10 16,-18-46-20-16,-9-21-114 16,-19-39-7-16,-3-20-1 15,-13-19 11-15,-17-45 21 16,-13-30 112-16,-33-56-143 16,-21-27 51-16</inkml:trace>
+  <inkml:trace contextRef="#ctx0" brushRef="#br0" timeOffset="8605.01">1627 5919 462 0,'-49'-96'482'15,"30"53"-147"-15,7 18-63 16,6 15-140-16,5 5-144 16,4-2 20-16,9 1-22 15,9 6-9-15,26 3-9 16,15 3 6-16,39 21-4 0,19 14 10 16,47 23 5-16,7 14 10 15,45 27 2-15,-3 3 7 16,31 17 1-16,-37-13-2 15,19-6 0-15,-43-27 1 16,3-11 1-16,-39-28 0 16,9-10-57-16,-33-10-30 15,-4-9-97-15,-33-14-63 16,-27-23-69-16,-44-21-37 16</inkml:trace>
+  <inkml:trace contextRef="#ctx0" brushRef="#br0" timeOffset="9085.445">1665 4254 1303 0,'-19'-26'237'0,"7"19"129"15,5 0-401-15,6 10-19 16,5 2 0-16,18 19-7 15,13 18 11-15,34 39 7 16,17 21 21-16,42 29 8 16,7 3 8-16,33 27 2 15,0-29 3-15,26 13 4 16,-16-20 0-16,20 0 0 16,-28-38-1-16,3-9 1 0,-32-38-3 15,-1-23 2-15,-34-32 2 16,-6-35 1-16,-29-20 3 15,-19-36 8-15,-31-19 4 16,-26-51 2-16,-28-3-1 16,-36-50-2-16,-15 7-6 0,-25-14-1 15,0 50 2-15,-14 10 32 16,11 57 6-16,-24 17 0 16,17 38 27-16,-24 13 5 15,7 26-32-15,-15 23-8 16,20 26 0-16,-32 36-41 15,17 14-15-15,-12 39-31 16,18 9-4-16,2 37-57 16,42-7-43-16,29 42-279 15,43-12 51-15</inkml:trace>
+  <inkml:trace contextRef="#ctx0" brushRef="#br0" timeOffset="9832.548">4138 9922 1440 0,'20'21'234'0,"-13"-15"141"16,-4-15-433-16,5-20 3 16,0-16 16-16,3-38 8 0,0-19 31 15,1-49-8-15,-1-11 0 16,1-44 2-1,1 6 2-15,6-46-8 0,0 23 5 16,10-45 3-16,-1 28-1 16,10-47-1-16,-3 27 2 15,12-48 2-15,-6 26-3 16,18-50 6-16,-5 39 3 16,13-42 1-16,-7 34-1 0,11-27 4 15,-5 38-3 1,12-25-2-16,-8 55 1 0,7-2-2 15,-16 56 0-15,1 3 6 16,-17 49 0-16,-2 16 1 16,-12 32 0-16,0 9 10 15,-11 32-8-15,0 8 1 16,-6 11 1-16,-2 7 1 16,-3 14-8-16,-3 8 2 15,-5 8 1-15,1 4 0 16,-2 4-3-16,0 1-3 15,0 0-24-15,0 0-142 16,0 0-221-16,0 0-12 16,1 0-208-16</inkml:trace>
+  <inkml:trace contextRef="#ctx0" brushRef="#br0" timeOffset="11448.358">14655 9726 650 0,'5'0'135'0,"-6"-2"58"16,1 1-194-16,0 0-7 15,0 0 1-15,1 0 1 16,13-4 4-16,16-5 3 16,38-18-1-16,-23 11 1 15,1-3 0-15,14-3-1 16,-1 2 0-16,18-2-1 16,-6 3 0-16,18-1-1 15,-4 1 1-15,19 3-2 16,-9 2 2-16,13 0-2 15,-11 0 2-15,17 2 0 16,-10 1 1-16,18-3 0 16,-7 1 1-16,25 0 0 15,-12 1 0-15,13 0 0 0,-14 1-2 16,16 4-1-16,-21 4 0 16,11 4 0-16,-18 4-1 15,19 3 2-15,-19 1 1 16,21-1-1-16,-11 0 0 15,17-1 1-15,-18-3 0 16,17-3 0-16,-19-1 2 16,8 1 2-16,-21-2 1 15,5-1 1-15,-21 3 2 0,3 0-1 16,-20 3 2-16,0 0 6 16,-18 0 0-16,-6 1 4 15,-15-2 1-15,-8-2 0 16,-9 1-5-16,-1-2-1 15,-8 0-6-15,3 0-5 16,1 0-63-16,13 0-162 16,-1-6 28-16</inkml:trace>
+  <inkml:trace contextRef="#ctx0" brushRef="#br0" timeOffset="13204.977">22450 10531 1294 0,'-30'-36'215'15,"3"-13"147"-15,12 5-385 0,8-9-22 16,12-1 18 0,16-8-3-16,9 9 0 0,15-6-2 15,5 8 9-15,20 5 4 16,-4 6 8-16,14-1-2 16,-3 14 2-16,13 4-7 15,-13 12-1-15,18 22-7 16,-10 14 1-16,13 18-4 15,-12 6 8-15,21 29-7 16,-17 3 5-16,16 29-10 16,-15 8 4-16,14 36 1 15,-19-4 10-15,15 27 1 16,-18-6 15-16,16 30-2 16,-7-19 3-16,20 30 0 15,-8-21 1-15,20 17-1 16,-8-33 2-16,18 1-1 0,-12-38-1 15,17-6-1-15,-17-41 1 16,21-11 1-16,-16-24 0 16,17-12 3-16,-12-18 6 15,28-11 2-15,-11-15 2 16,24-22 1-16,-15-8-1 16,7-23-2-16,-31-8-3 15,-10-16 1-15,-36 5 1 16,-17-7 4-16,-28 17 26 0,-15 11 55 15,-19 18 19-15,-12 3 4 16,-9 13-4-16,-13-2-30 16,-6 2-60-16,-18 4-27 15,-2 9-10-15,-14 4-16 16,1 12-1-16,-19 14 1 16,8 5 5-16,-11 14 5 15,12 2 11-15,-4 17 1 16,20 4 0-16,6 19-3 15,18 4-2-15,7 28 2 16,14 2-1-16,11 25-5 16,7-8 4-16,14 24-1 15,4-13-1-15,15 24 6 16,4-18 6-16,9 21 0 16,-4-25 2-16,6 11 1 15,-8-33-1-15,2 1 1 16,-12-31 1-16,-5-7 2 0,-10-31 1 15,-5-8 0-15,-9-23 1 16,1-10 0-16,-6-11 2 16,-2-3-227-16,-12-9-128 15,-32-16-31-15</inkml:trace>
+</inkml:ink>
+</file>
+
+<file path=ppt/ink/ink14.xml><?xml version="1.0" encoding="utf-8"?>
+<inkml:ink xmlns:inkml="http://www.w3.org/2003/InkML">
+  <inkml:definitions>
+    <inkml:context xml:id="ctx0">
+      <inkml:inkSource xml:id="inkSrc0">
+        <inkml:traceFormat>
+          <inkml:channel name="X" type="integer" max="29376" units="cm"/>
+          <inkml:channel name="Y" type="integer" max="16524" units="cm"/>
+          <inkml:channel name="F" type="integer" max="4095" units="dev"/>
+          <inkml:channel name="T" type="integer" max="2.14748E9" units="dev"/>
+        </inkml:traceFormat>
+        <inkml:channelProperties>
+          <inkml:channelProperty channel="X" name="resolution" value="1000.20428" units="1/cm"/>
+          <inkml:channelProperty channel="Y" name="resolution" value="1000.24213" units="1/cm"/>
+          <inkml:channelProperty channel="F" name="resolution" value="0" units="1/dev"/>
+          <inkml:channelProperty channel="T" name="resolution" value="1" units="1/dev"/>
+        </inkml:channelProperties>
+      </inkml:inkSource>
+      <inkml:timestamp xml:id="ts0" timeString="2020-01-19T18:07:41.308"/>
+    </inkml:context>
+    <inkml:brush xml:id="br0">
+      <inkml:brushProperty name="width" value="0.05292" units="cm"/>
+      <inkml:brushProperty name="height" value="0.05292" units="cm"/>
+      <inkml:brushProperty name="color" value="#FF0000"/>
+    </inkml:brush>
+  </inkml:definitions>
+  <inkml:trace contextRef="#ctx0" brushRef="#br0">29818 7415 648 0,'-12'18'139'15,"3"-9"21"-15,7-9-198 0,1 1-56 16,3 0-4-16,-2-1 9 16,0-1 37-16,1 0 22 15,22-7 28-15,53-29 13 16,-30 8 0-16,19-11 5 15,4-3-1-15,20-10 5 16,1 0-3-16,19-15 0 16,-5 3-3-16,15-10-1 15,-14 7-4-15,11-4 1 16,-16 13 3-16,12-4 3 16,-14 11-2-16,8-3 1 15,-17 9-3-15,1 0-3 16,-21 12-5-16,-4-1 0 15,-21 11 2-15,-5 3 14 16,-15 7 14-16,-6 4 23 0,-10 5 6 16,-3 4 9-16,-5 1-11 15,1 0-8-15,-2 0-22 16,1 0-6-16,-1 0-12 16,0 0-6-16,1 0-11 15,0 0-40-15,0 0-61 16,0 0-142-16,0 0-8 15</inkml:trace>
+  <inkml:trace contextRef="#ctx0" brushRef="#br0" timeOffset="4046.05">24946 12718 997 0,'-5'10'118'0,"4"-11"111"16,6-4-300-16,10-4-3 15,8-4 28-15,14-11 19 16,8-4 18-16,18-15 1 15,5-4 3-15,18-12 1 16,-5-3 3-16,22-16 0 16,-10 6 0-16,9-8 0 15,-15 5 2-15,9-1-2 16,-15 13 0-16,6-6 1 16,-10 11-1-16,9-4 0 15,-7 8 1-15,5-1-1 16,-13 12 0-16,6 0-1 0,-12 12 1 15,-2 4-6-15,-16 9-19 16,-5 3-69-16,-19 8-53 16,-7 2-70-16,-10 6-56 15</inkml:trace>
+  <inkml:trace contextRef="#ctx0" brushRef="#br0" timeOffset="4449.709">25248 12879 859 0,'-1'38'199'16,"3"-34"71"-16,-1-4-257 15,1 2-29-15,-2-4-13 16,0 1-1-16,2 0-1 16,22-13 10-16,60-45 6 15,-22 12 11-15,24-15 1 16,1-4 2-16,20-17-1 16,-5 12 2-16,23-19 0 15,-13 4 0-15,22-10-1 16,-12 9 5-16,21-6-1 0,-25 18 1 15,9-1-2-15,-25 16 1 16,4 1-2-16,-25 14-1 16,1 4-2-16,-19 12 2 0,-1 5-27 15,-15 7-51-15,-6 4-163 16,-11 7 10-16</inkml:trace>
+  <inkml:trace contextRef="#ctx0" brushRef="#br0" timeOffset="84676.631">6974 8014 616 0,'1'17'163'0,"-3"-21"50"15,-3 1-176-15,5 2-30 16,0 0 0-16,1-2-16 16,18-8-2-16,50-55 1 15,-19 21 6-15,2 0 0 16,11-12 1-16,-3-3 3 15,17-16 2-15,-3-1-1 16,10-18 10-16,-4 5 0 0,13-14 7 16,-10 6 4-16,13-11 1 15,-11 14-8-15,9-8 0 16,-13 22-5-16,5-7-6 16,-16 20-1-16,7-2 2 15,-16 14 0-15,-3-1-1 16,-18 17 0-16,-3 7 1 15,-17 13-3-15,-6 5 0 16,-6 7-5-16,2 0-64 16,-2 0-77-16,22-7-89 15,5-7-59-15</inkml:trace>
+  <inkml:trace contextRef="#ctx0" brushRef="#br0" timeOffset="135613.612">7444 6080 750 0,'-10'-1'156'0,"-4"-6"72"16,3 1-224-16,2 1-1 16,3 2-1-16,4 2-3 15,0-1 1-15,2 1-3 16,0 1 1-16,0-1-3 0,0-1 0 15,0 1-3-15,1-1-1 16,12-18 0-16,31-40 1 16,-10 26 0-16,4-2 1 15,14-10 0-15,3 4 1 16,12-8 0-16,-6 2 3 16,17-6-1-16,-5 5 2 0,12-8 0 15,-8 6 1-15,9-3 0 16,-12 9 1-16,3-2 0 15,-12 9 1-15,1 2 1 16,-17 9 2-16,-2-2 0 16,-14 9 1-16,-7 4 0 15,-10 2 0-15,-4 5-3 16,-6 6-4-16,-3-1-29 16,-2 3-42-16,-1 1-62 15,-1 0-11-15,0 1-67 16,-4 16-14-16</inkml:trace>
+  <inkml:trace contextRef="#ctx0" brushRef="#br0" timeOffset="135978.072">8341 5908 398 0,'12'4'280'0,"-6"-4"-68"15,6-7-14-15,6-3-216 0,18-8 0 16,5-4 7 0,16-8 3-16,0 2 1 0,7-8 1 15,-7 1 4-15,10-5 2 16,-10 3 2-16,3-8 2 15,-8 4 6-15,1 0 7 16,-10 8 2-16,-5 1 3 16,-11 8-3-16,-1 5-2 15,-12 7-9-15,-4 4-4 16,-4 5-5-16,0 2-36 16,-2 3-14-16,-4-2-141 15,1 0-36-15,6 1-44 16</inkml:trace>
+  <inkml:trace contextRef="#ctx0" brushRef="#br0" timeOffset="152241.803">26574 6749 493 0,'-6'-2'142'0,"0"-4"50"15,3 2-146-15,0 4-8 16,2-1-22-16,1 1-17 16,0-1-19-16,0 0 0 15,1 0 7-15,21-4 4 16,40-10 10-16,-26 6 0 15,-1-1 0-15,9-10 1 16,-4 3 0-16,13-11 1 16,-1-1 1-16,9-5 0 15,-5 1 1-15,11-4 4 0,-8 7-1 16,9-3 0 0,-6 5 0-16,11 0-1 0,-11 3-4 15,5 2 2-15,-14 6 0 16,-3 1 13-16,-16 5 10 15,-6 3 28-15,-14 3 17 16,-6 0 29-16,-5 4-5 16,-3 0-6-16,-1 2-27 15,1-2-21-15,0 1-30 16,0 0-13-16,0 0-10 0,0-1-24 16,0 1-27-16,0 0-124 15,-1 0-63-15,1 1-49 16,0 0-104-16</inkml:trace>
+  <inkml:trace contextRef="#ctx0" brushRef="#br0" timeOffset="153350.925">17848 12245 786 0,'-22'1'69'0,"4"-12"124"16,0-2-238-16,8 2-3 15,-1 0 14-15,3 5 11 16,-1-2-41-16,1 4-22 0,-6 1-71 15,1 2-7-15,-1 1 21 16,4 1 74-16,-1-1 75 16,6 0 92-16,3-1 53 15,-1 0-6-15,2-1-39 16,1 1-53-16,0 0-16 16,-1 0-30-16,1 1-15 15,0 0-5-15,0 0 1 16,1-1 3-16,3 0 3 15,22-2 6-15,48-5 2 16,-33 4-2-16,18-2 0 16,0 1 0-16,13-2 0 15,-6 3 0-15,17-3 0 16,-7 3-1-16,12 2-1 16,-4 4 1-16,17 3 0 0,-13 0-1 15,21 2 1-15,-7-1 1 16,17-2 0-16,-11-1 0 15,20 2 5-15,-11-2 6 16,7 4 0-16,-13 1 0 16,10 3 0-16,-23 2-4 15,6 1-7-15,-19 1 1 16,0 2 0-16,-17-5 4 16,2 2 18-16,-20-3 10 0,-1-3 18 15,-13-3 3-15,-8 2 11 16,-10-3 0-16,-8-4 36 15,-8 1 3-15,-1-2 28 16,-1 2-4-16,-1-2-7 16,1 1-42-16,0 0-17 15,0 0-31-15,0 0-18 16,-1 0-24-16,0-1-49 16,0-1-55-16,0 1-267 15,0-1 33-15</inkml:trace>
+  <inkml:trace contextRef="#ctx0" brushRef="#br0" timeOffset="160360.046">17842 12574 746 0,'1'-3'181'15,"-1"1"58"-15,2 2-220 16,-2-2-16-16,0 1-8 0,4-1-6 16,21-6 2-16,47-49-1 15,-36 39 3-15,9-5 1 16,-1 3 1-16,8-10-1 15,-1 3 1-15,8-16-1 16,-4 5 1-16,4-7-2 16,-9 8 4-16,2-6 1 15,-9 13 2-15,0-4 1 16,-9 9-1-16,3-2-20 16,-8 10-21-16,1-1-53 15,-5 8-40-15,2 3-86 16,-4 8-18-16</inkml:trace>
+  <inkml:trace contextRef="#ctx0" brushRef="#br0" timeOffset="160726.947">18304 12692 686 0,'-1'9'159'0,"1"-10"49"0,5 0-189 15,0-3-37-15,-5 3 4 16,5-2 11-16,34-23 9 16,55-53 8-16,-31 25-3 15,-2 4-1-15,5-1-1 16,-17 10-4-16,2-1-2 15,-3 1 11-15,4-5 1 16,-6 4 1-16,3 5-3 16,-10 12-3-16,-9 9-12 15,-6 8-1-15,0 2-2 16,-9 4-1-16,3 3-5 16,-1 2-18-16,10 3-127 15,0 3-72-15,18-2-36 16</inkml:trace>
+</inkml:ink>
+</file>
+
+<file path=ppt/ink/ink15.xml><?xml version="1.0" encoding="utf-8"?>
+<inkml:ink xmlns:inkml="http://www.w3.org/2003/InkML">
+  <inkml:definitions>
+    <inkml:context xml:id="ctx0">
+      <inkml:inkSource xml:id="inkSrc0">
+        <inkml:traceFormat>
+          <inkml:channel name="X" type="integer" max="29376" units="cm"/>
+          <inkml:channel name="Y" type="integer" max="16524" units="cm"/>
+          <inkml:channel name="F" type="integer" max="4095" units="dev"/>
+          <inkml:channel name="T" type="integer" max="2.14748E9" units="dev"/>
+        </inkml:traceFormat>
+        <inkml:channelProperties>
+          <inkml:channelProperty channel="X" name="resolution" value="1000.20428" units="1/cm"/>
+          <inkml:channelProperty channel="Y" name="resolution" value="1000.24213" units="1/cm"/>
+          <inkml:channelProperty channel="F" name="resolution" value="0" units="1/dev"/>
+          <inkml:channelProperty channel="T" name="resolution" value="1" units="1/dev"/>
+        </inkml:channelProperties>
+      </inkml:inkSource>
+      <inkml:timestamp xml:id="ts0" timeString="2020-01-22T12:02:10.823"/>
+    </inkml:context>
+    <inkml:brush xml:id="br0">
+      <inkml:brushProperty name="width" value="0.05292" units="cm"/>
+      <inkml:brushProperty name="height" value="0.05292" units="cm"/>
+      <inkml:brushProperty name="color" value="#FF0000"/>
+    </inkml:brush>
+  </inkml:definitions>
+  <inkml:trace contextRef="#ctx0" brushRef="#br0">32272 1828 447 0,'-14'19'86'0,"4"-13"46"16,7-7-133-16,4 1 7 15,7 0 16-15,-7-2 15 16,14-5 1-16,24-9 1 16,55-24-8-16,-32 9-14 15,-5 2-14-15,5-1-1 16,-4 4-1-16,15-4 2 15,-4 4-1-15,6-3 3 16,-2 4-1-16,0 2 0 16,-15 2 0-16,-9 3 0 15,-14 6 1-15,-8 4 4 0,-17 0 2 16,-4 6 1-16,-3 1-2 16,-4 1-9-16,0 0-14 15,0 0-34-15,1 0-27 16,-1 0-104-16,1 0-4 15,0 0-49-15</inkml:trace>
 </inkml:ink>
 </file>
 
@@ -373,14 +528,14 @@
   <inkml:trace contextRef="#ctx0" brushRef="#br0">6231 11408 609 0,'-9'12'137'0,"-1"-14"59"16,2-4-177-16,6 7-28 16,4 2-22-16,-4-3-17 0,2 0-19 15,-1 0 4-15,0 0 7 16,1 0 27-16,0 0 11 16,0 0 18-16,0 0 1 15,1 0 0-15,0 0 2 16,9-3 1-16,10-5 6 15,33-22 3-15,-26 6 11 16,1-1 3-16,6-9 8 16,-2 3-5-16,8-2-4 15,-3 3-10-15,5-4-6 16,-5 8-9-16,6-3 4 16,-6 5 1-16,-3 0 1 15,-10 4 3-15,-2 6 21 16,-10 6 15-16,-5 1 50 15,-4 6 16-15,0 0 18 16,-5-1-13-16,1 0-8 0,1 2-44 16,-1-1-8-16,1 1-16 15,0-1 3-15,0 1-7 16,0 0-1-16,-1 0-9 16,0 0-9-16,0 0-12 15,0 0-25-15,-1 0-50 0,1 0-303 16,1 0 69-16</inkml:trace>
   <inkml:trace contextRef="#ctx0" brushRef="#br0" timeOffset="1227.116">24183 7630 404 0,'3'34'71'0,"2"9"44"15,-1 8-126-15,7 19 5 16,4 0 1-16,5 17 1 16,2-5 0-16,4 17 2 15,-2-5 3-15,2 20 0 16,-1-9 0-16,3 21 6 16,4-8 1-16,7 14 6 15,0-12 2-15,12 20 2 16,-2-12-6-16,12 13 0 15,-3-10-12-15,11 24 3 0,-10-18-2 16,5 17 0-16,-10-16 2 16,5 20 12-16,-5-23 0 15,4 26 6-15,-6-15 1 16,7 24-1-16,-4-13 33 16,5 18 1-16,-3-24-6 15,6 16 3-15,-5-26-2 16,5 11-38-16,-6-21-8 0,1 10 2 15,-8-21-2-15,0 11-2 16,-13-24-1-16,4 10 0 16,-6-22-1-16,2 4 1 15,-5-16 3-15,2 0-2 16,-5-18-1-16,1 7-46 16,-4-12-50-16,0 7-116 15,-7-12-24-15</inkml:trace>
   <inkml:trace contextRef="#ctx0" brushRef="#br0" timeOffset="2803.043">24302 7684 501 0,'2'0'171'0,"-1"0"27"16,0 0-133-16,0-1-27 15,-1-2-10-15,4-13-5 16,-2-11-4-16,-2-49 5 15,-5 39 1-15,-3-16 11 16,-1 3 4-16,-1-12 4 16,3 4-8-16,1-16-5 15,4 7 5-15,3-18-10 16,6 4-4-16,5-14-3 16,4 11-2-16,8-18-24 15,8 11-2-15,16-13-6 16,4 14 0-16,18-15-8 15,9 14-2-15,14-9-5 16,-5 14 2-16,19-11-9 16,-4 18 4-16,14 0 2 0,-6 15 5 15,24-1 2-15,-10 16 10 16,14 3 1-16,-15 13 2 16,11 11 0-16,-25 20 0 15,0 13-2-15,-17 11-1 16,2 14-5-16,-16 5 0 15,0 18-2-15,-12 3 1 16,-1 25 1-16,-14 7 4 0,-2 27-3 16,-9-3 4-16,6 31 5 15,-3-10 1-15,8 18 2 16,-2-7 6-16,13 23-2 16,-10-27-1-16,8 26-4 15,-7-18-1-15,9 15 1 16,-6-17 1-16,9 30 63 15,-6-22 4-15,8 27 1 16,-6-19 1-16,4 25-1 16,-6-24-60-16,4 26 0 15,-4-18 0-15,2 23 0 16,-11-23-1-16,-1 20 1 16,-8-28-1-16,-6 16 0 15,-7-26 1-15,2 15 2 16,-5-20-1-16,3 19 0 0,-1-22 0 15,8 23 0-15,-2-23-3 16,5 14 2-16,0-22-1 16,3 11 0-16,-6-31 1 15,4 7 1-15,-7-30 2 16,2 4 0-16,-5-21 2 16,1 3 0-16,-4-16-1 0,3 4-1 15,-8-19 0 1,1 5 2-16,-2-13-2 0,-2 0 1 15,-4-12-2-15,-1 0-1 16,-2-12-1-16,-6-4 0 16,-4-8 2-16,0-6 30 15,-2-1 9-15,-2-8 6 16,2 3-1-16,0 1-2 16,0-1-29-16,0 0-13 15,0 1-7-15,-2 0 12 16,-3 2 0-16,-36 13 11 15,-70 27 18-15,15-17 8 16,-1 2-11-16,-15-1 2 16,7 3-11-16,-24 6-14 15,17 1-8-15,-18 4 0 0,8 0-2 16,-10 3 0-16,25-6 0 16,-9 4-2-16,26-6 0 15,-6-1-1-15,22-5-2 16,-2-2 0-16,15-8-1 15,0 3-5-15,21-3-4 16,2-4-22-16,11-5-29 16,1-1-109-16,-4-1-160 15,-18-2-5-15</inkml:trace>
-  <inkml:trace contextRef="#ctx0" brushRef="#br0" timeOffset="3218.626">25893 13138 964 0,'0'-2'208'0,"-1"-1"81"16,2 3-290-16,-1 0-55 15,0 0-14-15,0 0-25 16,0 0 8-16,2 0 13 16,-1 2 29-16,22 20 19 15,36 46 27-15,-28-23 0 0,1-1 0 16,9 7 2-16,1-6-1 16,8 2 2-16,-2-10 2 15,13-6 3-15,-6-11 4 16,15-13 17-16,-1-13 9 15,14-10 7-15,-11-10 1 16,10-11-2-16,-10-1-15 0,4-9-10 16,-16 4-10-16,4-5-10 15,-14 10-12-15,-5-3-40 16,-14 11-39-16,-2-1-174 16,-15 5 13-16</inkml:trace>
+  <inkml:trace contextRef="#ctx0" brushRef="#br0" timeOffset="3218.625">25893 13138 964 0,'0'-2'208'0,"-1"-1"81"16,2 3-290-16,-1 0-55 15,0 0-14-15,0 0-25 16,0 0 8-16,2 0 13 16,-1 2 29-16,22 20 19 15,36 46 27-15,-28-23 0 0,1-1 0 16,9 7 2-16,1-6-1 16,8 2 2-16,-2-10 2 15,13-6 3-15,-6-11 4 16,15-13 17-16,-1-13 9 15,14-10 7-15,-11-10 1 16,10-11-2-16,-10-1-15 0,4-9-10 16,-16 4-10-16,4-5-10 15,-14 10-12-15,-5-3-40 16,-14 11-39-16,-2-1-174 16,-15 5 13-16</inkml:trace>
   <inkml:trace contextRef="#ctx0" brushRef="#br0" timeOffset="3889.514">24954 13063 541 0,'-53'-74'152'15,"11"17"36"-15,-2-3-153 16,12 11-2-16,1 0-10 15,9 11-2-15,0-1 19 16,8 11 5-16,2 4 16 16,5 10-3-16,2 3-10 15,5 11-24-15,1 0-41 16,2 7-21-16,-3-5-3 0,10 26 4 16,32 71 3-1,-10-20 30-15,12 28 5 16,3-1 0-16,6 18-1 0,-6-8 3 15,11 20 0-15,-9-14-10 16,9 17-1-16,-7-15 2 16,3 28 1-16,-9-13 0 15,7 9 5-15,-11-16 5 16,4 7 0-16,-9-41-1 0,0-2 0 16,-10-27 0-16,-4-15-9 15,-8-21-24-15,-4-10-62 16,-5-16-11-16,-5-12-117 15,-7-20-21-15</inkml:trace>
   <inkml:trace contextRef="#ctx0" brushRef="#br0" timeOffset="4872.681">24607 12571 1107 0,'-24'-16'210'16,"1"2"120"-16,-2-1-338 16,7 0-15-16,1-6-10 0,4-2-14 15,-3-16-19-15,4-7 1 16,5-18 3-16,8 0 23 15,12-19 11-15,10 4 18 16,18-21 9-16,6 2 6 16,20-24-1-16,4 6-1 15,23-36-3-15,0 10 1 0,26-38-2 16,-6 7-1-16,16-27-3 16,-12 26 1-16,3-6-3 15,-28 43-1-15,-7 20 4 16,-30 40 5-16,-12 21 3 15,-22 31 1-15,-11 11-5 16,-7 9-7-16,-2 6-29 16,-3 4-5-16,1-5 1 15,0 1 5-15,0 31 5 16,4 50 24-16,-1-6 0 16,0 8-3-16,3 26-3 15,2 3 3-15,11 31 1 16,-1-7 2-16,12 30 1 15,7-5 2-15,14 25-2 16,-3-18 2-16,14 26-4 16,-3-30 3-16,19 30 4 0,-9-19 6 15,10 29 4-15,-4-19 4 16,7 33 3-16,-22-29-3 16,2 15-3-16,-13-33-4 15,-3 10 0-15,-13-34-1 16,4 5 5-16,-6-27 3 15,-1-3 11-15,-8-28-1 16,-1-4 7-16,-7-32-5 0,-4-9-2 16,-3-20-10-16,-4-6 0 15,1-12-3-15,-2-3 4 16,-2-6 4-16,0-2 13 16,1-1 6-16,-1-1 9 15,0-1-4-15,0 2-5 16,0 0-12-16,-1-1-9 15,1 0-12-15,0 0-3 16,0 1-3-16,0-1 0 16,0 1 5-16,0 0 8 15,0 0 5-15,-1 0 1 16,0 0-1-16,0 0-7 16,-2 0-12-16,-10 1-9 15,-28 8-1-15,-49 17 0 0,22-7 3 16,-14 10 8-16,2 1 7 15,-17 6 5-15,7 2 2 16,-2 1 3-16,15-8 0 16,-2 0 0-16,20-4-3 15,2-5 0-15,16-6-5 16,6 2-2-16,14-6-4 16,4-7-12-16,6 0-19 15,3 0-62-15,3-4-56 0,2 6-194 16,4 3-4-16</inkml:trace>
   <inkml:trace contextRef="#ctx0" brushRef="#br0" timeOffset="5283.127">25377 14804 1009 0,'-7'10'207'0,"4"-8"68"16,1-5-325-16,9 7-56 0,-7-4 7 15,1 2 5-15,28 31 28 16,44 47 36-16,-38-36 30 15,-1-4 9-15,-10-12 18 16,-2-9 61-16,-7-12 23 16,9-17 8-16,4-17-5 15,23-23-17-15,8-15-62 16,19-26-24-16,2 3-10 0,9-6-10 16,-15 20-6-16,-5 8-13 15,-21 29-4-15,-15 12-21 16,-20 16 0-16,-6 5-19 15,-10 4-25-15,-6 17-164 16,-2 11-17-16,-19 13-74 16</inkml:trace>
-  <inkml:trace contextRef="#ctx0" brushRef="#br0" timeOffset="8736.816">15560 16494 528 0,'-16'-25'223'16,"-3"10"36"-16,4 1-116 15,8 6-46-15,1 0-18 16,5 7-35-16,1 1-33 15,0 1-27-15,0-1-34 16,0 0-8-16,0 0 2 16,1 1 6-16,28 13 8 15,43 56 32-15,-15-9 8 16,-1 5-1-16,15 24 1 16,0 6-2-16,18 27 3 15,-4-7-1-15,15 31 2 16,-4-11 1-16,9 19-3 0,-13-21 3 15,12 21-2-15,-15-22 0 16,3 13 1-16,-10-10 2 16,10 14-3-16,-13-28 2 15,4 11 0-15,-14-21-2 16,3-3 2-16,-16-25 0 0,-8-13-26 16,-12-30-30-16,0-11-91 15,-13-30-73-15,2 0-34 16</inkml:trace>
+  <inkml:trace contextRef="#ctx0" brushRef="#br0" timeOffset="8736.814">15560 16494 528 0,'-16'-25'223'16,"-3"10"36"-16,4 1-116 15,8 6-46-15,1 0-18 16,5 7-35-16,1 1-33 15,0 1-27-15,0-1-34 16,0 0-8-16,0 0 2 16,1 1 6-16,28 13 8 15,43 56 32-15,-15-9 8 16,-1 5-1-16,15 24 1 16,0 6-2-16,18 27 3 15,-4-7-1-15,15 31 2 16,-4-11 1-16,9 19-3 0,-13-21 3 15,12 21-2-15,-15-22 0 16,3 13 1-16,-10-10 2 16,10 14-3-16,-13-28 2 15,4 11 0-15,-14-21-2 16,3-3 2-16,-16-25 0 0,-8-13-26 16,-12-30-30-16,0-11-91 15,-13-30-73-15,2 0-34 16</inkml:trace>
   <inkml:trace contextRef="#ctx0" brushRef="#br0" timeOffset="9768.205">15584 16409 548 0,'-25'3'131'0,"-1"-11"52"16,-3-8-156-16,6-6-16 0,2-14 4 15,3-5-15-15,-1-27-5 16,9-11-4-16,5-31-8 16,4-8-10-16,8-36 0 15,8 7 6-15,3-23 3 16,1 13 9-16,11-24 10 15,4 17-1-15,11-20-2 16,5 21-4-16,9-14-4 16,2 23 0-16,4 2 1 15,-7 33 2-15,5 1 4 16,-7 37 3-16,0 12 0 16,-7 25-1-16,3 15-5 15,-10 20-2-15,7 19-2 0,-8 17-2 16,9 22-1-16,-3 14 4 15,13 28 3-15,-2 12 2 16,14 36 2-16,-3 4 2 16,19 38 3-16,-5-7 0 15,23 28 3-15,-7-18 1 16,22 28 3-16,-8-24-4 16,24 31 54-16,-15-25-4 15,15 23-2-15,-17-33 0 0,10 15 3 16,-24-34-54-16,5 5 6 15,-21-34-1-15,-4-2-1 16,-20-31-2-16,-2-2 1 16,-13-22-3-16,-3 1 2 15,-11-13-3-15,-4-10 3 16,-13-16-2-16,-6-10 2 16,-6-14-1-16,-3-5 1 15,-5-7-2-15,0 0 0 16,1-6-2-16,-2 0-1 15,1 1-1-15,-1 0 1 16,0 0 0-16,-1 4 1 16,-7 23 0-16,-20 41 8 15,10-35 3-15,-13 10 4 16,-4 1-2-16,-11 17 2 16,-3 0-7-16,-17 17-6 15,7 5-2-15,-14 21 0 0,2-7-1 16,-16 11 2-16,9-13 23 15,-10 5 23-15,13-19 4 16,4-4 7-16,17-10-2 16,-4 7-24-16,14-25-23 15,-8-7-3-15,7-16-6 0,-5-15 1 16,11-11 6-16,1 0 11 16,16 0 0-16,3 0-8 15,13 0-23-15,6 0-71 16,4 0-115-16,-3 0-102 15,8 0 2-15,27-4-117 16</inkml:trace>
   <inkml:trace contextRef="#ctx0" brushRef="#br0" timeOffset="12399.76">6341 11649 369 0,'1'-2'65'0,"5"-4"46"0,2-3-109 15,8-7 3-15,5-3 5 16,12-10 2-16,3 2-5 15,8-6-2-15,-3 5-4 16,8-2 0-16,-11-1-1 16,4-6 2-16,-7 4 0 0,2-6 3 15,-7-2 8 1,5 2 14-16,-6 7 1 16,0 0 1-16,-7 7-2 0,-2 3-9 15,-9 10-15-15,0 3-8 16,-7 4-22-16,1 4-63 15,-1 3-34-15,-4-2-25 16,0 0-59-16</inkml:trace>
-  <inkml:trace contextRef="#ctx0" brushRef="#br0" timeOffset="12787.36">6657 11696 390 0,'-12'21'136'0,"3"-9"11"16,-6 1-82-16,6 0-66 15,2-5-9-15,4-5-6 16,6 2-9-16,3-4-2 16,-6-2 3-16,1 0 15 15,0-1 16-15,18-9 14 16,43-34 17-16,-34 14 6 15,8-8 8-15,0-1-8 16,4-6 1-16,-3 6-12 16,5-1-4-16,-4 2-8 0,1 3 0 15,-7 6-6-15,-1-2 8 16,-7 11 4-16,-7 3 14 16,-9 6 16-16,-1 5 36 15,-6 6 3-15,-4-1 10 16,3 2-13-16,0 0-18 15,-1 0-39-15,0 0-55 16,1 0-108-16,0 0-206 16,0 2-3-16</inkml:trace>
+  <inkml:trace contextRef="#ctx0" brushRef="#br0" timeOffset="12787.358">6657 11696 390 0,'-12'21'136'0,"3"-9"11"16,-6 1-82-16,6 0-66 15,2-5-9-15,4-5-6 16,6 2-9-16,3-4-2 16,-6-2 3-16,1 0 15 15,0-1 16-15,18-9 14 16,43-34 17-16,-34 14 6 15,8-8 8-15,0-1-8 16,4-6 1-16,-3 6-12 16,5-1-4-16,-4 2-8 0,1 3 0 15,-7 6-6-15,-1-2 8 16,-7 11 4-16,-7 3 14 16,-9 6 16-16,-1 5 36 15,-6 6 3-15,-4-1 10 16,3 2-13-16,0 0-18 15,-1 0-39-15,0 0-55 16,1 0-108-16,0 0-206 16,0 2-3-16</inkml:trace>
   <inkml:trace contextRef="#ctx0" brushRef="#br0" timeOffset="15264.409">16251 15329 1133 0,'-11'13'273'15,"13"-15"86"-15,-2 4-335 16,0-4-113-16,0 1 7 15,1-1 8-15,24-31-4 0,51-52 30 16,-12 12 29-16,2 0-5 16,17-17-6-16,-1 11 5 15,12-15 3-15,-11 7 6 16,11-10 10-16,-13 12 5 16,5-4 1-16,-13 18-6 0,2 1-29 15,-15 13-7 1,3 5-79-16,-10 15-59 0,3 8-69 15,-18 14-45-15</inkml:trace>
   <inkml:trace contextRef="#ctx0" brushRef="#br0" timeOffset="15565.199">16947 15842 373 0,'43'-42'183'15,"-1"-2"-15"-15,15-16-46 0,6-2-125 16,23-20 9-16,-1 1 1 15,19-7-5-15,-7 7 3 16,10-7-7-16,-18 15-11 16,6 1-45-16,-16 17-24 15,0 9-93-15,-18 21-18 16</inkml:trace>
   <inkml:trace contextRef="#ctx0" brushRef="#br0" timeOffset="15912.103">17344 16872 675 0,'7'-3'183'16,"4"-10"37"-16,12-11-149 0,11-10-108 16,19-17 19-16,7-8 20 15,18-16-3-15,0 0-1 16,18-10 1-16,-6 8 1 16,12-3-3-1,-16 12 1-15,9 3 1 0,-19 13-1 16,0 3-5-16,-13 12-8 15,3 7-40-15,-18 11-32 16,-2 11-98-16,-10 12-26 16,-6 20-46-16</inkml:trace>
@@ -393,11 +548,11 @@
   <inkml:trace contextRef="#ctx0" brushRef="#br0" timeOffset="29394.54">6479 10771 552 0,'-10'4'248'0,"-3"-5"-12"16,2-4-97-16,5 3-155 16,5-1-3-16,4-2-4 15,-3 3-4-15,1 1 0 16,0-1 11-16,19-10 3 16,36-13 2-16,-27 20 1 15,-4 2 1-15,3 3 0 16,1 2-1-16,6 3 0 15,-2 3-1-15,11 5 1 16,1 0 2-16,7 8-6 0,-3 3 3 16,2 6-1-16,-7-1 0 15,0 5 1-15,-12-5 7 16,-1-4 3-16,-9-7 1 16,0-4 3-16,-5-6-1 15,5-2 0-15,-3-4-2 16,6-2 0-16,-2-1 0 15,0-7 2-15,-1 1 2 16,-1-6 13-16,-6 1 16 0,-3-3 32 16,-6 7 13-16,-2-1 20 15,-3 2-9-15,-2 2-13 16,1 7-35-16,-2-2-38 16,1 0-37-16,0 1-8 15,-5 8-5-15,-10 17 4 16,-40 39 22-16,34-31 12 15,6-2 4-15,5 5-3 16,9 0-1-16,5 7 1 16,7 2 1-16,8 7 1 15,5-3 3-15,10 5-1 16,6-9-1-16,14 5 1 16,2-10 0-16,11 4-1 15,-5-9 1-15,7 5 0 16,-12-13 0-16,0 1 2 0,-12-10 1 15,-4-1 2 1,-15-4 1-16,-6-6 17 0,-10-5 22 16,-4 1 38-16,-5-5 13 15,1 0 15-15,-1 1-15 16,-1 0-18-16,1 0-38 16,-2 0-13-16,2 0-17 15,0 0-5-15,0 0-14 16,0 0-65-16,0-2-83 0,0 1-169 15,2 0-6-15,-1 0-124 16</inkml:trace>
   <inkml:trace contextRef="#ctx0" brushRef="#br0" timeOffset="31431.53">6850 13275 393 0,'0'18'156'16,"0"-12"-28"-16,0-6-83 15,1 0-121-15,-1 0 6 16,0-1 30-16,2 0 16 16,3 0 22-16,20-8 8 15,36-18-1-15,-24 4 0 0,3 0-2 16,11-10 0-16,1-3-1 16,13-9 0-16,-2 0 0 15,11-8 0-15,-2 5 3 16,11-13 9-16,-8 2 0 15,10-8 11-15,-11 2 1 16,11-11 1-16,-7 13-7 16,5-6 1-16,-12 9-9 0,3-5 1 15,-18 12 0-15,-5 2-1 16,-16 14 10-16,-7 10 46 16,-15 11 23-16,-4 8 49 15,-7 5 14-15,-1 2 10 16,-1 1-39-16,0 0-22 15,-1 0-48-15,1 0-19 16,0 0-29-16,0 0-57 16,0 0-82-16,0 0-213 15,0 0-4-15</inkml:trace>
   <inkml:trace contextRef="#ctx0" brushRef="#br0" timeOffset="33381.317">15972 8715 172 0,'1'-3'88'15,"-1"3"-9"-15,1 0-24 16,-1-1-65-16,0 1 4 16,0-1 3-16,0 0 1 15,1 0 1-15,6-1 3 16,15-2 1-16,46-13 4 15,-28 4 7-15,10-6 15 0,1 2-1 16,9-4 0-16,-4 3-6 16,4-3-6-16,-3 9-15 15,5 0-3-15,-8 5 0 16,4 7-1-16,-9 5 0 16,4 5-2-16,-9 5 1 15,3 14 0-15,-6 0 2 16,4 12 1-16,-6 8 1 15,1 16 1-15,-4 0 0 0,2 18 0 16,-9-1-1-16,-1 21 0 16,-10-7 1-16,-4 23 1 15,-10-10 1-15,-4 24 5 16,-4-10 2-16,-7 18 12 16,-1-15 2-16,-7 21 9 15,2-15 0-15,-4 13-1 16,1-12-9-16,-5 18-1 15,6-19-4-15,-3 16 6 16,3-19 2-16,4 14 2 16,3-21-1-16,2 13-5 15,7-18-8-15,3 8-3 16,2-24-7-16,8 8 1 16,0-25-2-16,4 4 0 0,0-18-1 15,6 9 1-15,2-12-2 16,6 11 3-16,-3-9 0 15,5 9-2-15,-4-8 2 16,-3 9-1-16,-7-10 1 16,1 13 2-16,-6-7 5 15,-1 4-5-15,-2-7 1 16,-1 2-2-16,-1-12-3 0,-1 1-1 16,-2-5 9-16,-1 8 6 15,0-5 0-15,2 21 38 16,-2-5 0-16,0-5-1 15,1-12-4-15,-3 0-2 16,-1-27-37-16,-1-3-2 16,4-4-2-16,-2-1 0 15,0-11 2-15,0-2 2 16,0-9-1-16,-2 0-1 16,1-3-2-16,1 0-14 15,0-2-17-15,0 2-48 16,0 0-39-16,0-1-156 15,-1 0 4-15</inkml:trace>
-  <inkml:trace contextRef="#ctx0" brushRef="#br0" timeOffset="33876.499">16992 13544 989 0,'6'0'163'16,"-6"0"75"-16,2 0-305 16,-2 0-41-16,0 1 18 15,9 19 38-15,26 60 23 16,-13-25 29-16,1 9 0 15,-3-4 3-15,-3 2 1 16,-3-12 1-16,-3-1 0 16,-2-8 1-16,0-7 0 15,0-8-2-15,-2-6-3 16,-2-8-1-16,3-4 7 16,2-7 8-16,5-11 22 15,7-9 14-15,10-14 12 16,5-13-8-16,7-16-7 0,-1-3-25 15,10-23 1-15,-5 4-12 16,1-7-3-16,-5 13-1 16,0-1 2-16,-16 29-12 15,-3 7 2-15,-9 17 3 16,-6 7 0-16,-4 11 1 16,-1 3 2-16,-4 7-3 15,-1-4-43-15,0 2-176 16,0-1-76-16,1 0-77 0</inkml:trace>
+  <inkml:trace contextRef="#ctx0" brushRef="#br0" timeOffset="33876.498">16992 13544 989 0,'6'0'163'16,"-6"0"75"-16,2 0-305 16,-2 0-41-16,0 1 18 15,9 19 38-15,26 60 23 16,-13-25 29-16,1 9 0 15,-3-4 3-15,-3 2 1 16,-3-12 1-16,-3-1 0 16,-2-8 1-16,0-7 0 15,0-8-2-15,-2-6-3 16,-2-8-1-16,3-4 7 16,2-7 8-16,5-11 22 15,7-9 14-15,10-14 12 16,5-13-8-16,7-16-7 0,-1-3-25 15,10-23 1-15,-5 4-12 16,1-7-3-16,-5 13-1 16,0-1 2-16,-16 29-12 15,-3 7 2-15,-9 17 3 16,-6 7 0-16,-4 11 1 16,-1 3 2-16,-4 7-3 15,-1-4-43-15,0 2-176 16,0-1-76-16,1 0-77 0</inkml:trace>
   <inkml:trace contextRef="#ctx0" brushRef="#br0" timeOffset="38438.536">8379 15246 843 0,'7'6'152'0,"-2"-6"75"15,3-2-252-15,12-2-4 16,8-8 5-16,14-6 6 15,5-2 13-15,15-7-4 16,-2-4 2-16,14-4 0 16,0-2 2-16,16-11 1 15,-9 1 3-15,15-8 0 16,-9 5 0-16,12-7 0 16,-12 4-1-16,9-5 1 15,-13 8 0-15,3-2 1 16,-18 12 0-16,1 2 1 15,-15 14 0-15,-2 3 1 0,-16 10-9 16,0 1-33 0,-14 9-16-16,-5-1-69 0,-9 4-24 15,-2 6-60-15,-13 6-23 16</inkml:trace>
   <inkml:trace contextRef="#ctx0" brushRef="#br0" timeOffset="38859.888">9003 15755 740 0,'23'-10'138'0,"2"-11"79"15,-2-2-217-15,18-17-14 16,6-10 13-16,20-13-1 16,3 1 1-16,14-9 1 15,-11 5 0-15,6-5 1 16,-13 11 1-16,-1-2 1 0,-16 11 2 15,-3 5 11-15,-13 15 5 16,-10 9 31-16,-13 9 23 16,-3 7 48-16,-6 5 5 15,-1 2 5-15,0-1-32 16,0 0-23-16,-1 0-59 16,0 0-103-16,0 0-26 0,0 0-261 15,-2 0-7-15</inkml:trace>
-  <inkml:trace contextRef="#ctx0" brushRef="#br0" timeOffset="41994.726">15988 13871 760 0,'-31'3'161'0,"1"9"74"16,0-6-226-16,10 0-13 16,4 2-3-16,3 0-3 15,0 8-5-15,2 3 2 0,-3 8 1 16,1 3 4 0,-1 17 0-16,1 1 3 0,0 15 1 15,3-1 1-15,-1 20 1 16,-2-8 2-16,-1 22-1 15,-2-5 1-15,1 17 1 16,1-10-1-16,-2 22 0 16,3-15 0-16,2 18 0 15,-1-11-1-15,2 18 0 16,3-13-1-16,5 13 0 16,2-21-1-16,5 9 1 15,6-15 0-15,6 4-1 16,3-16 1-16,7 15 2 15,0-11-2-15,3 15 1 16,-4-7 1-16,2 18 1 16,-2-10-2-16,6 16 1 0,-4-16 1 15,7 10-1 1,-2-16-1-16,8 14 1 0,-2-19-1 16,12 8 0-16,-3-14-1 15,6 10 1-15,-3-12 0 16,7 6 1-16,-10-17-1 15,10 11 0-15,-3-10 2 16,12 3-3-16,-7-6 0 16,8 11 2-16,-9-19-1 15,-1 6 0-15,-10-13 2 16,5 1 0-16,-7-12-1 0,7 5 1 16,-9-14-2-16,4-3 1 15,-11-13 0-15,1-1 1 16,-9-11-1-16,4 0 0 15,-2-7 1-15,11 0 0 16,-4-6-1-16,12-3 1 16,-3 0 0-16,8 0 0 15,-5 0 0-15,9-15-1 16,-4-4-1-16,7-14-2 16,-5-8 1-16,8-20 0 15,-6 4 0-15,3-9 2 16,-9 8 0-16,4-7 2 15,-13 9-1-15,1-8 1 16,-7 6 0-16,3-19 0 16,-6 9 1-16,3-6 4 0,-8 4 0 15,-1-19 4-15,-11 12-1 16,-1-21 2-16,-6 8-4 16,-7-9-2-16,-6 12 16 15,-7-10 4-15,-6 13 3 0,-8-18 5 16,-4 1 2-16,-7-22-18 15,0 6-3-15,-9-17 15 16,1 10 5-16,-9-12 30 16,3 22 15-16,-11-8 7 15,3 10-22-15,-7-21-7 16,10 20-31-16,-7-11-5 16,7 12-6-16,-9-11 4 15,2 19-2-15,-16-15 2 16,2 6-11-16,-9-24-4 15,9 14-4-15,-6-8 4 16,8 15-1-16,-4-5 18 16,10 31 10-16,-6 1 6 15,10 17-2-15,-2 2 5 16,9 16-14-16,-13-1-7 16,4 10-5-16,-7 0 2 15,5 7-5-15,-3 1-4 0,10 7-5 16,-8 2-6-16,7 8-5 15,-6 1 0-15,4 7-4 16,-6 2 4-16,15 7 5 16,-1 2-2-16,10 2-4 15,1 5-4-15,14 3-2 16,-5 5-5-16,9 3-2 16,0 11-1-16,2 3 1 15,-6 14 0-15,7 4 6 16,-4 23 2-16,5 4 4 0,1 18 3 15,6-1 1-15,1 18 1 16,7-6 1-16,1 26 0 16,4-7 2-16,2 17-1 15,1-16-1-15,10 21 0 16,0-28-2-16,15 16-2 16,3-13 2-16,11 20 0 15,-3-22 1-15,9 22 1 16,-8-17 2-16,10 12 1 15,-7-17-1-15,11 17 1 16,-6-18 0-16,10 17 1 16,-5-13 0-16,7 18 0 15,-4-9-1-15,5 19 0 0,-10-16-1 16,7 11-1 0,-4-18-2-16,8-4-3 0,-2-21 0 15,6-1-3-15,-6-18-1 16,7 10 3-16,-11-16 0 15,6-3-3-15,-2-16-1 16,12 2-4-16,-8-29-6 16,7 6-6-16,-4-8-1 15,12-5-5-15,-5-11 1 0,11-6 2 16,-4-10 6-16,5-8 3 16,-15-8 9-16,6-7 4 15,-14 7 4-15,6-8-2 16,-10-1-1-16,8 1-2 15,-9-10-1-15,0-21 0 16,-10-2 4-16,5-25 2 16,-11 1 2-16,-3-17 2 15,-8 5-1-15,0-21 3 16,-8 13-1-16,0-19 5 16,-4 16 2-16,3-19 8 15,-4 17 1-15,0-22 1 16,-2 7-4-16,-3-25-2 15,-5 14-8-15,-7-26-2 16,-12 16-1-16,-14-18 1 16,-7 21 1-16,-10-15 26 15,-2 31 14-15,-7-7 10 0,6 24 6 16,-10-10 18-16,1 22-23 16,-10-8 5-16,1 14-3 15,-18-10 2-15,7 5-58 16,-21-16 25-16,1-2-14 0,-14-21-7 15,9 12-8-15,-20-4 33 16,16 14-28-16,-13 6 9 16,15 21-9-16,-6 6-1 15,15 21 7-15,-10 9-1 16,19 18-12-16,-10 5-9 16,9 16-14-16,-7 11-59 15,8 16-62-15,-17 37-243 16,15 31 19-16</inkml:trace>
-  <inkml:trace contextRef="#ctx0" brushRef="#br0" timeOffset="52587.025">18246 3934 443 0,'-5'-4'313'0,"-2"-2"-87"16,7 4-30-16,1 2-231 15,-1 0-11-15,0 0 7 16,0 1 15-16,2 13 5 16,4 17 14-16,16 49 2 15,-8-31 0-15,4 12-2 16,2 0 1-16,2 11 0 15,-3-10 0-15,4 9 2 16,-1-8 1-16,1 7 2 16,0-9 0-16,3 3 2 15,-3-11-7-15,3 0-70 16,-5-17-47-16,2-3-77 16,-4-12-62-16</inkml:trace>
+  <inkml:trace contextRef="#ctx0" brushRef="#br0" timeOffset="41994.724">15988 13871 760 0,'-31'3'161'0,"1"9"74"16,0-6-226-16,10 0-13 16,4 2-3-16,3 0-3 15,0 8-5-15,2 3 2 0,-3 8 1 16,1 3 4 0,-1 17 0-16,1 1 3 0,0 15 1 15,3-1 1-15,-1 20 1 16,-2-8 2-16,-1 22-1 15,-2-5 1-15,1 17 1 16,1-10-1-16,-2 22 0 16,3-15 0-16,2 18 0 15,-1-11-1-15,2 18 0 16,3-13-1-16,5 13 0 16,2-21-1-16,5 9 1 15,6-15 0-15,6 4-1 16,3-16 1-16,7 15 2 15,0-11-2-15,3 15 1 16,-4-7 1-16,2 18 1 16,-2-10-2-16,6 16 1 0,-4-16 1 15,7 10-1 1,-2-16-1-16,8 14 1 0,-2-19-1 16,12 8 0-16,-3-14-1 15,6 10 1-15,-3-12 0 16,7 6 1-16,-10-17-1 15,10 11 0-15,-3-10 2 16,12 3-3-16,-7-6 0 16,8 11 2-16,-9-19-1 15,-1 6 0-15,-10-13 2 16,5 1 0-16,-7-12-1 0,7 5 1 16,-9-14-2-16,4-3 1 15,-11-13 0-15,1-1 1 16,-9-11-1-16,4 0 0 15,-2-7 1-15,11 0 0 16,-4-6-1-16,12-3 1 16,-3 0 0-16,8 0 0 15,-5 0 0-15,9-15-1 16,-4-4-1-16,7-14-2 16,-5-8 1-16,8-20 0 15,-6 4 0-15,3-9 2 16,-9 8 0-16,4-7 2 15,-13 9-1-15,1-8 1 16,-7 6 0-16,3-19 0 16,-6 9 1-16,3-6 4 0,-8 4 0 15,-1-19 4-15,-11 12-1 16,-1-21 2-16,-6 8-4 16,-7-9-2-16,-6 12 16 15,-7-10 4-15,-6 13 3 0,-8-18 5 16,-4 1 2-16,-7-22-18 15,0 6-3-15,-9-17 15 16,1 10 5-16,-9-12 30 16,3 22 15-16,-11-8 7 15,3 10-22-15,-7-21-7 16,10 20-31-16,-7-11-5 16,7 12-6-16,-9-11 4 15,2 19-2-15,-16-15 2 16,2 6-11-16,-9-24-4 15,9 14-4-15,-6-8 4 16,8 15-1-16,-4-5 18 16,10 31 10-16,-6 1 6 15,10 17-2-15,-2 2 5 16,9 16-14-16,-13-1-7 16,4 10-5-16,-7 0 2 15,5 7-5-15,-3 1-4 0,10 7-5 16,-8 2-6-16,7 8-5 15,-6 1 0-15,4 7-4 16,-6 2 4-16,15 7 5 16,-1 2-2-16,10 2-4 15,1 5-4-15,14 3-2 16,-5 5-5-16,9 3-2 16,0 11-1-16,2 3 1 15,-6 14 0-15,7 4 6 16,-4 23 2-16,5 4 4 0,1 18 3 15,6-1 1-15,1 18 1 16,7-6 1-16,1 26 0 16,4-7 2-16,2 17-1 15,1-16-1-15,10 21 0 16,0-28-2-16,15 16-2 16,3-13 2-16,11 20 0 15,-3-22 1-15,9 22 1 16,-8-17 2-16,10 12 1 15,-7-17-1-15,11 17 1 16,-6-18 0-16,10 17 1 16,-5-13 0-16,7 18 0 15,-4-9-1-15,5 19 0 0,-10-16-1 16,7 11-1 0,-4-18-2-16,8-4-3 0,-2-21 0 15,6-1-3-15,-6-18-1 16,7 10 3-16,-11-16 0 15,6-3-3-15,-2-16-1 16,12 2-4-16,-8-29-6 16,7 6-6-16,-4-8-1 15,12-5-5-15,-5-11 1 0,11-6 2 16,-4-10 6-16,5-8 3 16,-15-8 9-16,6-7 4 15,-14 7 4-15,6-8-2 16,-10-1-1-16,8 1-2 15,-9-10-1-15,0-21 0 16,-10-2 4-16,5-25 2 16,-11 1 2-16,-3-17 2 15,-8 5-1-15,0-21 3 16,-8 13-1-16,0-19 5 16,-4 16 2-16,3-19 8 15,-4 17 1-15,0-22 1 16,-2 7-4-16,-3-25-2 15,-5 14-8-15,-7-26-2 16,-12 16-1-16,-14-18 1 16,-7 21 1-16,-10-15 26 15,-2 31 14-15,-7-7 10 0,6 24 6 16,-10-10 18-16,1 22-23 16,-10-8 5-16,1 14-3 15,-18-10 2-15,7 5-58 16,-21-16 25-16,1-2-14 0,-14-21-7 15,9 12-8-15,-20-4 33 16,16 14-28-16,-13 6 9 16,15 21-9-16,-6 6-1 15,15 21 7-15,-10 9-1 16,19 18-12-16,-10 5-9 16,9 16-14-16,-7 11-59 15,8 16-62-15,-17 37-243 16,15 31 19-16</inkml:trace>
+  <inkml:trace contextRef="#ctx0" brushRef="#br0" timeOffset="52587.024">18246 3934 443 0,'-5'-4'313'0,"-2"-2"-87"16,7 4-30-16,1 2-231 15,-1 0-11-15,0 0 7 16,0 1 15-16,2 13 5 16,4 17 14-16,16 49 2 15,-8-31 0-15,4 12-2 16,2 0 1-16,2 11 0 15,-3-10 0-15,4 9 2 16,-1-8 1-16,1 7 2 16,0-9 0-16,3 3 2 15,-3-11-7-15,3 0-70 16,-5-17-47-16,2-3-77 16,-4-12-62-16</inkml:trace>
   <inkml:trace contextRef="#ctx0" brushRef="#br0" timeOffset="53172.636">18201 4105 1034 0,'-21'-18'170'0,"7"-9"120"16,8 2-325-1,5-7 15-15,5 1 6 0,9-6-4 16,4 4 1-16,8-3 0 16,1 8 3-16,5-2 3 15,-2 8 3-15,0 2 0 16,-6 9 3-16,-1-1-3 16,-6 10-2-16,2 3-2 15,0 6-1-15,5 6 1 16,3 5 4-16,5 8-2 15,-3 1-5-15,1 14-10 16,-7-1 0-16,-8 13-3 16,-7 0 4-16,-7 13 7 15,-4-6 10-15,-3 4 2 16,-1-11 4-16,-3 3 2 16,4-13-1-16,-4 0 2 0,2-11 0 15,-1 1 1-15,3-9 0 16,-2-3 1-16,-1-6-2 15,5-3-1-15,1-1-3 16,2-2 0-16,2 0-1 16,1 1 1-16,-1 1 1 15,0-1 2-15,1-2 1 16,-3 4 2-16,-2-2 0 16,-4 9 0-16,-2 4 0 15,-6 7-1-15,-3 2-2 0,-3 4 1 16,1-5-2-16,-4 0 2 15,7-5-2-15,-3 1-6 16,4-6-17-16,-2 1-104 16,6-5-102-16,2 0-17 15</inkml:trace>
   <inkml:trace contextRef="#ctx0" brushRef="#br0" timeOffset="53843.469">19014 3608 1129 0,'19'9'56'16,"-8"-5"166"-16,-17 1-325 16,21 11-24-16,0 6 82 15,9 17 25-15,1 8 19 16,5 17-2-16,-4-2 0 0,5 11 4 15,-3-8-3-15,0 8 3 16,-4-13 0-16,0-1 0 16,-6-13-2-16,-2-2-51 15,-5-13-33-15,-3-8-46 16,-3-9 3-16,-5-9-77 16,-4-13 37-16,-5-30 13 15</inkml:trace>
   <inkml:trace contextRef="#ctx0" brushRef="#br0" timeOffset="54340.408">19209 3780 600 0,'-20'-35'129'0,"-1"0"78"16,2 3-173-16,2-6 11 16,8 2-1-16,1-7-5 15,9 4-22-15,8-7-4 16,4 2-13-16,5 3 7 0,3 7 5 15,5 5 6-15,-1 10-2 16,9 1 1-16,0 6-8 16,11 8-7-16,-3 4-6 15,7 14-7-15,-8 10-4 16,-3 13-8-16,-11 4 2 16,-9 16-6-16,-10 2 4 15,-10 13 0-15,-5-2 10 16,-7 0 2-16,-2-16 5 0,-2-4-9 15,3-20 3-15,2-8-2 16,5-11-1-16,2-4 2 16,5-6 12-16,2-4-3 15,-1 2 3-15,1 0 3 16,8-4-2-16,28-13-1 16,42-22 4-16,-31 16-5 15,-8 8 0-15,3 9-1 16,-13 7 0-16,-2 13-1 15,-6 9 2-15,-5 20 3 16,-11 8 2-16,-14 26 4 16,-11 2 4-16,-15 4 2 15,-8-13-2-15,-9-10-2 16,4-23-7-16,-8-15-77 16,6-14-126-16,-8-38 11 15</inkml:trace>
@@ -497,9 +652,9 @@
   <inkml:trace contextRef="#ctx0" brushRef="#br0" timeOffset="13463.626">20899 10285 724 0,'-16'4'448'16,"0"-1"-85"-16,-8-1-79 15,6 11-320-15,-2 21-3 16,-2 16-2-16,-6 24-4 16,5 7 14-16,0 19 6 15,6-6 7-15,3 1 2 16,7-17 9-16,3-2-30 15,7-21-11-15,5-10-27 16,6-17-8-16,12-9-11 0,5-17 32 16,15-18 10-16,7-11 25 15,13-20-6-15,-2-10-7 16,6-19-19-16,-10 4 1 16,-1-10 2-16,-14 10 17 15,-7 6 53-15,-16 19 43 16,-10 7 38-16,-11 16 17 15,-2 5 53-15,-3 9-21 0,0 2-16 16,0 6-37-16,0 2-22 16,3 0-57-16,0 0-26 15,0 0-12 1,-2 1-2-16,-9 18 1 0,-25 52 1 16,25-30 11-16,3 5 6 15,4-10 2-15,5 0 1 16,4-13-3-16,-1-5-16 15,2-8-12-15,4-6-16 16,-1-7-1-16,8-9 5 16,5-5 17-16,6-13 8 15,-1-2 17-15,-3-3 13 16,-5 10 13-16,-10 0 35 16,-10 6-1-16,-6-3 5 15,-1 4-7-15,1-1 7 16,2 6-32-16,2 8-10 15,5 3-15-15,1 7-21 0,-2-5-21 16,0 1 1-16,7 11 12 16,3 21 7-16,50 36 9 15,-31-35-22-15,-3-11-12 16,-2-6-28-16,-6-10-3 16,3-16 8-16,-3-8 22 15,7-20-47-15,-2-7 2 16,0-14-24-16,-8 2 3 0,-4-7 20 15,-7 15 70-15,-8-2 48 16,1 11 50-16,-3 8 76 16,1 10-16-16,0 5-7 15,2 9-26-15,2 7-41 16,2 4-86-16,-1-4-3 16,0 1-6-16,4 21 5 15,10 49 20-15,-3-26 9 16,1-4-1-16,6-3 0 15,1-11 0-15,7-8 1 16,-1-15 1-16,3-6 3 16,-4-11 2-16,2-17 1 15,-8-8 0-15,1-16-25 16,-6-6-31-16,-8-10-27 16,-6 4-3-16,-4-4 5 0,-6 7 23 15,-5-12 46-15,-1 7 35 16,-4-7 37-16,1 10 13 15,3 11 73-15,3 20-18 16,6 13-16-16,5 14-48 16,5 8-37-16,1 7-72 15,11 14-3-15,2 9 7 16,8 22 12-16,5 11 20 0,6 15-1 16,-6-3 1-16,3 9 1 15,-1-10 2-15,-2-1 1 16,-9-18 0-16,1-8-1 15,-7-22-2-15,-7-8 2 16,-5-15 3-16,2-2 3 16,-4-3 14-16,0 0 3 15,2-11-4-15,8-27 0 16,11-45-4-16,-8 22-13 16,-4 10-1-16,0 1-2 15,-1 11-2-15,0 5-4 16,-1 16-4-16,3 5-3 15,-1 8 1-15,6 2-2 16,3 1 2-16,11 6 2 16,1 11 2-16,8 8 1 15,-1 8 2-15,3 4 2 0,-6-1 3 16,-1-3-1-16,-7-8-2 16,-7-6-8-16,-5-7-1 15,6-13 8-15,-2-8 1 16,3-16 5-16,1-6 9 0,3-16 4 15,-9 2-5 1,-7-10 7-16,-6 6 0 0,-9-6 6 16,-6 8-5-16,-6 1 2 15,0 14 50-15,4 9 9 16,3 15-10-16,6 7-18 16,6 9-22-16,-6 12-59 15,2 10-15-15,2 15 4 16,1 5 17-16,10 6 12 15,11-12 1-15,18-13-1 16,9-17 0-16,25-22 2 16,3-20-14-16,22-24-283 15,-6-15 91-15</inkml:trace>
   <inkml:trace contextRef="#ctx0" brushRef="#br0" timeOffset="13968.317">21964 11040 462 0,'36'-22'118'0,"13"-26"39"16,7-12-122-16,35-31-33 15,12-12 10-15,31-29 14 16,0 10-5-16,21-11 0 16,-19 21 2-16,6-5-7 15,-30 32-14-15,-8 2 0 0,-30 25 1 16,-16 9 8-16,-25 21 13 15,-12 10 21-15,-15 10 8 16,-4 4 7-16,2 5-12 16,-8 0-35-16,3-1-56 15,0 0-191-15,-1 2 19 16</inkml:trace>
   <inkml:trace contextRef="#ctx0" brushRef="#br0" timeOffset="15178.766">30036 9470 1184 0,'4'10'197'0,"-9"-8"87"16,6 8-358-16,6 21 4 15,4 11 11-15,9 21 6 16,9 12 44-16,12 19-2 16,-1-2 0-16,7 7 1 15,-6-11 2-15,-2 10 3 16,-9-17-12-16,1 4-38 15,-6-10-48-15,2 7-166 16,-8-10 2-16</inkml:trace>
-  <inkml:trace contextRef="#ctx0" brushRef="#br0" timeOffset="15462.386">30663 9230 617 0,'-4'21'323'16,"2"1"-51"-16,8 20-55 16,2 15-265-1,7 28 21-15,6 12 23 0,6 19-3 16,1-10-12-16,7 8-4 15,-3-18-12-15,0 3-38 16,-8-21-13-16,-1-1-42 16,-4-15-22-16,-5-3-84 15,-6-22 3-15</inkml:trace>
+  <inkml:trace contextRef="#ctx0" brushRef="#br0" timeOffset="15462.384">30663 9230 617 0,'-4'21'323'16,"2"1"-51"-16,8 20-55 16,2 15-265-1,7 28 21-15,6 12 23 0,6 19-3 16,1-10-12-16,7 8-4 15,-3-18-12-15,0 3-38 16,-8-21-13-16,-1-1-42 16,-4-15-22-16,-5-3-84 15,-6-22 3-15</inkml:trace>
   <inkml:trace contextRef="#ctx0" brushRef="#br0" timeOffset="15714.941">30030 9458 1070 0,'-17'34'189'15,"-3"8"110"-15,0-3-318 16,-8 28-11-16,-5 14 15 15,6 17-42-15,11-14-18 16,10 3-51-16,8-22-37 16,10-5-90-16,0-23 7 0,9-11 22 15,3-22-51-15</inkml:trace>
-  <inkml:trace contextRef="#ctx0" brushRef="#br0" timeOffset="15881.906">30462 9117 655 0,'27'-27'117'0,"3"19"84"15,1 9-199-15,20 12 6 16,7 11 4-16,23 24-46 16,-1 9-37-16,14 27-131 15,-7 6-7-15</inkml:trace>
+  <inkml:trace contextRef="#ctx0" brushRef="#br0" timeOffset="15881.904">30462 9117 655 0,'27'-27'117'0,"3"19"84"15,1 9-199-15,20 12 6 16,7 11 4-16,23 24-46 16,-1 9-37-16,14 27-131 15,-7 6-7-15</inkml:trace>
   <inkml:trace contextRef="#ctx0" brushRef="#br0" timeOffset="16463.335">21864 11623 1330 0,'7'0'200'15,"-3"-1"91"-15,-8 5-454 16,4-4-9-16,4 6 28 16,17 34 20-16,50 68 65 15,-25-18 61-15,0 2-1 0,9 22 1 16,-4-11-1-16,6 8-5 15,-10-25-5-15,-2-4-26 16,-9-26-29-16,-9-8-56 16,-11-21-93-16,3-9-10 15,-8-17-59-15</inkml:trace>
   <inkml:trace contextRef="#ctx0" brushRef="#br0" timeOffset="16717.818">22582 11312 1093 0,'6'9'180'0,"1"6"120"0,3 2-327 16,10 20-2-16,8 14 17 15,13 22 4-15,2 3 5 16,9 21 0-16,-4-6-19 15,-1 10-22-15,-6-9-65 16,0 8-30-16,-10-17-29 16,-1 2-14-16,-7-19-25 0,-5-13 21 15,-12-21 28-15,-13-25-34 16</inkml:trace>
   <inkml:trace contextRef="#ctx0" brushRef="#br0" timeOffset="16991.336">22151 11234 910 0,'-23'-14'300'0,"7"8"28"16,8 6-228-16,-2 13-122 15,3 11-8-15,-4 25-2 16,2 15 2-16,-2 26 8 15,2 2 12-15,6 16-12 16,1-18-4-16,1-3-5 16,2-27-1-16,0-17 7 15,-2-25 14-15,0-10-6 0,-1-10 2 16,0-7-50-16,1-7-206 16,-4-33 47-16</inkml:trace>
@@ -512,7 +667,7 @@
   <inkml:trace contextRef="#ctx0" brushRef="#br0" timeOffset="22017.472">19588 9557 843 0,'-15'30'273'0,"10"-14"3"16,6-16-205-16,5-4-146 16,5-3 4-16,18-8 15 15,8-7 22-15,26-23 16 16,9-10 16-16,21-25-4 16,-2-3 4-16,21-19-2 15,-6 6 0-15,14-19 2 16,-11 11 5-16,14-13 4 0,-14 11 6 15,11-9 9-15,-16 18 2 16,9-7 3-16,-14 20-6 16,6 0-3-16,-21 21-8 15,-3 4-2-15,-24 17-5 16,-9 9 1-16,-26 12 4 0,-7 7 7 16,-11 11-9-16,-2 3-108 15,-5 3-170-15,1-3 8 16</inkml:trace>
   <inkml:trace contextRef="#ctx0" brushRef="#br0" timeOffset="22730.711">22190 10512 950 0,'5'21'-119'0,"-2"-14"240"16</inkml:trace>
   <inkml:trace contextRef="#ctx0" brushRef="#br0" timeOffset="27693.781">22012 11488 599 0,'1'-1'225'15,"0"0"-1"-15,-1 0-161 16,0 1-103-16,0 0-20 15,0 0 2-15,0 1 8 16,-2 7 18-16,-4 7 31 0,-2 2 3 16,-16 34 1-16,11-29 0 15,4 1 0-15,-3 4 1 16,1-1-1-16,-2 9-1 16,3-3-1-16,-4 6-1 15,6 1 0-15,-5 5 0 16,2-5 0-16,-2 4 1 15,2-5 1-15,-5 2 8 16,5-3 0-16,-3-3 0 16,6-10-1-16,-2-1 3 15,4-8-3-15,0 1 13 16,3-1 4-16,-3 2 4 16,3-3-3-16,0-2-1 15,1-5-12-15,-1-2-3 16,2-2-2-16,1-3 0 15,0 0-1-15,0 0-2 0,0 0-4 16,0 0-166-16,0 0-65 16,0-2-37-16</inkml:trace>
-  <inkml:trace contextRef="#ctx0" brushRef="#br0" timeOffset="65816.967">13245 12426 533 0,'13'-4'127'0,"-12"9"40"15,6-8-144-15,2-3-32 16,7-8 2-16,4 0 7 0,8-15 0 16,3-4 0-16,8-13 0 15,5-4 0-15,11-16-1 16,0 9 1-16,15-10-1 15,-3 8 1-15,4-13 1 16,-9 8 1-16,9-8 4 16,-14 8 5-16,7-8 8 15,-9 14 3-15,5 3-1 16,-13 13-4-16,3-1-4 16,-13 10-9-16,-4 2-2 15,-8 6-2-15,-4 7-15 16,-8 9-21-16,-2 4-44 15,-5 6-27-15,-5 0-52 16,-1 6 12-16,-1-7-8 16,0 3 0-16</inkml:trace>
+  <inkml:trace contextRef="#ctx0" brushRef="#br0" timeOffset="65816.965">13245 12426 533 0,'13'-4'127'0,"-12"9"40"15,6-8-144-15,2-3-32 16,7-8 2-16,4 0 7 0,8-15 0 16,3-4 0-16,8-13 0 15,5-4 0-15,11-16-1 16,0 9 1-16,15-10-1 15,-3 8 1-15,4-13 1 16,-9 8 1-16,9-8 4 16,-14 8 5-16,7-8 8 15,-9 14 3-15,5 3-1 16,-13 13-4-16,3-1-4 16,-13 10-9-16,-4 2-2 15,-8 6-2-15,-4 7-15 16,-8 9-21-16,-2 4-44 15,-5 6-27-15,-5 0-52 16,-1 6 12-16,-1-7-8 16,0 3 0-16</inkml:trace>
   <inkml:trace contextRef="#ctx0" brushRef="#br0" timeOffset="66187.225">13427 12688 767 0,'22'-21'171'0,"9"-19"68"16,12-9-219-16,17-16-26 15,10-5 3-15,19-19 1 16,0 8 0-16,19-11 0 16,-11 6 1-16,7-4 1 15,-13 17 0-15,5-6 1 16,-19 14 0-16,-2-1 0 16,-14 17 4-16,-6 0 8 15,-18 18 2-15,-6 5 0 16,-12 12 1-16,-7 5-1 15,-7 5-7-15,-4 3-33 0,-2 3-128 16,1-2-101-16,0 2-40 16</inkml:trace>
   <inkml:trace contextRef="#ctx0" brushRef="#br0" timeOffset="69476.927">21376 7707 634 0,'9'-2'265'16,"-4"-3"-13"-16,-4 5-124 15,1 1-145-15,-2-1-7 16,0 0-7-16,-2 0 7 16,2 0 4-16,0 1 8 15,0 0 4-15,4 17 10 16,4 8-3-16,15 37 1 0,-8-30-2 16,0 3 0-16,7 2 0 15,-4-3 1-15,10 5-1 16,-5-7 1-16,6 2-1 15,-4-4 2-15,6 7-2 16,-4-5 1-16,5 8-1 16,-3-3-21-16,0 10-93 15,-5-4-52-15,-9 9-57 16,-9-5-91-16</inkml:trace>
   <inkml:trace contextRef="#ctx0" brushRef="#br0" timeOffset="70251.896">19432 9194 740 0,'-2'0'198'16,"2"0"40"-16,-2 1-199 15,1-1-90-15,1 0 3 0,0 0 9 16,0 1 5-16,0 1 17 15,2 14 8-15,2 1 7 16,12 40 1-16,-11-39 0 16,5 6-1-16,-2 0 1 15,5 10-1-15,2 0 2 16,5 13 0-16,-1 0 1 16,6 12 1-16,1-5 2 15,1 6 0-15,-1-6-1 0,4-1-1 16,-4-7 0-16,-1-2 0 15,-4-11 0-15,0 1 1 16,-4-9 2-16,-3-5 0 16,-1-5 0-16,-3-5 1 15,-4-3 0-15,-3-7 5 16,1 3 4-16,-4-4 13 16,0 1 7-16,-1-1 11 15,1 1 0-15,0-1 0 16,0 1-13-16,0 0-5 15,0 0-11-15,0 0-3 16,0 0-3-16,0 0 1 16,0 0-2-16,0 0-2 15,0 0-2-15,0-1-5 16,0 1-6-16,0 0-82 0,0 0-151 16,0 0-48-16,1 0-113 15</inkml:trace>
@@ -531,7 +686,7 @@
   <inkml:trace contextRef="#ctx0" brushRef="#br0" timeOffset="135900.9">16953 14097 808 0,'46'-31'157'16,"19"-17"84"-16,7-5-244 15,25-8-2-15,-4 4 5 16,20-14 9-16,-12 7 2 16,5 1-4-16,-23 10 4 0,-2 3-1 15,-30 21-7-15,-8 7 11 16,-20 7 18-16,-4 5 36 15,-14 4 18-15,0 4 24 16,-5 1-6-16,0 1-9 16,-1 0-35-16,1 0-19 15,0-1-30-15,-1 0-11 16,1-1-9-16,-2 2-20 16,2 0-7-16,0 0-33 15,0 0-20-15,0 0-108 16,0 0-150-16,-1 0 1 15</inkml:trace>
   <inkml:trace contextRef="#ctx0" brushRef="#br0" timeOffset="139759.114">8683 16103 432 0,'35'-31'92'15,"-3"-5"42"-15,12-12-127 16,11-2-4-16,20-10-1 16,-1 3 2-16,17-14-1 15,0 5-1-15,12-5 0 16,-17 8-1-16,9-1 1 15,-16 20-1-15,-2 1-1 16,-20 14 1-16,-1 0 1 16,-16 10-1-16,-4 2 0 0,-13 6 0 15,-5 2-20 1,-9 8-19-16,-1 3-10 0,-4 4 0 16,-5 11-52-16,-2 9-20 15,-6 15 13-15</inkml:trace>
   <inkml:trace contextRef="#ctx0" brushRef="#br0" timeOffset="140213.346">9049 16412 880 0,'-2'4'165'0,"5"-7"54"16,3-5-253-16,10-10-19 16,9-7 9-16,17-16 13 15,9-4 34-15,19-12-3 16,-2 0 0-16,13-12-1 16,-7 5 0-16,12-7-2 15,-11 10 3-15,8-8-2 16,-8 12 2-16,2-2 1 0,-11 11 2 15,1 1-1 1,-12 12 2-16,-2 2 12 0,-13 9 3 16,-5 4-1-16,-12 8 2 15,-8 5 29-15,-11 4 4 16,-1 3 18-16,-3 1 5 16,0-1 4-16,-1 0-29 15,1 0-14-15,0 0-21 16,0 0-8-16,0 0-8 15,0 0-14-15,0 0-23 0,-2 0-69 16,2 0-69-16,0 0-38 16,0 0-19-16,2 1-56 15,18 11 43-15</inkml:trace>
-  <inkml:trace contextRef="#ctx0" brushRef="#br0" timeOffset="142368.934">12592 7989 852 0,'-18'0'191'0,"7"-10"77"16,4 4-254-16,6 4-21 16,5-4-17-16,4-3-8 15,15-10-1-15,5-5 6 16,17-8 0-16,7 1 19 16,13-3-2-16,-1 7 1 0,15 0-5 15,-6 8 4-15,17 1-1 16,-6 7 1-16,13 7-3 15,-6 8 3-15,15 7-2 16,-10 8 2-16,16 13 2 16,-7 6 2-16,17 19 1 15,-7 4 2-15,18 14-3 16,-11-2 0-16,19 17-1 16,-14-4-2-16,13 20 3 15,-16-7-1-15,17 22 0 16,-22-6 2-16,15 18 2 15,-17-14 0-15,19 25 2 16,-18-14 1-16,17 14 1 16,-11-15-3-16,18 21 0 15,-15-16 1-15,17 15-3 16,-11-11 2-16,12 23 2 16,-22-18 0-16,15 24 1 0,-21-16-2 15,8 18-3-15,-22-19 2 16,10 23 1-16,-22-25-1 15,6 22 3-15,-11-18 4 16,0 12-1-16,-8-26-2 16,8 14 1-16,-15-26 0 15,8 5 0-15,-12-22-1 16,-4 8 3-16,-13-23-1 16,1 2 0-16,-11-18-2 0,1 1 4 15,-5-21-2-15,2-2 1 16,-8-11-1-16,3-2 3 15,-9-11-5-15,1 0 2 16,-8-7 0-16,-1-5 1 16,-4-3-2-16,-3-4 1 15,-3-3-1-15,-2-3-1 16,-1-3-1-16,-2 0 1 16,-1-4-1-16,0 0 0 15,0 0 3-15,-1 1 8 16,-1 0 0-16,-5 22 4 15,-19 38 0-15,1-21 0 16,-4-3-8-16,-9 13 2 16,-6-3-2-16,-10 15 0 15,2-7 2-15,-17 10 11 0,0-8-1 16,-17 5 4-16,8-10 0 16,-7 0 9-16,16-11-8 15,1 3 7-15,22-13 2 16,1-4 4-16,15-10 0 15,6-5 10-15,13-9-6 0,3-1-2 16,9-2-5-16,-1 0-11 16,0-1-16-16,0 1-16 15,0-1-24-15,0 1-100 16,0 0-187-16,0-1-14 16,0 0-141-16</inkml:trace>
+  <inkml:trace contextRef="#ctx0" brushRef="#br0" timeOffset="142368.933">12592 7989 852 0,'-18'0'191'0,"7"-10"77"16,4 4-254-16,6 4-21 16,5-4-17-16,4-3-8 15,15-10-1-15,5-5 6 16,17-8 0-16,7 1 19 16,13-3-2-16,-1 7 1 0,15 0-5 15,-6 8 4-15,17 1-1 16,-6 7 1-16,13 7-3 15,-6 8 3-15,15 7-2 16,-10 8 2-16,16 13 2 16,-7 6 2-16,17 19 1 15,-7 4 2-15,18 14-3 16,-11-2 0-16,19 17-1 16,-14-4-2-16,13 20 3 15,-16-7-1-15,17 22 0 16,-22-6 2-16,15 18 2 15,-17-14 0-15,19 25 2 16,-18-14 1-16,17 14 1 16,-11-15-3-16,18 21 0 15,-15-16 1-15,17 15-3 16,-11-11 2-16,12 23 2 16,-22-18 0-16,15 24 1 0,-21-16-2 15,8 18-3-15,-22-19 2 16,10 23 1-16,-22-25-1 15,6 22 3-15,-11-18 4 16,0 12-1-16,-8-26-2 16,8 14 1-16,-15-26 0 15,8 5 0-15,-12-22-1 16,-4 8 3-16,-13-23-1 16,1 2 0-16,-11-18-2 0,1 1 4 15,-5-21-2-15,2-2 1 16,-8-11-1-16,3-2 3 15,-9-11-5-15,1 0 2 16,-8-7 0-16,-1-5 1 16,-4-3-2-16,-3-4 1 15,-3-3-1-15,-2-3-1 16,-1-3-1-16,-2 0 1 16,-1-4-1-16,0 0 0 15,0 0 3-15,-1 1 8 16,-1 0 0-16,-5 22 4 15,-19 38 0-15,1-21 0 16,-4-3-8-16,-9 13 2 16,-6-3-2-16,-10 15 0 15,2-7 2-15,-17 10 11 0,0-8-1 16,-17 5 4-16,8-10 0 16,-7 0 9-16,16-11-8 15,1 3 7-15,22-13 2 16,1-4 4-16,15-10 0 15,6-5 10-15,13-9-6 0,3-1-2 16,9-2-5-16,-1 0-11 16,0-1-16-16,0 1-16 15,0-1-24-15,0 1-100 16,0 0-187-16,0-1-14 16,0 0-141-16</inkml:trace>
   <inkml:trace contextRef="#ctx0" brushRef="#br0" timeOffset="143126.525">9259 16359 967 0,'-10'-1'193'0,"1"1"94"16,5-1-293-16,2 2-24 16,2-1-19-16,0-1-18 15,0 0 3-15,6-3 6 16,24-11 20-16,51-33 22 16,-28 18 17-16,12-12-1 15,-6-3 1-15,14-9-1 16,-7 2 0-16,9-10-1 15,-6 10 1-15,10-1-1 16,-12 7 1-16,5 1-1 16,-12 4 1-16,1-2 0 15,-12 7 0-15,3 0-5 16,-9 7-22-16,2 10-78 16,-13 5-42-16,-1 10-77 15,-9 8-60-15</inkml:trace>
   <inkml:trace contextRef="#ctx0" brushRef="#br0" timeOffset="143455.745">9894 16660 730 0,'5'16'64'0,"-1"-18"101"15,4-3-212-15,11-9-3 16,5-5 43-16,17-19 18 16,7 0 12-16,13-26 2 15,2 2-6-15,18-13 14 16,-9 6-10-16,8-9-2 16,-13 17-4-16,-1-3-1 15,-19 17-15-15,-6 5 2 16,-14 15 1-16,-8 7 7 15,-10 12 5-15,-5 2 2 16,-4 6-2-16,-1 0-53 0,1 0-131 16,0 1-57-1,-1 7-78-15</inkml:trace>
   <inkml:trace contextRef="#ctx0" brushRef="#br0" timeOffset="161056.297">3199 8785 653 0,'-3'-17'122'0,"-9"-6"79"15,-29 3-205-15,17-1 48 16,4 7-10-16,-5-1 2 16,0 4-9-16,-2 0 0 15,0 5-9-15,-4 0-1 16,1 2-2-16,-7 3-1 16,0 0-8-16,-10 0-1 15,-3 1-1-15,-10 2 1 16,3 3 0-16,-13 3 1 15,6 1-3-15,-4 5-1 16,5-3-2-16,-9 9-1 0,11 0-2 16,-8 7-2-16,8 3 1 15,-6 8-1-15,12-2 3 16,-4 10-2-16,8-4 1 16,-7 5-1-16,10-2 1 15,-7 11-2-15,4-4 1 16,-2 15-2-16,8-1 2 0,0 13-3 15,9-5 3-15,2 8-1 16,4-6 3-16,0 11-4 16,4-11 2-16,0 10-1 15,4-7 0-15,1 9-2 16,6-8 2-16,4 14-1 16,4-6-1-16,6 13 0 15,5-8 2-15,7 12 0 16,0-13 2-16,2 12 0 15,-3-15 2-15,3 16-2 16,-5-14 1-16,5 10 0 16,0-12 1-16,0 11-1 15,0-15 1-15,1 10 0 16,-4-12 1-16,5 11 0 16,-5-10 0-16,-2 10 1 15,-1-15-1-15,0 14-1 0,-3-13 1 16,3 16 1-16,-3-11 0 15,-1 17 0 1,-2-12 0-16,-1 12 0 0,-4-10 1 16,-1 16-1-16,0-14 0 15,-1 15 0-15,0-11 0 16,-1 10 0-16,2-8 2 16,-5 17 4-16,4-9-1 15,-7 13-1-15,4-11 0 0,1 5-5 16,1-18-1-16,0 8-3 15,7-25 2-15,-3 10 0 16,2-11 0-16,1 5-1 16,1-17 3-16,-1 13-2 15,2-13 1-15,2 8 0 16,-1-10 1-16,-1 9-2 16,1-9 2-16,4 13-1 15,2-8 1-15,2 12 0 16,-1-10 1-16,3 6-2 15,-3-15 1-15,1-2-2 16,-1-14 1-16,3-1 0 16,-3-11 1-16,0 1 0 15,0-6 1-15,1-1-1 16,-4-6 1-16,3 2 0 16,-1-4 2-16,0 3-3 0,-1-2 0 15,3 2-1-15,0-4-2 16,3 4-1-16,2-5 2 15,1 6 2-15,1-5 0 16,3 6 1-16,-1-7 1 16,4 4-1-16,1-1-1 0,8 3 1 15,-2-5 0-15,8 5-1 16,-2-2 0-16,2 2 0 16,-4-4 1-16,4 3-1 15,-7-4 0-15,5 3 0 16,-5-6 0-16,6 2 0 15,-3 0 1-15,4-1-1 16,-3-4 1-16,1 1 0 16,-7-2 1-16,-4-4 2 15,-7-3 2-15,-4 1 1 16,-6-5 2-16,-2 0 2 16,-4-3 1-16,1 1 2 15,-4-1-2-15,0 0-3 16,0 0-4-16,0 1-3 15,0 0-4-15,1 0-103 16,12 3-135-16,20 11 11 16</inkml:trace>
@@ -566,7 +721,7 @@
   </inkml:definitions>
   <inkml:trace contextRef="#ctx0" brushRef="#br0">7020 10575 552 0,'1'-14'134'0,"-7"4"64"16,2 2-164-16,0 1-5 16,5 0-7-16,2 0-14 15,4-2-16-15,4 0-4 16,1 2 1-16,4-6 2 16,3 3 2-16,4-5 1 15,0-4 5-15,10-7-2 16,-2-4 2-16,6-9-1 15,-2 1 0-15,10-10-1 16,-3 6 0-16,11-6-2 16,-1 5 1-16,12-12 0 15,-5 7-2-15,10-11 1 0,-8 4 2 16,5-7 3-16,-12 9 3 16,5-3 16-16,-10 14 7 15,-7 2 7-15,-9 15 2 16,-8 4 13-16,-9 9-6 15,-6 5 9-15,-5 2-1 16,-2 2 7-16,-4-1-10 16,1 4-2-16,0 0-11 15,0-1 0-15,-1 1-10 0,1 0-6 16,0 0-7-16,0 0-10 16,-1 0-15-16,1 0-61 15,0 0-32-15,0 0-34 16,0 0-40-16,2 1-98 15,27 15 46-15</inkml:trace>
   <inkml:trace contextRef="#ctx0" brushRef="#br0" timeOffset="747.93">6792 12383 646 0,'-13'17'175'16,"5"-16"49"-16,2-2-178 0,4 2-40 15,2-1-26-15,0 0-14 16,0-1-6-16,1 0 2 16,6-1 3-16,17-10 25 15,43-29 3-15,-35 10 1 16,12-10-1-16,-3 1 3 16,10-6-2-16,-7 3 3 15,8-4 0-15,-7 7 2 0,4-3-2 16,-4 7 2-16,7-2-1 15,-6 2 1-15,7-1 0 16,-9 4 3-16,3-2-2 16,-7 7 2-16,-2 1 0 15,-12 6 0-15,-2 4-1 16,-7 6 2-16,-4 0-1 16,-5 5-1-16,1 4-6 15,-3 1-16-15,1 3-49 16,0 3-31-16,1 6-78 15,2 8-26-15</inkml:trace>
-  <inkml:trace contextRef="#ctx0" brushRef="#br0" timeOffset="1303.674">6616 14609 1042 0,'-5'31'249'0,"-4"-12"79"15,-3-16-301-15,7 1-63 16,9-4-21-16,5-5-1 16,5-2 4-16,8-10 5 15,8-5 30-15,10-10 16 16,3-2 2-16,6-7 0 16,0 4 0-16,1-5 1 15,-7 9 1-15,1-4 1 16,-8 9 2-16,-3-2 0 15,-5 7 0-15,-4 3-1 16,-8 6-1-16,-1 2-2 16,-6 8 1-16,-5-1 1 15,-2 3 4-15,0 3 12 0,-3-1 8 16,0 0 16-16,0 0 5 16,0 0 10-16,-1 0-5 15,1 0 2-15,0 0-9 16,1 0 7-16,-1 0-7 15,1 0 1-15,-1 0-4 16,1 0-15-16,0 0-17 16,0 0-34-16,0 0-39 0,0 0-165 15,0 0-164-15,1-1-25 16</inkml:trace>
+  <inkml:trace contextRef="#ctx0" brushRef="#br0" timeOffset="1303.672">6616 14609 1042 0,'-5'31'249'0,"-4"-12"79"15,-3-16-301-15,7 1-63 16,9-4-21-16,5-5-1 16,5-2 4-16,8-10 5 15,8-5 30-15,10-10 16 16,3-2 2-16,6-7 0 16,0 4 0-16,1-5 1 15,-7 9 1-15,1-4 1 16,-8 9 2-16,-3-2 0 15,-5 7 0-15,-4 3-1 16,-8 6-1-16,-1 2-2 16,-6 8 1-16,-5-1 1 15,-2 3 4-15,0 3 12 0,-3-1 8 16,0 0 16-16,0 0 5 16,0 0 10-16,-1 0-5 15,1 0 2-15,0 0-9 16,1 0 7-16,-1 0-7 15,1 0 1-15,-1 0-4 16,1 0-15-16,0 0-17 16,0 0-34-16,0 0-39 0,0 0-165 15,0 0-164-15,1-1-25 16</inkml:trace>
   <inkml:trace contextRef="#ctx0" brushRef="#br0" timeOffset="5624.155">11795 7898 172 0,'15'12'51'15,"26"28"10"-15,-24-16-43 16,1 8-22-16,10 12 1 16,2 3 1-16,8 14-1 15,2 1-1-15,13 18 0 16,-1-3 1-16,14 15 0 16,-3-4 1-16,6 15 1 0,-6-9-2 15,7 13 3-15,-7-9 1 16,13 18-2-16,-2-11-1 15,16 19 3-15,-7-7-2 16,19 29 2-16,-13-12 0 16,18 21 2-16,-13-13-1 15,11 14 2-15,-15-26-2 0,6 0 1 16,-17-26-1 0,3 2 0-16,-16-19-1 0,4 2 0 15,-16-16 0-15,3 6-28 16,-8-15-10-16,1-8-21 15,-14-17-23-15</inkml:trace>
   <inkml:trace contextRef="#ctx0" brushRef="#br0" timeOffset="6699.149">11899 7927 950 0,'-26'-1'165'0,"7"-12"106"16,2-6-292-16,5 4 10 0,2-10-10 16,4-1-5-16,5-12-15 15,6-6-10-15,6-18-6 16,4-5 8-16,8-29 7 16,2 2 15-16,5-27 10 15,-3-1 11-15,14-23 5 16,0 15 1-16,13-28 0 15,3 15-1-15,24-15-1 16,-4 15 0-16,25-27-20 16,-2 24-20-16,27-23-25 15,-8 16-10-15,21-11-19 16,-11 24 13-16,12-12 21 16,-19 30 27-16,5 1 8 15,-21 22 22-15,4 8 7 16,-22 24 0-16,-1 8 0 0,-16 18 2 15,1 11 0-15,-17 15-2 16,4 14 0-16,-6 17 0 16,9 21-4-16,-5 9 0 15,6 25-1-15,-1 10 0 16,12 32-1-16,-6 0 1 16,19 38 2-16,-2 2-2 15,12 32 1-15,-7-14 2 16,18 33 0-16,-11-16-1 15,15 26 2-15,-10-25-2 0,15 24 1 16,-11-25-1-16,14 21 2 16,-14-33-2-16,17 25 3 15,-13-25-2-15,4 16 2 16,-14-27-1-16,12 22 1 16,-16-31 0-16,5 6 1 15,-14-21-1-15,0 5-31 16,-20-30 82-16,-3 2 0 15,-18-28-1-15,-4-7 1 16,-12-23 31-16,-2-4-81 16,-7-15-1-16,-5 1 2 15,-5-10 1-15,-7-3 7 16,-6-6 4-16,-12 1 11 16,-9-4 1-16,-17 4 9 15,-3 1-5-15,-17 5-1 0,-3-1-10 16,-24 10-4-16,-1 0-10 15,-19 14-2-15,-1 0-5 16,-20 12 0-16,10-5 0 16,-16 16-3-16,7-3 1 15,-14 15 2-15,16-6-1 16,-6 9 2-16,13-12 2 16,-3 1 1-16,21-14-1 0,-5 9-1 15,16-7 1-15,2 7 0 16,15-13-2-16,-4 4 0 15,16-12 1-15,-1 0 0 16,14-13 0-16,1 1 0 16,14-8-2-16,6-6-1 15,9-11-3-15,4-1-45 16,3-6-46-16,5 1-113 16,-2-6-22-16</inkml:trace>
   <inkml:trace contextRef="#ctx0" brushRef="#br0" timeOffset="7125.755">13840 10986 812 0,'6'0'180'15,"-6"-4"47"-15,3 4-230 16,-3-1-62-16,0 1 9 0,0 0 10 16,2 2 20-16,11 28 9 15,51 42 16-15,-27-30 1 16,3-5-1-16,6 4 1 16,-1-8-1-16,8-7-1 15,-4-14-1-15,4-9-2 16,-2-13 1-16,9-19 1 15,-5-9 2-15,8-17 2 16,-4-4 3-16,7-12 3 16,-10 3-3-16,2-9 4 15,-13 15-2-15,-4 4-1 16,-13 14-3-16,-6 9 5 16,-10 20-2-16,-5 4 6 15,-3 6 3-15,-5 4-2 16,1 1-8-16,-2 0-109 15,1 0-112-15,0 1-8 16</inkml:trace>
@@ -591,13 +746,13 @@
   <inkml:trace contextRef="#ctx0" brushRef="#br0" timeOffset="33503.915">20496 4115 916 0,'16'7'-15'0,"-2"6"178"16,-12 5-266-16,8 20-18 16,2 14 94-16,5 32 27 15,-2 17-1-15,8 39-2 16,-1 1-1-16,9 45 1 0,2-7 0 15,8 40-2 1,2-14 3-16,12 46 0 0,-4-19 0 16,8 45 1-16,-2-26 0 15,4 51 1-15,-4-26 0 16,11 38 1-16,-5-31 1 16,9 35 2-16,-9-46 1 15,5 19 1-15,-15-49-5 0,2 2-39 16,-13-55-35-16,-2-10-89 15,-10-51-21-15</inkml:trace>
   <inkml:trace contextRef="#ctx0" brushRef="#br0" timeOffset="33895.901">20339 3448 1147 0,'-1'-1'125'0,"-11"15"126"16,-2 26-349-16,-4 17 1 15,-12 35 16-15,-2 16 67 16,2 30 7-16,4-8 4 16,0 13-1-16,10-16 2 0,-2 14 0 15,3-24 1-15,3 4-1 16,6-22-15-16,0-4-54 15,6-29-39-15,3-8-115 16,0-23-17-16,4-16-55 16</inkml:trace>
   <inkml:trace contextRef="#ctx0" brushRef="#br0" timeOffset="34087.008">20676 3826 581 0,'92'-12'53'15,"12"7"88"1,4 7-176-16,36 19-18 16,-8 22 5-16,13 39-95 0,-15 25 6 15</inkml:trace>
-  <inkml:trace contextRef="#ctx0" brushRef="#br0" timeOffset="34596.693">15873 7106 628 0,'25'-10'91'16,"22"-27"80"-16,16-16-191 16,29-27 3-16,7-1 14 0,42-34 0 15,-8 1 1 1,30-24-2-16,-2-4 4 0,28-32 0 15,-27 18 1-15,22-19-2 16,-22 13 3-16,6-3-3 16,-22 23 2-16,13-18 1 15,-25 25-2-15,10-14 3 16,-19 19-1-16,3-8-2 16,-26 27-8-16,-4 5-81 15,-27 35-81-15,-17 13-9 16</inkml:trace>
+  <inkml:trace contextRef="#ctx0" brushRef="#br0" timeOffset="34596.691">15873 7106 628 0,'25'-10'91'16,"22"-27"80"-16,16-16-191 16,29-27 3-16,7-1 14 0,42-34 0 15,-8 1 1 1,30-24-2-16,-2-4 4 0,28-32 0 15,-27 18 1-15,22-19-2 16,-22 13 3-16,6-3-3 16,-22 23 2-16,13-18 1 15,-25 25-2-15,10-14 3 16,-19 19-1-16,3-8-2 16,-26 27-8-16,-4 5-81 15,-27 35-81-15,-17 13-9 16</inkml:trace>
   <inkml:trace contextRef="#ctx0" brushRef="#br0" timeOffset="34949.678">17669 4774 680 0,'-28'12'129'15,"11"-7"7"-15,10-6-228 16,9 0-24-16,11-4 10 16,18-7 4-16,11-12 66 15,26-17 33-15,11-5 16 16,26-15 3-16,-1-2-2 16,23-3-1-16,-9 13-3 15,14 4-5-15,-18 14-2 0,10 9-3 16,-22 14 0-16,4 10 0 15,-22 14 2-15,3 18 3 16,-22 14 3-16,-2 31 1 16,-21 13 1-16,-16 35-1 15,-19 9-2-15,-21 35-14 16,-17-9-108-16,-14 38-8 16,1-19-47-16</inkml:trace>
-  <inkml:trace contextRef="#ctx0" brushRef="#br0" timeOffset="36178.767">20816 1566 844 0,'-114'9'178'16,"20"-8"76"-16,-23 9-249 16,10 16-63-16,-11 20 10 15,4 1 3-15,-16 17 1 16,16 1 23-16,-11 12 6 15,12-5 12-15,-10 18 0 16,19-8-1-16,-2 13 1 16,17-12 0-16,-3 13-2 15,18-9 2-15,-1 14-1 16,15-18 0-16,-3 15-1 16,16-12-1-16,6 16-2 15,14-9-1-15,1 26-7 16,17-8-16-16,16 20-36 15,10-17-5-15,21 0-3 0,13-24 3 16,23-4 9-16,0-33 36 16,21-13 2-16,-2-22 5 15,24-15 4-15,-5-20 10 16,29-20 3-16,-3-12 6 16,29-27 0-16,-9-8 0 15,30-26 2-15,-17 7-3 16,19-32 4-16,-25 13 3 15,11-23 27-15,-28 9 8 0,8-32 17 16,-33 21 4-16,-2-22 12 16,-30 21-18-16,-16-4 32 15,-31 42-7-15,-19 0 22 16,-19 31-14-16,-22 0-11 16,-10 17-33-16,-21-14-41 15,-8 13-33-15,-33-3 0 16,-8 16 1-16,-28 8-6 15,-4 11 32-15,-32 4 3 16,10 13 0-16,-41 18-3 16,7 15-2-16,-33 27-3 15,24 12-2-15,-20 39-3 16,43 1 3-16,-20 27-16 16,27 14-12-16,-21 40-13 15,23-11 0-15,-16 29 1 0,33-22 13 16,-2 10 15-16,37-33 17 15,7 6-1-15,33-34-1 16,16 10-1-16,35-28-31 16,19 2-4-16,23-22 1 15,26-4 0-15,17-25 1 16,36-13 27-16,16-27 4 16,45-25 1-16,5-21 2 0,46-36 3 15,-9-23 3-15,41-32 0 16,-26-10-1-16,40-39 0 15,-30 8 1-15,28-30-2 16,-38 13 0-16,12-14 1 16,-48 22 1-16,-6-6 1 15,-54 42 10-15,-25-2 50 16,-42 31 22-16,-27 8 50 16,-34 25 5-16,-23-3-11 15,-21 15-54-15,-47 10-46 16,-20 16-56-16,-55 16-15 15,-15 21 7-15,-50 21-1 16,14 13 23-16,-48 40 0 16,34 11 4-16,-39 26-58 15,45 14-35-15,-20 32-146 16,53-14-16-16</inkml:trace>
-  <inkml:trace contextRef="#ctx0" brushRef="#br0" timeOffset="41717.561">23476 834 749 0,'-65'55'110'0,"31"-36"90"0,-7 15-238 16,-16 22-1-16,-4 3 15 16,-12 22 2-16,7-8 3 15,-3 10 9-15,15-14 6 16,0 1 0-16,11-13 0 16,6-1-1-16,11-10 0 15,5 16-1-15,11-4 0 16,8 10-1-16,9-5 2 0,13 5 2 15,6-18 0-15,16-3 1 16,6-14-1-16,25-13 1 16,5-15 1-16,31-15 1 15,1-16 1-15,25-29 4 16,-2-12 1-16,21-38-1 16,-12-6-1-16,23-35 0 15,-14 3-3-15,7-24 2 16,-25 27 8-16,-7-7 25 15,-37 25 8-15,-22-5 13 16,-30 29 16-16,-23 7-2 16,-23 9-24-16,-30 2-10 15,-31 26-16-15,-46 13-30 16,-25 13-12-16,-47 28-5 16,-23 22-6-16,-60 14-171 15,-3 27-39-15,-70 22-45 0</inkml:trace>
+  <inkml:trace contextRef="#ctx0" brushRef="#br0" timeOffset="36178.765">20816 1566 844 0,'-114'9'178'16,"20"-8"76"-16,-23 9-249 16,10 16-63-16,-11 20 10 15,4 1 3-15,-16 17 1 16,16 1 23-16,-11 12 6 15,12-5 12-15,-10 18 0 16,19-8-1-16,-2 13 1 16,17-12 0-16,-3 13-2 15,18-9 2-15,-1 14-1 16,15-18 0-16,-3 15-1 16,16-12-1-16,6 16-2 15,14-9-1-15,1 26-7 16,17-8-16-16,16 20-36 15,10-17-5-15,21 0-3 0,13-24 3 16,23-4 9-16,0-33 36 16,21-13 2-16,-2-22 5 15,24-15 4-15,-5-20 10 16,29-20 3-16,-3-12 6 16,29-27 0-16,-9-8 0 15,30-26 2-15,-17 7-3 16,19-32 4-16,-25 13 3 15,11-23 27-15,-28 9 8 0,8-32 17 16,-33 21 4-16,-2-22 12 16,-30 21-18-16,-16-4 32 15,-31 42-7-15,-19 0 22 16,-19 31-14-16,-22 0-11 16,-10 17-33-16,-21-14-41 15,-8 13-33-15,-33-3 0 16,-8 16 1-16,-28 8-6 15,-4 11 32-15,-32 4 3 16,10 13 0-16,-41 18-3 16,7 15-2-16,-33 27-3 15,24 12-2-15,-20 39-3 16,43 1 3-16,-20 27-16 16,27 14-12-16,-21 40-13 15,23-11 0-15,-16 29 1 0,33-22 13 16,-2 10 15-16,37-33 17 15,7 6-1-15,33-34-1 16,16 10-1-16,35-28-31 16,19 2-4-16,23-22 1 15,26-4 0-15,17-25 1 16,36-13 27-16,16-27 4 16,45-25 1-16,5-21 2 0,46-36 3 15,-9-23 3-15,41-32 0 16,-26-10-1-16,40-39 0 15,-30 8 1-15,28-30-2 16,-38 13 0-16,12-14 1 16,-48 22 1-16,-6-6 1 15,-54 42 10-15,-25-2 50 16,-42 31 22-16,-27 8 50 16,-34 25 5-16,-23-3-11 15,-21 15-54-15,-47 10-46 16,-20 16-56-16,-55 16-15 15,-15 21 7-15,-50 21-1 16,14 13 23-16,-48 40 0 16,34 11 4-16,-39 26-58 15,45 14-35-15,-20 32-146 16,53-14-16-16</inkml:trace>
+  <inkml:trace contextRef="#ctx0" brushRef="#br0" timeOffset="41717.56">23476 834 749 0,'-65'55'110'0,"31"-36"90"0,-7 15-238 16,-16 22-1-16,-4 3 15 16,-12 22 2-16,7-8 3 15,-3 10 9-15,15-14 6 16,0 1 0-16,11-13 0 16,6-1-1-16,11-10 0 15,5 16-1-15,11-4 0 16,8 10-1-16,9-5 2 0,13 5 2 15,6-18 0-15,16-3 1 16,6-14-1-16,25-13 1 16,5-15 1-16,31-15 1 15,1-16 1-15,25-29 4 16,-2-12 1-16,21-38-1 16,-12-6-1-16,23-35 0 15,-14 3-3-15,7-24 2 16,-25 27 8-16,-7-7 25 15,-37 25 8-15,-22-5 13 16,-30 29 16-16,-23 7-2 16,-23 9-24-16,-30 2-10 15,-31 26-16-15,-46 13-30 16,-25 13-12-16,-47 28-5 16,-23 22-6-16,-60 14-171 15,-3 27-39-15,-70 22-45 0</inkml:trace>
   <inkml:trace contextRef="#ctx0" brushRef="#br0" timeOffset="42509.159">16006 1440 985 0,'-12'-20'112'16,"-3"10"130"-16,3 9-323 15,-4 4-28-15,2 18 39 0,-6 12 2 16,-2 7 9-16,-5 15 27 16,6 3 28-16,2 7 0 15,4-7 0-15,3 10-1 16,5-7 1-16,6 12-3 15,7-5 1-15,12 21-2 16,5-8 2-16,15 9 0 16,6-11 2-16,20-2 0 15,3-25 2-15,19-7-2 16,2-22 1-16,22-17-1 16,-7-19 1-16,19-19 2 15,-15-13 4-15,11-27 1 16,-20-7 6-16,8-26 9 15,-25 3 31-15,-8-20 16 16,-17 9 9-16,-10-10 8 16,-24 16 19-16,-18-2-26 0,-14 16-16 15,-19 1-6-15,-16 21-12 16,-26 8-29-16,-8 11-8 16,-23 19-4-16,-9 18-8 15,-34 25-6-15,3 24-3 16,-31 31-30-16,-2 18-26 15,-23 36-88-15,27 1-129 16,-2 24-10-16</inkml:trace>
-  <inkml:trace contextRef="#ctx0" brushRef="#br0" timeOffset="46362.795">6842 14922 873 0,'-9'-6'222'0,"0"-1"67"16,2 5-241-16,-1-1-46 15,8 4-6-15,-1-1-23 16,1 0-15-16,0 0-8 15,0 0 2-15,0-1 4 16,0 0 24-16,1 0 10 16,3-2 9-16,20-2 1 15,34-52-2-15,-25 27-1 16,1-5 0-16,12-13-1 16,-4-3 2-16,11-13 0 15,-5 4 2-15,5-8 0 16,-9 11 1-16,2 0-1 0,-10 14 1 15,-1 3 0-15,-9 12 2 16,-3 5 0-16,-8 9 1 16,-2 4 2-16,-9 3 4 15,0 4 15-15,-4 3 8 16,0 0 9-16,0 0-1 16,-1 0-5-16,1 0-18 0,-1 0-24 15,1 0-136-15,1 0-141 16,6 1-11-16</inkml:trace>
-  <inkml:trace contextRef="#ctx0" brushRef="#br0" timeOffset="52621.731">23508 11486 916 0,'-8'1'176'16,"2"3"86"-16,3-1-280 15,1 5-8-15,2 5 4 16,0 9-1-16,3 3 9 16,0 12 4-16,4 3 7 0,1 10 0 15,4 0 2-15,1 8-2 16,-1-6 2-16,2 12-1 15,1-3 0-15,6 7-1 16,1-3 2-16,12 16-2 16,6-12 2-16,10 5-2 15,-1-15-1-15,6-7-2 16,-6-17 1-16,0-8-3 16,-11-15 0-16,9-7-6 15,-7-7 3-15,6-13-60 16,-6-6-51-16,4-14-111 15,-12-8-34-15</inkml:trace>
+  <inkml:trace contextRef="#ctx0" brushRef="#br0" timeOffset="46362.793">6842 14922 873 0,'-9'-6'222'0,"0"-1"67"16,2 5-241-16,-1-1-46 15,8 4-6-15,-1-1-23 16,1 0-15-16,0 0-8 15,0 0 2-15,0-1 4 16,0 0 24-16,1 0 10 16,3-2 9-16,20-2 1 15,34-52-2-15,-25 27-1 16,1-5 0-16,12-13-1 16,-4-3 2-16,11-13 0 15,-5 4 2-15,5-8 0 16,-9 11 1-16,2 0-1 0,-10 14 1 15,-1 3 0-15,-9 12 2 16,-3 5 0-16,-8 9 1 16,-2 4 2-16,-9 3 4 15,0 4 15-15,-4 3 8 16,0 0 9-16,0 0-1 16,-1 0-5-16,1 0-18 0,-1 0-24 15,1 0-136-15,1 0-141 16,6 1-11-16</inkml:trace>
+  <inkml:trace contextRef="#ctx0" brushRef="#br0" timeOffset="52621.729">23508 11486 916 0,'-8'1'176'16,"2"3"86"-16,3-1-280 15,1 5-8-15,2 5 4 16,0 9-1-16,3 3 9 16,0 12 4-16,4 3 7 0,1 10 0 15,4 0 2-15,1 8-2 16,-1-6 2-16,2 12-1 15,1-3 0-15,6 7-1 16,1-3 2-16,12 16-2 16,6-12 2-16,10 5-2 15,-1-15-1-15,6-7-2 16,-6-17 1-16,0-8-3 16,-11-15 0-16,9-7-6 15,-7-7 3-15,6-13-60 16,-6-6-51-16,4-14-111 15,-12-8-34-15</inkml:trace>
   <inkml:trace contextRef="#ctx0" brushRef="#br0" timeOffset="53073.965">23573 11548 960 0,'-3'-7'169'0,"6"0"100"16,1-1-285-16,9-9-9 16,5-4 14-16,14-9 0 15,4-1 4-15,15-11 0 16,1 2 2-16,13-6-1 15,-7 2 3-15,10 1 0 16,-11 10 1-16,9 6-4 16,-14 12-1-16,5 11-3 15,-11 12-1-15,5 11 0 16,-7 4 2-16,8 13 3 16,-8 5 2-16,3 10-2 15,-8 1 0-15,-4 11 0 16,-12 0 0-16,-6 15 2 15,-9-1 4-15,-9 14 3 0,-8-4 1 16,-9 11 3-16,-2-15 1 16,-9 10-1-16,1-10-1 15,-9 9-13-15,3-12-29 16,-13 8-167-16,-4-14-48 16,-15-6-66-16</inkml:trace>
   <inkml:trace contextRef="#ctx0" brushRef="#br0" timeOffset="54651.472">22028 10066 826 0,'-1'-7'289'0,"-2"3"4"16,14 11-189-16,-11-3-177 15,3-1 6-15,3 16 6 16,6 6 14-16,6 21 10 16,3 5 36-16,4 15 0 15,-2-5 1-15,3 3 0 16,-7-18 2-16,0 0-1 0,-8-14 1 15,-2-11 1 1,-4-10 1-16,-2 0 4 0,-4-10-1 16,1-1-3-16,-2-6-7 15,1 3-58-15,-11-29-8 16,-17-69 4-16,10 20 7 16,-2-14 25-16,3 7 56 15,0-14 8-15,6 12-3 16,6-8 6-16,5 9-16 15,10 2 2-15,7 21-3 0,5 7-1 16,-3 17-8-16,4 4-5 16,-3 16-3-16,0 6-2 15,-1 9-1-15,3 15-1 16,2 10 0-16,9 13 2 16,-1 13 1-16,4 16 1 15,-3 2 1-15,8 19-1 16,-4-1 0-16,5 9 0 15,-2-10-2-15,11 7-66 16,-10-15-61-16,4 9-101 16,-5-14-54-16</inkml:trace>
   <inkml:trace contextRef="#ctx0" brushRef="#br0" timeOffset="54885.019">22119 10282 1145 0,'11'-11'180'0,"18"-28"132"16,12-14-379-16,26-26-165 15,9-12-87-15,5-17-54 16</inkml:trace>
@@ -605,7 +760,7 @@
   <inkml:trace contextRef="#ctx0" brushRef="#br0" timeOffset="56452.182">22774 9698 1077 0,'-3'-1'120'16,"-6"0"125"-16,0-1-362 16,4 1-24-16,3 0 34 15,0 0 0-15,1-1 33 16,1-4 28-16,10-17 46 15,41-42 6-15,-18 40 1 16,-1-2 5-16,-6 14 0 16,-3-1 0-16,-7 9-3 0,0 7-2 15,-1 10-7-15,-3 9-1 16,-3 12 1-16,-4 18 0 16,-7 8 0-16,-5 12 1 15,1-4 2-15,-5 0 5 16,2-16 2-16,1-16 2 15,3-16 1-15,4-5-2 16,7-12 0-16,13-15 13 16,11-6 2-16,27-29-3 15,12-27 1-15,24-28-49 16,2-16-72-16,20-37-124 16,-13 5-21-16</inkml:trace>
   <inkml:trace contextRef="#ctx0" brushRef="#br0" timeOffset="57062.928">26199 4507 1495 0,'21'-4'219'0,"-17"1"126"16,-5 1-487-16,0 12-8 16,1 6 29-16,-1 27 12 15,0 8 56-15,1 21 34 16,-3-3 19-16,2 8 0 15,2-18 0-15,1-5 2 16,-4-17-2-16,2-10 6 16,2-15 4-16,-5-6 7 15,3-6 5-15,0-1 3 16,0 1-5-16,-1 0-4 16,1-1-8-16,-1 0 14 0,0-2-95 15,-4-27 4-15,-9-58 2 16,11 2 5-16,3-11-20 15,7-16 100-15,4 14 2 16,2-7 14-16,1 23 2 16,2 4 2-16,-2 23-6 15,2 4-9-15,2 19-20 16,-3 8-1-16,-5 13-25 16,-1 6-15-16,-2 9 5 15,9 12 3-15,6 10-5 0,10 18 23 16,6 12 15-16,6 18-4 15,-7-2 0-15,3 20 0 16,-3-4 1-16,-1 7-11 16,-9-11-26-16,1 9-104 15,-6-19-65-15,-5 6-53 16,-9-17-97-16</inkml:trace>
   <inkml:trace contextRef="#ctx0" brushRef="#br0" timeOffset="57256.487">26417 4708 1000 0,'8'-12'168'15,"10"-24"67"-15,5-8-297 16,13-18-105-16,9-10-124 15,12-16 30-15,-3 14-98 16</inkml:trace>
-  <inkml:trace contextRef="#ctx0" brushRef="#br0" timeOffset="57642.563">26838 4048 548 0,'0'-3'125'0,"-2"3"6"16,2 0-189-16,0 0-14 15,0 0-13-15,0 2 13 16,4 6 36-16,10 29 27 15,9 39 16-15,-15-26 2 16,-1-1-2-16,-1 6 1 16,-1-10 1-16,-1 3 0 15,-1-6 0-15,0-3 3 16,-2-9-2-16,-2-2 4 16,1-11 5-16,-2-5 24 15,2-5 3-15,-1-4 11 16,1-3 1-16,0-1 9 15,0 0-21-15,0 0-4 16,0-1-13-16,1 1-6 0,2-1-18 16,23-4-7-16,41-41-1 15,-21 38-2-15,-2 8-1 16,7 7-2-16,-6 12 0 16,0 8-6-16,-14 7-1 15,-9 10-6-15,-20-2 4 16,-27 13 0-16,-25 1 1 15,-50 18-54-15,-21 2-95 16,-53 23-8-16,-9-11-88 16</inkml:trace>
+  <inkml:trace contextRef="#ctx0" brushRef="#br0" timeOffset="57642.562">26838 4048 548 0,'0'-3'125'0,"-2"3"6"16,2 0-189-16,0 0-14 15,0 0-13-15,0 2 13 16,4 6 36-16,10 29 27 15,9 39 16-15,-15-26 2 16,-1-1-2-16,-1 6 1 16,-1-10 1-16,-1 3 0 15,-1-6 0-15,0-3 3 16,-2-9-2-16,-2-2 4 16,1-11 5-16,-2-5 24 15,2-5 3-15,-1-4 11 16,1-3 1-16,0-1 9 15,0 0-21-15,0 0-4 16,0-1-13-16,1 1-6 0,2-1-18 16,23-4-7-16,41-41-1 15,-21 38-2-15,-2 8-1 16,7 7-2-16,-6 12 0 16,0 8-6-16,-14 7-1 15,-9 10-6-15,-20-2 4 16,-27 13 0-16,-25 1 1 15,-50 18-54-15,-21 2-95 16,-53 23-8-16,-9-11-88 16</inkml:trace>
   <inkml:trace contextRef="#ctx0" brushRef="#br0" timeOffset="71246.626">6609 14850 380 0,'-5'10'83'0,"-7"-8"24"0,12-4-112 15,8-1-7-15,7-9 4 16,6-7 12-16,10-16 20 15,2-7 8-15,8-22 7 16,0-6-2-16,10-18 2 16,0 3-8-16,10-19 1 15,-5 5-7-15,8-6-1 16,-9 13-8-16,0-3-4 16,-11 26-7-16,1 1-3 15,-9 14-8-15,1 6-39 16,-6 10-30-16,2 4-98 15,-5 16-15-15</inkml:trace>
   <inkml:trace contextRef="#ctx0" brushRef="#br0" timeOffset="71588.614">6823 14973 777 0,'5'-13'128'16,"13"-12"92"-16,4-9-234 0,17-13-2 15,9-11 15-15,12-19-2 16,2 1 2-16,12-22-1 15,-9 5 3-15,4-8-1 16,-10 12 0-16,0 3-2 16,-16 25 2-16,-1-2-2 15,-12 23 1-15,-2 5-3 16,-11 15-9-16,-1 1-75 16,-1 9-58-16,5 2-71 15,-4 5-66-15</inkml:trace>
   <inkml:trace contextRef="#ctx0" brushRef="#br0" timeOffset="83639.915">7371 10650 630 0,'-3'5'182'0,"-5"-7"37"16,0 0-160-16,7 1-54 16,4-5-8-16,4 0-2 15,12-14-1-15,8-3-7 16,17-13 3-16,6-5 4 15,10-17 3-15,-3 3 0 0,8-12 4 16,-13 3 0-16,6-4 2 16,-2 11-1-16,4-6 0 15,-7 7 0-15,3-6-1 16,-9 10-1-16,1-1 2 16,-13 7-1-16,0 9 0 15,-11 9-2-15,-4 6-18 16,-10 11-37-16,-4 5-99 15,-4 5-30-15,-4 11-27 16,-4 9-81-16</inkml:trace>
@@ -649,7 +804,7 @@
   <inkml:trace contextRef="#ctx0" brushRef="#br0" timeOffset="51051.006">6956 12875 424 0,'3'3'129'16,"-6"-2"19"-16,3-1-116 15,0 0-48-15,0 0-2 16,0 0 1-16,0 0 0 16,2 0 10-16,1 0 6 15,12 2-1-15,3 1 1 0,35 9 0 16,-27-6-1-16,-1-4 2 15,5-1-1-15,0 3 0 16,8 0 1-16,-1-3-1 16,9 3 1-16,-1 2-1 15,13-2 2-15,-5 1-1 16,10-1 1-16,-3-4 0 16,11-1 1-16,-9-2 0 15,12-2 1-15,-8 1-1 16,11-2 0-16,-12 4 0 15,7-2-1-15,-10 2 0 0,6 0 0 16,-13 0 0-16,8 5 1 16,-10-3-1-16,-2 2 0 15,-10-1-1-15,2 3 1 16,-15-6 0-16,0 6 2 16,-12-3 0-16,-2 3 3 15,-8-4 4-15,-3 3 33 16,-5-4 8-16,2 1 5 15,0 0-4-15,0 0-5 16,0 0-39-16,0 0-88 16,0 0-65-16,0 0-49 15,0 0-81-15</inkml:trace>
   <inkml:trace contextRef="#ctx0" brushRef="#br0" timeOffset="51461.059">7864 13387 890 0,'1'-1'172'0,"0"-1"65"15,7-4-261-15,13 1-12 16,8-3 2-16,13 1-6 16,7-4 17-16,11 3-5 15,-5 0 2-15,8 2 0 16,-5-3 15-16,10 4 5 16,-11-1 5-16,4-1 1 15,-12-1 1-15,-3 1 2 16,-13-3 0-16,-5 2 5 15,-11 1 2-15,-2 0 8 16,-6 1 2-16,-5 4 3 16,1 1-2-16,-3 0 1 15,-2 0-8-15,0 1-4 16,0 0-9-16,0 0-84 0,0 0-159 16,0 0 20-16</inkml:trace>
   <inkml:trace contextRef="#ctx0" brushRef="#br0" timeOffset="57518.672">6295 15071 500 0,'-6'12'295'0,"-3"-6"-37"16,5-6-67-16,-4-1-134 16,6-1-23-16,1 1-14 15,1 1-21-15,0 0-48 16,0-1-16-16,0 0-3 16,1 0 4-16,31-7 12 15,43-18 33-15,-14 7 7 16,3 0 3-16,7-4 1 15,-5 3 2-15,6-6 4 16,-13 4 2-16,2-8 0 16,-7 5 2-16,6-6 0 15,-5 7-1-15,0-6 0 0,-7 5 1 16,1 0-3-16,-12 4-4 16,-5-1-26-16,-9 11-16 15,-7 2-32-15,-8 4 1 16,-2 2 10-16,-5 3 25 15,-5 0 36-15,2 0-116 16,0 0 56-16</inkml:trace>
-  <inkml:trace contextRef="#ctx0" brushRef="#br0" timeOffset="57813.297">6374 15112 750 0,'-4'7'74'0,"6"-7"73"16,7-4-231-16,15-4 13 15,7-2 16-15,24-9 31 16,9 0 22-16,16-8 0 16,-3 2 1-16,15-3-1 15,-5 6 2-15,7-1 2 16,-10 9-2-16,4-1 1 0,-15 5 0 15,-1 0 1-15,-15 0 1 16,0 0 1-16,-10 2 0 16,0-1 5-16,-10 0-52 15,10 2-107-15,-6 0 24 16</inkml:trace>
+  <inkml:trace contextRef="#ctx0" brushRef="#br0" timeOffset="57813.295">6374 15112 750 0,'-4'7'74'0,"6"-7"73"16,7-4-231-16,15-4 13 15,7-2 16-15,24-9 31 16,9 0 22-16,16-8 0 16,-3 2 1-16,15-3-1 15,-5 6 2-15,7-1 2 16,-10 9-2-16,4-1 1 0,-15 5 0 15,-1 0 1-15,-15 0 1 16,0 0 1-16,-10 2 0 16,0-1 5-16,-10 0-52 15,10 2-107-15,-6 0 24 16</inkml:trace>
 </inkml:ink>
 </file>
 
@@ -891,7 +1046,7 @@
           <a:p>
             <a:fld id="{ED291B17-9318-49DB-B28B-6E5994AE9581}" type="datetime1">
               <a:rPr lang="en-US" smtClean="0"/>
-              <a:t>1/19/2020</a:t>
+              <a:t>1/22/2020</a:t>
             </a:fld>
             <a:endParaRPr lang="en-US" dirty="0"/>
           </a:p>
@@ -1094,7 +1249,7 @@
           <a:p>
             <a:fld id="{2CED4963-E985-44C4-B8C4-FDD613B7C2F8}" type="datetime1">
               <a:rPr lang="en-US" smtClean="0"/>
-              <a:t>1/19/2020</a:t>
+              <a:t>1/22/2020</a:t>
             </a:fld>
             <a:endParaRPr lang="en-US" dirty="0"/>
           </a:p>
@@ -1456,7 +1611,7 @@
           <a:p>
             <a:fld id="{ED291B17-9318-49DB-B28B-6E5994AE9581}" type="datetime1">
               <a:rPr lang="en-US" smtClean="0"/>
-              <a:t>1/19/2020</a:t>
+              <a:t>1/22/2020</a:t>
             </a:fld>
             <a:endParaRPr lang="en-US" dirty="0"/>
           </a:p>
@@ -1654,7 +1809,7 @@
           <a:p>
             <a:fld id="{78DD82B9-B8EE-4375-B6FF-88FA6ABB15D9}" type="datetime1">
               <a:rPr lang="en-US" smtClean="0"/>
-              <a:t>1/19/2020</a:t>
+              <a:t>1/22/2020</a:t>
             </a:fld>
             <a:endParaRPr lang="en-US" dirty="0"/>
           </a:p>
@@ -1966,7 +2121,7 @@
           <a:p>
             <a:fld id="{B2497495-0637-405E-AE64-5CC7506D51F5}" type="datetime1">
               <a:rPr lang="en-US" smtClean="0"/>
-              <a:t>1/19/2020</a:t>
+              <a:t>1/22/2020</a:t>
             </a:fld>
             <a:endParaRPr lang="en-US" dirty="0"/>
           </a:p>
@@ -2219,7 +2374,7 @@
           <a:p>
             <a:fld id="{7BFFD690-9426-415D-8B65-26881E07B2D4}" type="datetime1">
               <a:rPr lang="en-US" smtClean="0"/>
-              <a:t>1/19/2020</a:t>
+              <a:t>1/22/2020</a:t>
             </a:fld>
             <a:endParaRPr lang="en-US" dirty="0"/>
           </a:p>
@@ -2641,7 +2796,7 @@
           <a:p>
             <a:fld id="{04C4989A-474C-40DE-95B9-011C28B71673}" type="datetime1">
               <a:rPr lang="en-US" smtClean="0"/>
-              <a:t>1/19/2020</a:t>
+              <a:t>1/22/2020</a:t>
             </a:fld>
             <a:endParaRPr lang="en-US" dirty="0"/>
           </a:p>
@@ -2764,7 +2919,7 @@
           <a:p>
             <a:fld id="{5DB4ED54-5B5E-4A04-93D3-5772E3CE3818}" type="datetime1">
               <a:rPr lang="en-US" smtClean="0"/>
-              <a:t>1/19/2020</a:t>
+              <a:t>1/22/2020</a:t>
             </a:fld>
             <a:endParaRPr lang="en-US" dirty="0"/>
           </a:p>
@@ -2859,7 +3014,7 @@
           <a:p>
             <a:fld id="{4EDE50D6-574B-40AF-946F-D52A04ADE379}" type="datetime1">
               <a:rPr lang="en-US" smtClean="0"/>
-              <a:t>1/19/2020</a:t>
+              <a:t>1/22/2020</a:t>
             </a:fld>
             <a:endParaRPr lang="en-US" dirty="0"/>
           </a:p>
@@ -3236,7 +3391,7 @@
           <a:p>
             <a:fld id="{D82884F1-FFEA-405F-9602-3DCA865EDA4E}" type="datetime1">
               <a:rPr lang="en-US" smtClean="0"/>
-              <a:t>1/19/2020</a:t>
+              <a:t>1/22/2020</a:t>
             </a:fld>
             <a:endParaRPr lang="en-US" dirty="0"/>
           </a:p>
@@ -3529,7 +3684,7 @@
           <a:p>
             <a:fld id="{7E18DB4A-8810-4A10-AD5C-D5E2C667F5B3}" type="datetime1">
               <a:rPr lang="en-US" smtClean="0"/>
-              <a:t>1/19/2020</a:t>
+              <a:t>1/22/2020</a:t>
             </a:fld>
             <a:endParaRPr lang="en-US" dirty="0"/>
           </a:p>
@@ -3744,7 +3899,7 @@
           <a:p>
             <a:fld id="{ED291B17-9318-49DB-B28B-6E5994AE9581}" type="datetime1">
               <a:rPr lang="en-US" smtClean="0"/>
-              <a:t>1/19/2020</a:t>
+              <a:t>1/22/2020</a:t>
             </a:fld>
             <a:endParaRPr lang="en-US" dirty="0"/>
           </a:p>
@@ -5204,8 +5359,8 @@
           </a:p>
         </p:txBody>
       </p:sp>
-      <mc:AlternateContent xmlns:mc="http://schemas.openxmlformats.org/markup-compatibility/2006">
-        <mc:Choice xmlns:p14="http://schemas.microsoft.com/office/powerpoint/2010/main" Requires="p14">
+      <mc:AlternateContent xmlns:mc="http://schemas.openxmlformats.org/markup-compatibility/2006" xmlns:p14="http://schemas.microsoft.com/office/powerpoint/2010/main">
+        <mc:Choice Requires="p14">
           <p:contentPart p14:bwMode="auto" r:id="rId5">
             <p14:nvContentPartPr>
               <p14:cNvPr id="9" name="Ink 8">
@@ -5224,7 +5379,7 @@
             </p14:xfrm>
           </p:contentPart>
         </mc:Choice>
-        <mc:Fallback>
+        <mc:Fallback xmlns="">
           <p:pic>
             <p:nvPicPr>
               <p:cNvPr id="9" name="Ink 8">
@@ -5373,8 +5528,8 @@
           </a:p>
         </p:txBody>
       </p:sp>
-      <mc:AlternateContent xmlns:mc="http://schemas.openxmlformats.org/markup-compatibility/2006">
-        <mc:Choice xmlns:p14="http://schemas.microsoft.com/office/powerpoint/2010/main" Requires="p14">
+      <mc:AlternateContent xmlns:mc="http://schemas.openxmlformats.org/markup-compatibility/2006" xmlns:p14="http://schemas.microsoft.com/office/powerpoint/2010/main">
+        <mc:Choice Requires="p14">
           <p:contentPart p14:bwMode="auto" r:id="rId3">
             <p14:nvContentPartPr>
               <p14:cNvPr id="4" name="Ink 3">
@@ -5393,7 +5548,7 @@
             </p14:xfrm>
           </p:contentPart>
         </mc:Choice>
-        <mc:Fallback>
+        <mc:Fallback xmlns="">
           <p:pic>
             <p:nvPicPr>
               <p:cNvPr id="4" name="Ink 3">
@@ -5600,8 +5755,8 @@
           </a:p>
         </p:txBody>
       </p:sp>
-      <mc:AlternateContent xmlns:mc="http://schemas.openxmlformats.org/markup-compatibility/2006">
-        <mc:Choice xmlns:p14="http://schemas.microsoft.com/office/powerpoint/2010/main" Requires="p14">
+      <mc:AlternateContent xmlns:mc="http://schemas.openxmlformats.org/markup-compatibility/2006" xmlns:p14="http://schemas.microsoft.com/office/powerpoint/2010/main">
+        <mc:Choice Requires="p14">
           <p:contentPart p14:bwMode="auto" r:id="rId2">
             <p14:nvContentPartPr>
               <p14:cNvPr id="3" name="Ink 2">
@@ -5620,7 +5775,7 @@
             </p14:xfrm>
           </p:contentPart>
         </mc:Choice>
-        <mc:Fallback>
+        <mc:Fallback xmlns="">
           <p:pic>
             <p:nvPicPr>
               <p:cNvPr id="3" name="Ink 2">
@@ -5667,6 +5822,14 @@
 <file path=ppt/slides/slide12.xml><?xml version="1.0" encoding="utf-8"?>
 <p:sld xmlns:a="http://schemas.openxmlformats.org/drawingml/2006/main" xmlns:r="http://schemas.openxmlformats.org/officeDocument/2006/relationships" xmlns:p="http://schemas.openxmlformats.org/presentationml/2006/main">
   <p:cSld>
+    <p:bg>
+      <p:bgPr>
+        <a:solidFill>
+          <a:schemeClr val="bg1"/>
+        </a:solidFill>
+        <a:effectLst/>
+      </p:bgPr>
+    </p:bg>
     <p:spTree>
       <p:nvGrpSpPr>
         <p:cNvPr id="1" name=""/>
@@ -5681,46 +5844,41 @@
           <a:chExt cx="0" cy="0"/>
         </a:xfrm>
       </p:grpSpPr>
-      <p:sp>
-        <p:nvSpPr>
-          <p:cNvPr id="2" name="Title 1">
+      <p:pic>
+        <p:nvPicPr>
+          <p:cNvPr id="4" name="Picture 3">
             <a:extLst>
               <a:ext uri="{FF2B5EF4-FFF2-40B4-BE49-F238E27FC236}">
-                <a16:creationId xmlns:a16="http://schemas.microsoft.com/office/drawing/2014/main" id="{2C90EF4B-60F8-4E42-8E9C-7E3252505BCB}"/>
+                <a16:creationId xmlns:a16="http://schemas.microsoft.com/office/drawing/2014/main" id="{ED027430-D330-4824-BEC9-C7722CC03754}"/>
               </a:ext>
             </a:extLst>
           </p:cNvPr>
-          <p:cNvSpPr>
-            <a:spLocks noGrp="1"/>
-          </p:cNvSpPr>
-          <p:nvPr>
-            <p:ph type="title"/>
-          </p:nvPr>
-        </p:nvSpPr>
-        <p:spPr>
-          <a:solidFill>
-            <a:schemeClr val="accent5">
-              <a:lumMod val="60000"/>
-              <a:lumOff val="40000"/>
-            </a:schemeClr>
-          </a:solidFill>
-        </p:spPr>
-        <p:txBody>
-          <a:bodyPr/>
-          <a:lstStyle/>
-          <a:p>
-            <a:endParaRPr lang="en-IN" dirty="0">
-              <a:latin typeface="Algerian" panose="04020705040A02060702" pitchFamily="82" charset="0"/>
-            </a:endParaRPr>
-          </a:p>
-        </p:txBody>
-      </p:sp>
-      <p:sp>
-        <p:nvSpPr>
-          <p:cNvPr id="3" name="Content Placeholder 2">
+          <p:cNvPicPr>
+            <a:picLocks noChangeAspect="1"/>
+          </p:cNvPicPr>
+          <p:nvPr/>
+        </p:nvPicPr>
+        <p:blipFill rotWithShape="1">
+          <a:blip r:embed="rId3"/>
+          <a:srcRect t="10340" b="18004"/>
+          <a:stretch/>
+        </p:blipFill>
+        <p:spPr>
+          <a:xfrm>
+            <a:off x="-1" y="0"/>
+            <a:ext cx="12192000" cy="6858000"/>
+          </a:xfrm>
+          <a:prstGeom prst="rect">
+            <a:avLst/>
+          </a:prstGeom>
+        </p:spPr>
+      </p:pic>
+      <p:sp>
+        <p:nvSpPr>
+          <p:cNvPr id="2" name="Title 1" hidden="1">
             <a:extLst>
               <a:ext uri="{FF2B5EF4-FFF2-40B4-BE49-F238E27FC236}">
-                <a16:creationId xmlns:a16="http://schemas.microsoft.com/office/drawing/2014/main" id="{3398CEA2-8BE4-4D46-8D1D-8045EA59B578}"/>
+                <a16:creationId xmlns:a16="http://schemas.microsoft.com/office/drawing/2014/main" id="{802BCF98-D5EF-48DF-8AED-8C5D0DF63A06}"/>
               </a:ext>
             </a:extLst>
           </p:cNvPr>
@@ -5728,38 +5886,797 @@
             <a:spLocks noGrp="1"/>
           </p:cNvSpPr>
           <p:nvPr>
-            <p:ph idx="1"/>
+            <p:ph type="ctrTitle"/>
           </p:nvPr>
         </p:nvSpPr>
         <p:spPr>
           <a:xfrm>
-            <a:off x="581192" y="2340864"/>
-            <a:ext cx="11029616" cy="3634486"/>
+            <a:off x="899510" y="2324906"/>
+            <a:ext cx="3412067" cy="1588698"/>
           </a:xfrm>
+        </p:spPr>
+        <p:txBody>
+          <a:bodyPr>
+            <a:normAutofit/>
+          </a:bodyPr>
+          <a:lstStyle/>
+          <a:p>
+            <a:r>
+              <a:rPr lang="en-IN" dirty="0">
+                <a:solidFill>
+                  <a:schemeClr val="tx1"/>
+                </a:solidFill>
+              </a:rPr>
+              <a:t>d</a:t>
+            </a:r>
+          </a:p>
+        </p:txBody>
+      </p:sp>
+      <p:sp>
+        <p:nvSpPr>
+          <p:cNvPr id="3" name="Subtitle 2" hidden="1">
+            <a:extLst>
+              <a:ext uri="{FF2B5EF4-FFF2-40B4-BE49-F238E27FC236}">
+                <a16:creationId xmlns:a16="http://schemas.microsoft.com/office/drawing/2014/main" id="{E542AABC-0A92-44F6-9073-12F61483065E}"/>
+              </a:ext>
+            </a:extLst>
+          </p:cNvPr>
+          <p:cNvSpPr>
+            <a:spLocks noGrp="1"/>
+          </p:cNvSpPr>
+          <p:nvPr>
+            <p:ph type="subTitle" idx="1"/>
+          </p:nvPr>
+        </p:nvSpPr>
+        <p:spPr>
+          <a:xfrm>
+            <a:off x="899510" y="3945249"/>
+            <a:ext cx="3412067" cy="738820"/>
+          </a:xfrm>
+        </p:spPr>
+        <p:txBody>
+          <a:bodyPr>
+            <a:normAutofit/>
+          </a:bodyPr>
+          <a:lstStyle/>
+          <a:p>
+            <a:endParaRPr lang="en-IN"/>
+          </a:p>
+        </p:txBody>
+      </p:sp>
+      <p:sp>
+        <p:nvSpPr>
+          <p:cNvPr id="19" name="Rectangle: Rounded Corners 18">
+            <a:extLst>
+              <a:ext uri="{FF2B5EF4-FFF2-40B4-BE49-F238E27FC236}">
+                <a16:creationId xmlns:a16="http://schemas.microsoft.com/office/drawing/2014/main" id="{4C216936-0826-4CAB-8656-51DE789E1C0E}"/>
+              </a:ext>
+            </a:extLst>
+          </p:cNvPr>
+          <p:cNvSpPr/>
+          <p:nvPr/>
+        </p:nvSpPr>
+        <p:spPr>
+          <a:xfrm>
+            <a:off x="1047750" y="2440309"/>
+            <a:ext cx="10648949" cy="2795759"/>
+          </a:xfrm>
+          <a:prstGeom prst="roundRect">
+            <a:avLst/>
+          </a:prstGeom>
           <a:solidFill>
-            <a:schemeClr val="accent1">
-              <a:lumMod val="20000"/>
-              <a:lumOff val="80000"/>
+            <a:schemeClr val="bg1">
+              <a:alpha val="21000"/>
             </a:schemeClr>
           </a:solidFill>
-        </p:spPr>
-        <p:txBody>
-          <a:bodyPr/>
-          <a:lstStyle/>
-          <a:p>
-            <a:endParaRPr lang="en-IN" dirty="0"/>
-          </a:p>
-        </p:txBody>
-      </p:sp>
+          <a:effectLst>
+            <a:outerShdw blurRad="50800" dist="50800" dir="5400000" algn="ctr" rotWithShape="0">
+              <a:srgbClr val="000000"/>
+            </a:outerShdw>
+          </a:effectLst>
+        </p:spPr>
+        <p:style>
+          <a:lnRef idx="2">
+            <a:schemeClr val="accent1">
+              <a:shade val="50000"/>
+            </a:schemeClr>
+          </a:lnRef>
+          <a:fillRef idx="1">
+            <a:schemeClr val="accent1"/>
+          </a:fillRef>
+          <a:effectRef idx="0">
+            <a:schemeClr val="accent1"/>
+          </a:effectRef>
+          <a:fontRef idx="minor">
+            <a:schemeClr val="lt1"/>
+          </a:fontRef>
+        </p:style>
+        <p:txBody>
+          <a:bodyPr rtlCol="0" anchor="ctr"/>
+          <a:lstStyle/>
+          <a:p>
+            <a:pPr algn="ctr"/>
+            <a:r>
+              <a:rPr lang="en-IN" sz="6600" b="1" dirty="0" err="1">
+                <a:solidFill>
+                  <a:srgbClr val="92D050"/>
+                </a:solidFill>
+                <a:latin typeface="Algerian" panose="04020705040A02060702" pitchFamily="82" charset="0"/>
+              </a:rPr>
+              <a:t>ehCACHe</a:t>
+            </a:r>
+            <a:r>
+              <a:rPr lang="en-IN" sz="6600" b="1" dirty="0">
+                <a:solidFill>
+                  <a:srgbClr val="92D050"/>
+                </a:solidFill>
+                <a:latin typeface="Algerian" panose="04020705040A02060702" pitchFamily="82" charset="0"/>
+              </a:rPr>
+              <a:t> integration</a:t>
+            </a:r>
+          </a:p>
+          <a:p>
+            <a:pPr algn="ctr"/>
+            <a:r>
+              <a:rPr lang="en-IN" sz="6600" b="1" dirty="0">
+                <a:solidFill>
+                  <a:srgbClr val="92D050"/>
+                </a:solidFill>
+                <a:latin typeface="Algerian" panose="04020705040A02060702" pitchFamily="82" charset="0"/>
+              </a:rPr>
+              <a:t>WITH </a:t>
+            </a:r>
+          </a:p>
+          <a:p>
+            <a:pPr algn="ctr"/>
+            <a:r>
+              <a:rPr lang="en-IN" sz="6600" b="1" dirty="0">
+                <a:solidFill>
+                  <a:srgbClr val="92D050"/>
+                </a:solidFill>
+                <a:latin typeface="Algerian" panose="04020705040A02060702" pitchFamily="82" charset="0"/>
+              </a:rPr>
+              <a:t>Spring boot</a:t>
+            </a:r>
+          </a:p>
+        </p:txBody>
+      </p:sp>
+      <p:pic>
+        <p:nvPicPr>
+          <p:cNvPr id="1026" name="Picture 2" descr="Image result for spring boot">
+            <a:extLst>
+              <a:ext uri="{FF2B5EF4-FFF2-40B4-BE49-F238E27FC236}">
+                <a16:creationId xmlns:a16="http://schemas.microsoft.com/office/drawing/2014/main" id="{606C6BEF-BF9F-4CB9-89A3-46BA0245D926}"/>
+              </a:ext>
+            </a:extLst>
+          </p:cNvPr>
+          <p:cNvPicPr>
+            <a:picLocks noChangeAspect="1" noChangeArrowheads="1"/>
+          </p:cNvPicPr>
+          <p:nvPr/>
+        </p:nvPicPr>
+        <p:blipFill>
+          <a:blip r:embed="rId4">
+            <a:extLst>
+              <a:ext uri="{28A0092B-C50C-407E-A947-70E740481C1C}">
+                <a14:useLocalDpi xmlns:a14="http://schemas.microsoft.com/office/drawing/2010/main" val="0"/>
+              </a:ext>
+            </a:extLst>
+          </a:blip>
+          <a:srcRect/>
+          <a:stretch>
+            <a:fillRect/>
+          </a:stretch>
+        </p:blipFill>
+        <p:spPr bwMode="auto">
+          <a:xfrm>
+            <a:off x="9232231" y="5144519"/>
+            <a:ext cx="2904424" cy="1153755"/>
+          </a:xfrm>
+          <a:prstGeom prst="rect">
+            <a:avLst/>
+          </a:prstGeom>
+          <a:ln>
+            <a:noFill/>
+          </a:ln>
+          <a:effectLst>
+            <a:outerShdw blurRad="292100" dist="139700" dir="2700000" algn="tl" rotWithShape="0">
+              <a:srgbClr val="333333">
+                <a:alpha val="65000"/>
+              </a:srgbClr>
+            </a:outerShdw>
+          </a:effectLst>
+          <a:extLst>
+            <a:ext uri="{909E8E84-426E-40DD-AFC4-6F175D3DCCD1}">
+              <a14:hiddenFill xmlns:a14="http://schemas.microsoft.com/office/drawing/2010/main">
+                <a:solidFill>
+                  <a:srgbClr val="FFFFFF"/>
+                </a:solidFill>
+              </a14:hiddenFill>
+            </a:ext>
+          </a:extLst>
+        </p:spPr>
+      </p:pic>
+      <p:pic>
+        <p:nvPicPr>
+          <p:cNvPr id="1028" name="Picture 4" descr="Image result for ehcache">
+            <a:extLst>
+              <a:ext uri="{FF2B5EF4-FFF2-40B4-BE49-F238E27FC236}">
+                <a16:creationId xmlns:a16="http://schemas.microsoft.com/office/drawing/2014/main" id="{56043876-4729-42DA-B907-A56889B1AE30}"/>
+              </a:ext>
+            </a:extLst>
+          </p:cNvPr>
+          <p:cNvPicPr>
+            <a:picLocks noChangeAspect="1" noChangeArrowheads="1"/>
+          </p:cNvPicPr>
+          <p:nvPr/>
+        </p:nvPicPr>
+        <p:blipFill>
+          <a:blip r:embed="rId5">
+            <a:extLst>
+              <a:ext uri="{28A0092B-C50C-407E-A947-70E740481C1C}">
+                <a14:useLocalDpi xmlns:a14="http://schemas.microsoft.com/office/drawing/2010/main" val="0"/>
+              </a:ext>
+            </a:extLst>
+          </a:blip>
+          <a:srcRect/>
+          <a:stretch>
+            <a:fillRect/>
+          </a:stretch>
+        </p:blipFill>
+        <p:spPr bwMode="auto">
+          <a:xfrm>
+            <a:off x="1352550" y="153006"/>
+            <a:ext cx="9963150" cy="2253001"/>
+          </a:xfrm>
+          <a:prstGeom prst="rect">
+            <a:avLst/>
+          </a:prstGeom>
+          <a:ln>
+            <a:noFill/>
+          </a:ln>
+          <a:effectLst>
+            <a:softEdge rad="112500"/>
+          </a:effectLst>
+          <a:extLst>
+            <a:ext uri="{909E8E84-426E-40DD-AFC4-6F175D3DCCD1}">
+              <a14:hiddenFill xmlns:a14="http://schemas.microsoft.com/office/drawing/2010/main">
+                <a:solidFill>
+                  <a:srgbClr val="FFFFFF"/>
+                </a:solidFill>
+              </a14:hiddenFill>
+            </a:ext>
+          </a:extLst>
+        </p:spPr>
+      </p:pic>
+      <p:sp>
+        <p:nvSpPr>
+          <p:cNvPr id="6" name="Rectangle 5">
+            <a:extLst>
+              <a:ext uri="{FF2B5EF4-FFF2-40B4-BE49-F238E27FC236}">
+                <a16:creationId xmlns:a16="http://schemas.microsoft.com/office/drawing/2014/main" id="{69196CA5-46AC-41FC-A808-2046DD4EFEA6}"/>
+              </a:ext>
+            </a:extLst>
+          </p:cNvPr>
+          <p:cNvSpPr/>
+          <p:nvPr/>
+        </p:nvSpPr>
+        <p:spPr>
+          <a:xfrm>
+            <a:off x="55345" y="5408188"/>
+            <a:ext cx="6096000" cy="1011616"/>
+          </a:xfrm>
+          <a:prstGeom prst="rect">
+            <a:avLst/>
+          </a:prstGeom>
+        </p:spPr>
+        <p:style>
+          <a:lnRef idx="1">
+            <a:schemeClr val="accent5"/>
+          </a:lnRef>
+          <a:fillRef idx="3">
+            <a:schemeClr val="accent5"/>
+          </a:fillRef>
+          <a:effectRef idx="2">
+            <a:schemeClr val="accent5"/>
+          </a:effectRef>
+          <a:fontRef idx="minor">
+            <a:schemeClr val="lt1"/>
+          </a:fontRef>
+        </p:style>
+        <p:txBody>
+          <a:bodyPr rtlCol="0" anchor="ctr"/>
+          <a:lstStyle/>
+          <a:p>
+            <a:pPr algn="ctr"/>
+            <a:r>
+              <a:rPr lang="en-IN" sz="3200" dirty="0">
+                <a:latin typeface="Algerian" panose="04020705040A02060702" pitchFamily="82" charset="0"/>
+              </a:rPr>
+              <a:t>Microservices/Distributed system</a:t>
+            </a:r>
+          </a:p>
+        </p:txBody>
+      </p:sp>
+      <p:sp>
+        <p:nvSpPr>
+          <p:cNvPr id="7" name="Rectangle 6">
+            <a:extLst>
+              <a:ext uri="{FF2B5EF4-FFF2-40B4-BE49-F238E27FC236}">
+                <a16:creationId xmlns:a16="http://schemas.microsoft.com/office/drawing/2014/main" id="{C82DC5A3-9C1E-4E80-968C-32001CB999E7}"/>
+              </a:ext>
+            </a:extLst>
+          </p:cNvPr>
+          <p:cNvSpPr/>
+          <p:nvPr/>
+        </p:nvSpPr>
+        <p:spPr>
+          <a:xfrm>
+            <a:off x="8031778" y="6307183"/>
+            <a:ext cx="1137988" cy="254061"/>
+          </a:xfrm>
+          <a:prstGeom prst="rect">
+            <a:avLst/>
+          </a:prstGeom>
+          <a:solidFill>
+            <a:srgbClr val="92D050"/>
+          </a:solidFill>
+        </p:spPr>
+        <p:style>
+          <a:lnRef idx="1">
+            <a:schemeClr val="accent6"/>
+          </a:lnRef>
+          <a:fillRef idx="3">
+            <a:schemeClr val="accent6"/>
+          </a:fillRef>
+          <a:effectRef idx="2">
+            <a:schemeClr val="accent6"/>
+          </a:effectRef>
+          <a:fontRef idx="minor">
+            <a:schemeClr val="lt1"/>
+          </a:fontRef>
+        </p:style>
+        <p:txBody>
+          <a:bodyPr rtlCol="0" anchor="ctr"/>
+          <a:lstStyle/>
+          <a:p>
+            <a:pPr algn="ctr"/>
+            <a:r>
+              <a:rPr lang="en-IN" sz="2000" dirty="0" err="1">
+                <a:solidFill>
+                  <a:srgbClr val="FF0000"/>
+                </a:solidFill>
+                <a:latin typeface="Algerian" panose="04020705040A02060702" pitchFamily="82" charset="0"/>
+              </a:rPr>
+              <a:t>arvind</a:t>
+            </a:r>
+            <a:endParaRPr lang="en-IN" sz="1600" dirty="0">
+              <a:solidFill>
+                <a:srgbClr val="FF0000"/>
+              </a:solidFill>
+              <a:latin typeface="Algerian" panose="04020705040A02060702" pitchFamily="82" charset="0"/>
+            </a:endParaRPr>
+          </a:p>
+        </p:txBody>
+      </p:sp>
+      <p:sp>
+        <p:nvSpPr>
+          <p:cNvPr id="21" name="Rectangle 20">
+            <a:extLst>
+              <a:ext uri="{FF2B5EF4-FFF2-40B4-BE49-F238E27FC236}">
+                <a16:creationId xmlns:a16="http://schemas.microsoft.com/office/drawing/2014/main" id="{48B5738C-75F8-4C5D-A66A-40CE2A67572C}"/>
+              </a:ext>
+            </a:extLst>
+          </p:cNvPr>
+          <p:cNvSpPr/>
+          <p:nvPr/>
+        </p:nvSpPr>
+        <p:spPr>
+          <a:xfrm>
+            <a:off x="11201400" y="-1881"/>
+            <a:ext cx="957032" cy="525756"/>
+          </a:xfrm>
+          <a:prstGeom prst="rect">
+            <a:avLst/>
+          </a:prstGeom>
+          <a:solidFill>
+            <a:srgbClr val="92D050"/>
+          </a:solidFill>
+        </p:spPr>
+        <p:style>
+          <a:lnRef idx="1">
+            <a:schemeClr val="accent6"/>
+          </a:lnRef>
+          <a:fillRef idx="3">
+            <a:schemeClr val="accent6"/>
+          </a:fillRef>
+          <a:effectRef idx="2">
+            <a:schemeClr val="accent6"/>
+          </a:effectRef>
+          <a:fontRef idx="minor">
+            <a:schemeClr val="lt1"/>
+          </a:fontRef>
+        </p:style>
+        <p:txBody>
+          <a:bodyPr rtlCol="0" anchor="ctr"/>
+          <a:lstStyle/>
+          <a:p>
+            <a:pPr algn="ctr"/>
+            <a:r>
+              <a:rPr lang="en-IN" sz="4000" dirty="0"/>
+              <a:t>#2</a:t>
+            </a:r>
+          </a:p>
+        </p:txBody>
+      </p:sp>
+      <p:sp>
+        <p:nvSpPr>
+          <p:cNvPr id="8" name="Rectangle: Diagonal Corners Snipped 7">
+            <a:extLst>
+              <a:ext uri="{FF2B5EF4-FFF2-40B4-BE49-F238E27FC236}">
+                <a16:creationId xmlns:a16="http://schemas.microsoft.com/office/drawing/2014/main" id="{48FFD385-DDE6-479F-8DCF-893DD1468117}"/>
+              </a:ext>
+            </a:extLst>
+          </p:cNvPr>
+          <p:cNvSpPr/>
+          <p:nvPr/>
+        </p:nvSpPr>
+        <p:spPr>
+          <a:xfrm>
+            <a:off x="6357034" y="5499964"/>
+            <a:ext cx="1924050" cy="807219"/>
+          </a:xfrm>
+          <a:prstGeom prst="snip2DiagRect">
+            <a:avLst/>
+          </a:prstGeom>
+          <a:solidFill>
+            <a:srgbClr val="92D050"/>
+          </a:solidFill>
+        </p:spPr>
+        <p:style>
+          <a:lnRef idx="2">
+            <a:schemeClr val="accent1">
+              <a:shade val="50000"/>
+            </a:schemeClr>
+          </a:lnRef>
+          <a:fillRef idx="1">
+            <a:schemeClr val="accent1"/>
+          </a:fillRef>
+          <a:effectRef idx="0">
+            <a:schemeClr val="accent1"/>
+          </a:effectRef>
+          <a:fontRef idx="minor">
+            <a:schemeClr val="lt1"/>
+          </a:fontRef>
+        </p:style>
+        <p:txBody>
+          <a:bodyPr rtlCol="0" anchor="ctr"/>
+          <a:lstStyle/>
+          <a:p>
+            <a:pPr algn="ctr"/>
+            <a:r>
+              <a:rPr lang="en-IN" sz="2400" dirty="0">
+                <a:latin typeface="Algerian" panose="04020705040A02060702" pitchFamily="82" charset="0"/>
+              </a:rPr>
+              <a:t>GREEN LEARNER</a:t>
+            </a:r>
+          </a:p>
+        </p:txBody>
+      </p:sp>
+      <mc:AlternateContent xmlns:mc="http://schemas.openxmlformats.org/markup-compatibility/2006" xmlns:p14="http://schemas.microsoft.com/office/powerpoint/2010/main">
+        <mc:Choice Requires="p14">
+          <p:contentPart p14:bwMode="auto" r:id="rId6">
+            <p14:nvContentPartPr>
+              <p14:cNvPr id="9" name="Ink 8">
+                <a:extLst>
+                  <a:ext uri="{FF2B5EF4-FFF2-40B4-BE49-F238E27FC236}">
+                    <a16:creationId xmlns:a16="http://schemas.microsoft.com/office/drawing/2014/main" id="{71C31635-F142-4304-80D3-9B07B8AABF16}"/>
+                  </a:ext>
+                </a:extLst>
+              </p14:cNvPr>
+              <p14:cNvContentPartPr/>
+              <p14:nvPr/>
+            </p14:nvContentPartPr>
+            <p14:xfrm>
+              <a:off x="2508480" y="1856880"/>
+              <a:ext cx="8895240" cy="2795760"/>
+            </p14:xfrm>
+          </p:contentPart>
+        </mc:Choice>
+        <mc:Fallback xmlns="">
+          <p:pic>
+            <p:nvPicPr>
+              <p:cNvPr id="9" name="Ink 8">
+                <a:extLst>
+                  <a:ext uri="{FF2B5EF4-FFF2-40B4-BE49-F238E27FC236}">
+                    <a16:creationId xmlns:a16="http://schemas.microsoft.com/office/drawing/2014/main" id="{71C31635-F142-4304-80D3-9B07B8AABF16}"/>
+                  </a:ext>
+                </a:extLst>
+              </p:cNvPr>
+              <p:cNvPicPr/>
+              <p:nvPr/>
+            </p:nvPicPr>
+            <p:blipFill>
+              <a:blip r:embed="rId7"/>
+              <a:stretch>
+                <a:fillRect/>
+              </a:stretch>
+            </p:blipFill>
+            <p:spPr>
+              <a:xfrm>
+                <a:off x="2499120" y="1847520"/>
+                <a:ext cx="8913960" cy="2814480"/>
+              </a:xfrm>
+              <a:prstGeom prst="rect">
+                <a:avLst/>
+              </a:prstGeom>
+            </p:spPr>
+          </p:pic>
+        </mc:Fallback>
+      </mc:AlternateContent>
+      <p:sp>
+        <p:nvSpPr>
+          <p:cNvPr id="20" name="Rectangle: Rounded Corners 19">
+            <a:extLst>
+              <a:ext uri="{FF2B5EF4-FFF2-40B4-BE49-F238E27FC236}">
+                <a16:creationId xmlns:a16="http://schemas.microsoft.com/office/drawing/2014/main" id="{272E7F5F-4727-46AA-978E-1BB1AF9FD56A}"/>
+              </a:ext>
+            </a:extLst>
+          </p:cNvPr>
+          <p:cNvSpPr/>
+          <p:nvPr/>
+        </p:nvSpPr>
+        <p:spPr>
+          <a:xfrm>
+            <a:off x="1075422" y="2480481"/>
+            <a:ext cx="10648949" cy="2795759"/>
+          </a:xfrm>
+          <a:prstGeom prst="roundRect">
+            <a:avLst/>
+          </a:prstGeom>
+          <a:solidFill>
+            <a:schemeClr val="bg1">
+              <a:alpha val="21000"/>
+            </a:schemeClr>
+          </a:solidFill>
+          <a:effectLst>
+            <a:outerShdw blurRad="50800" dist="50800" dir="5400000" algn="ctr" rotWithShape="0">
+              <a:srgbClr val="000000"/>
+            </a:outerShdw>
+          </a:effectLst>
+        </p:spPr>
+        <p:style>
+          <a:lnRef idx="2">
+            <a:schemeClr val="accent1">
+              <a:shade val="50000"/>
+            </a:schemeClr>
+          </a:lnRef>
+          <a:fillRef idx="1">
+            <a:schemeClr val="accent1"/>
+          </a:fillRef>
+          <a:effectRef idx="0">
+            <a:schemeClr val="accent1"/>
+          </a:effectRef>
+          <a:fontRef idx="minor">
+            <a:schemeClr val="lt1"/>
+          </a:fontRef>
+        </p:style>
+        <p:txBody>
+          <a:bodyPr rtlCol="0" anchor="ctr"/>
+          <a:lstStyle/>
+          <a:p>
+            <a:pPr algn="ctr"/>
+            <a:r>
+              <a:rPr lang="en-IN" sz="6600" b="1" dirty="0" err="1">
+                <a:solidFill>
+                  <a:srgbClr val="92D050"/>
+                </a:solidFill>
+                <a:latin typeface="Algerian" panose="04020705040A02060702" pitchFamily="82" charset="0"/>
+              </a:rPr>
+              <a:t>ehCACHe</a:t>
+            </a:r>
+            <a:r>
+              <a:rPr lang="en-IN" sz="6600" b="1" dirty="0">
+                <a:solidFill>
+                  <a:srgbClr val="92D050"/>
+                </a:solidFill>
+                <a:latin typeface="Algerian" panose="04020705040A02060702" pitchFamily="82" charset="0"/>
+              </a:rPr>
+              <a:t> integration</a:t>
+            </a:r>
+          </a:p>
+          <a:p>
+            <a:pPr algn="ctr"/>
+            <a:r>
+              <a:rPr lang="en-IN" sz="6600" b="1" dirty="0">
+                <a:solidFill>
+                  <a:srgbClr val="92D050"/>
+                </a:solidFill>
+                <a:latin typeface="Algerian" panose="04020705040A02060702" pitchFamily="82" charset="0"/>
+              </a:rPr>
+              <a:t>WITH </a:t>
+            </a:r>
+          </a:p>
+          <a:p>
+            <a:pPr algn="ctr"/>
+            <a:r>
+              <a:rPr lang="en-IN" sz="6600" b="1" dirty="0">
+                <a:solidFill>
+                  <a:srgbClr val="92D050"/>
+                </a:solidFill>
+                <a:latin typeface="Algerian" panose="04020705040A02060702" pitchFamily="82" charset="0"/>
+              </a:rPr>
+              <a:t>Spring boot</a:t>
+            </a:r>
+          </a:p>
+        </p:txBody>
+      </p:sp>
+      <p:sp>
+        <p:nvSpPr>
+          <p:cNvPr id="22" name="Rectangle: Rounded Corners 21">
+            <a:extLst>
+              <a:ext uri="{FF2B5EF4-FFF2-40B4-BE49-F238E27FC236}">
+                <a16:creationId xmlns:a16="http://schemas.microsoft.com/office/drawing/2014/main" id="{EBE7F182-AE48-46A5-A63D-355561D77E8A}"/>
+              </a:ext>
+            </a:extLst>
+          </p:cNvPr>
+          <p:cNvSpPr/>
+          <p:nvPr/>
+        </p:nvSpPr>
+        <p:spPr>
+          <a:xfrm>
+            <a:off x="1103094" y="2488901"/>
+            <a:ext cx="10648949" cy="2795759"/>
+          </a:xfrm>
+          <a:prstGeom prst="roundRect">
+            <a:avLst/>
+          </a:prstGeom>
+          <a:solidFill>
+            <a:schemeClr val="bg1">
+              <a:alpha val="21000"/>
+            </a:schemeClr>
+          </a:solidFill>
+          <a:effectLst>
+            <a:outerShdw blurRad="50800" dist="50800" dir="5400000" algn="ctr" rotWithShape="0">
+              <a:srgbClr val="000000"/>
+            </a:outerShdw>
+          </a:effectLst>
+        </p:spPr>
+        <p:style>
+          <a:lnRef idx="2">
+            <a:schemeClr val="accent1">
+              <a:shade val="50000"/>
+            </a:schemeClr>
+          </a:lnRef>
+          <a:fillRef idx="1">
+            <a:schemeClr val="accent1"/>
+          </a:fillRef>
+          <a:effectRef idx="0">
+            <a:schemeClr val="accent1"/>
+          </a:effectRef>
+          <a:fontRef idx="minor">
+            <a:schemeClr val="lt1"/>
+          </a:fontRef>
+        </p:style>
+        <p:txBody>
+          <a:bodyPr rtlCol="0" anchor="ctr"/>
+          <a:lstStyle/>
+          <a:p>
+            <a:pPr algn="ctr"/>
+            <a:r>
+              <a:rPr lang="en-IN" sz="6600" b="1" dirty="0" err="1">
+                <a:solidFill>
+                  <a:srgbClr val="92D050"/>
+                </a:solidFill>
+                <a:latin typeface="Algerian" panose="04020705040A02060702" pitchFamily="82" charset="0"/>
+              </a:rPr>
+              <a:t>ehCACHe</a:t>
+            </a:r>
+            <a:r>
+              <a:rPr lang="en-IN" sz="6600" b="1" dirty="0">
+                <a:solidFill>
+                  <a:srgbClr val="92D050"/>
+                </a:solidFill>
+                <a:latin typeface="Algerian" panose="04020705040A02060702" pitchFamily="82" charset="0"/>
+              </a:rPr>
+              <a:t> integration</a:t>
+            </a:r>
+          </a:p>
+          <a:p>
+            <a:pPr algn="ctr"/>
+            <a:r>
+              <a:rPr lang="en-IN" sz="6600" b="1" dirty="0">
+                <a:solidFill>
+                  <a:srgbClr val="92D050"/>
+                </a:solidFill>
+                <a:latin typeface="Algerian" panose="04020705040A02060702" pitchFamily="82" charset="0"/>
+              </a:rPr>
+              <a:t>WITH </a:t>
+            </a:r>
+          </a:p>
+          <a:p>
+            <a:pPr algn="ctr"/>
+            <a:r>
+              <a:rPr lang="en-IN" sz="6600" b="1" dirty="0">
+                <a:solidFill>
+                  <a:srgbClr val="92D050"/>
+                </a:solidFill>
+                <a:latin typeface="Algerian" panose="04020705040A02060702" pitchFamily="82" charset="0"/>
+              </a:rPr>
+              <a:t>Spring boot</a:t>
+            </a:r>
+            <a:r>
+              <a:rPr lang="en-IN" sz="6600" b="1" dirty="0">
+                <a:solidFill>
+                  <a:srgbClr val="00B0F0"/>
+                </a:solidFill>
+                <a:latin typeface="Algerian" panose="04020705040A02060702" pitchFamily="82" charset="0"/>
+              </a:rPr>
+              <a:t>(#1)</a:t>
+            </a:r>
+          </a:p>
+        </p:txBody>
+      </p:sp>
+      <mc:AlternateContent xmlns:mc="http://schemas.openxmlformats.org/markup-compatibility/2006">
+        <mc:Choice xmlns:p14="http://schemas.microsoft.com/office/powerpoint/2010/main" Requires="p14">
+          <p:contentPart p14:bwMode="auto" r:id="rId8">
+            <p14:nvContentPartPr>
+              <p14:cNvPr id="5" name="Ink 4">
+                <a:extLst>
+                  <a:ext uri="{FF2B5EF4-FFF2-40B4-BE49-F238E27FC236}">
+                    <a16:creationId xmlns:a16="http://schemas.microsoft.com/office/drawing/2014/main" id="{ABE24519-4AB3-475F-919F-0F18EA998282}"/>
+                  </a:ext>
+                </a:extLst>
+              </p14:cNvPr>
+              <p14:cNvContentPartPr/>
+              <p14:nvPr/>
+            </p14:nvContentPartPr>
+            <p14:xfrm>
+              <a:off x="132480" y="392760"/>
+              <a:ext cx="11939760" cy="5039280"/>
+            </p14:xfrm>
+          </p:contentPart>
+        </mc:Choice>
+        <mc:Fallback>
+          <p:pic>
+            <p:nvPicPr>
+              <p:cNvPr id="5" name="Ink 4">
+                <a:extLst>
+                  <a:ext uri="{FF2B5EF4-FFF2-40B4-BE49-F238E27FC236}">
+                    <a16:creationId xmlns:a16="http://schemas.microsoft.com/office/drawing/2014/main" id="{ABE24519-4AB3-475F-919F-0F18EA998282}"/>
+                  </a:ext>
+                </a:extLst>
+              </p:cNvPr>
+              <p:cNvPicPr/>
+              <p:nvPr/>
+            </p:nvPicPr>
+            <p:blipFill>
+              <a:blip r:embed="rId9"/>
+              <a:stretch>
+                <a:fillRect/>
+              </a:stretch>
+            </p:blipFill>
+            <p:spPr>
+              <a:xfrm>
+                <a:off x="123120" y="383400"/>
+                <a:ext cx="11958480" cy="5058000"/>
+              </a:xfrm>
+              <a:prstGeom prst="rect">
+                <a:avLst/>
+              </a:prstGeom>
+            </p:spPr>
+          </p:pic>
+        </mc:Fallback>
+      </mc:AlternateContent>
     </p:spTree>
     <p:extLst>
       <p:ext uri="{BB962C8B-B14F-4D97-AF65-F5344CB8AC3E}">
-        <p14:creationId xmlns:p14="http://schemas.microsoft.com/office/powerpoint/2010/main" val="33380959"/>
+        <p14:creationId xmlns:p14="http://schemas.microsoft.com/office/powerpoint/2010/main" val="1124604075"/>
       </p:ext>
     </p:extLst>
   </p:cSld>
   <p:clrMapOvr>
-    <a:masterClrMapping/>
+    <a:overrideClrMapping bg1="dk1" tx1="lt1" bg2="dk2" tx2="lt2" accent1="accent1" accent2="accent2" accent3="accent3" accent4="accent4" accent5="accent5" accent6="accent6" hlink="hlink" folHlink="folHlink"/>
   </p:clrMapOvr>
 </p:sld>
 </file>
@@ -5767,6 +6684,14 @@
 <file path=ppt/slides/slide13.xml><?xml version="1.0" encoding="utf-8"?>
 <p:sld xmlns:a="http://schemas.openxmlformats.org/drawingml/2006/main" xmlns:r="http://schemas.openxmlformats.org/officeDocument/2006/relationships" xmlns:p="http://schemas.openxmlformats.org/presentationml/2006/main">
   <p:cSld>
+    <p:bg>
+      <p:bgPr>
+        <a:solidFill>
+          <a:schemeClr val="bg1"/>
+        </a:solidFill>
+        <a:effectLst/>
+      </p:bgPr>
+    </p:bg>
     <p:spTree>
       <p:nvGrpSpPr>
         <p:cNvPr id="1" name=""/>
@@ -5781,46 +6706,41 @@
           <a:chExt cx="0" cy="0"/>
         </a:xfrm>
       </p:grpSpPr>
-      <p:sp>
-        <p:nvSpPr>
-          <p:cNvPr id="2" name="Title 1">
+      <p:pic>
+        <p:nvPicPr>
+          <p:cNvPr id="4" name="Picture 3">
             <a:extLst>
               <a:ext uri="{FF2B5EF4-FFF2-40B4-BE49-F238E27FC236}">
-                <a16:creationId xmlns:a16="http://schemas.microsoft.com/office/drawing/2014/main" id="{2C90EF4B-60F8-4E42-8E9C-7E3252505BCB}"/>
+                <a16:creationId xmlns:a16="http://schemas.microsoft.com/office/drawing/2014/main" id="{ED027430-D330-4824-BEC9-C7722CC03754}"/>
               </a:ext>
             </a:extLst>
           </p:cNvPr>
-          <p:cNvSpPr>
-            <a:spLocks noGrp="1"/>
-          </p:cNvSpPr>
-          <p:nvPr>
-            <p:ph type="title"/>
-          </p:nvPr>
-        </p:nvSpPr>
-        <p:spPr>
-          <a:solidFill>
-            <a:schemeClr val="accent5">
-              <a:lumMod val="60000"/>
-              <a:lumOff val="40000"/>
-            </a:schemeClr>
-          </a:solidFill>
-        </p:spPr>
-        <p:txBody>
-          <a:bodyPr/>
-          <a:lstStyle/>
-          <a:p>
-            <a:endParaRPr lang="en-IN" dirty="0">
-              <a:latin typeface="Algerian" panose="04020705040A02060702" pitchFamily="82" charset="0"/>
-            </a:endParaRPr>
-          </a:p>
-        </p:txBody>
-      </p:sp>
-      <p:sp>
-        <p:nvSpPr>
-          <p:cNvPr id="3" name="Content Placeholder 2">
+          <p:cNvPicPr>
+            <a:picLocks noChangeAspect="1"/>
+          </p:cNvPicPr>
+          <p:nvPr/>
+        </p:nvPicPr>
+        <p:blipFill rotWithShape="1">
+          <a:blip r:embed="rId3"/>
+          <a:srcRect t="10340" b="18004"/>
+          <a:stretch/>
+        </p:blipFill>
+        <p:spPr>
+          <a:xfrm>
+            <a:off x="-1" y="0"/>
+            <a:ext cx="12192000" cy="6858000"/>
+          </a:xfrm>
+          <a:prstGeom prst="rect">
+            <a:avLst/>
+          </a:prstGeom>
+        </p:spPr>
+      </p:pic>
+      <p:sp>
+        <p:nvSpPr>
+          <p:cNvPr id="2" name="Title 1" hidden="1">
             <a:extLst>
               <a:ext uri="{FF2B5EF4-FFF2-40B4-BE49-F238E27FC236}">
-                <a16:creationId xmlns:a16="http://schemas.microsoft.com/office/drawing/2014/main" id="{3398CEA2-8BE4-4D46-8D1D-8045EA59B578}"/>
+                <a16:creationId xmlns:a16="http://schemas.microsoft.com/office/drawing/2014/main" id="{802BCF98-D5EF-48DF-8AED-8C5D0DF63A06}"/>
               </a:ext>
             </a:extLst>
           </p:cNvPr>
@@ -5828,38 +6748,746 @@
             <a:spLocks noGrp="1"/>
           </p:cNvSpPr>
           <p:nvPr>
-            <p:ph idx="1"/>
+            <p:ph type="ctrTitle"/>
           </p:nvPr>
         </p:nvSpPr>
         <p:spPr>
           <a:xfrm>
-            <a:off x="581192" y="2340864"/>
-            <a:ext cx="11029616" cy="3634486"/>
+            <a:off x="899510" y="2324906"/>
+            <a:ext cx="3412067" cy="1588698"/>
           </a:xfrm>
+        </p:spPr>
+        <p:txBody>
+          <a:bodyPr>
+            <a:normAutofit/>
+          </a:bodyPr>
+          <a:lstStyle/>
+          <a:p>
+            <a:r>
+              <a:rPr lang="en-IN" dirty="0">
+                <a:solidFill>
+                  <a:schemeClr val="tx1"/>
+                </a:solidFill>
+              </a:rPr>
+              <a:t>d</a:t>
+            </a:r>
+          </a:p>
+        </p:txBody>
+      </p:sp>
+      <p:sp>
+        <p:nvSpPr>
+          <p:cNvPr id="3" name="Subtitle 2" hidden="1">
+            <a:extLst>
+              <a:ext uri="{FF2B5EF4-FFF2-40B4-BE49-F238E27FC236}">
+                <a16:creationId xmlns:a16="http://schemas.microsoft.com/office/drawing/2014/main" id="{E542AABC-0A92-44F6-9073-12F61483065E}"/>
+              </a:ext>
+            </a:extLst>
+          </p:cNvPr>
+          <p:cNvSpPr>
+            <a:spLocks noGrp="1"/>
+          </p:cNvSpPr>
+          <p:nvPr>
+            <p:ph type="subTitle" idx="1"/>
+          </p:nvPr>
+        </p:nvSpPr>
+        <p:spPr>
+          <a:xfrm>
+            <a:off x="899510" y="3945249"/>
+            <a:ext cx="3412067" cy="738820"/>
+          </a:xfrm>
+        </p:spPr>
+        <p:txBody>
+          <a:bodyPr>
+            <a:normAutofit/>
+          </a:bodyPr>
+          <a:lstStyle/>
+          <a:p>
+            <a:endParaRPr lang="en-IN"/>
+          </a:p>
+        </p:txBody>
+      </p:sp>
+      <p:sp>
+        <p:nvSpPr>
+          <p:cNvPr id="19" name="Rectangle: Rounded Corners 18">
+            <a:extLst>
+              <a:ext uri="{FF2B5EF4-FFF2-40B4-BE49-F238E27FC236}">
+                <a16:creationId xmlns:a16="http://schemas.microsoft.com/office/drawing/2014/main" id="{4C216936-0826-4CAB-8656-51DE789E1C0E}"/>
+              </a:ext>
+            </a:extLst>
+          </p:cNvPr>
+          <p:cNvSpPr/>
+          <p:nvPr/>
+        </p:nvSpPr>
+        <p:spPr>
+          <a:xfrm>
+            <a:off x="1047750" y="2440309"/>
+            <a:ext cx="10648949" cy="2795759"/>
+          </a:xfrm>
+          <a:prstGeom prst="roundRect">
+            <a:avLst/>
+          </a:prstGeom>
           <a:solidFill>
-            <a:schemeClr val="accent1">
-              <a:lumMod val="20000"/>
-              <a:lumOff val="80000"/>
+            <a:schemeClr val="bg1">
+              <a:alpha val="21000"/>
             </a:schemeClr>
           </a:solidFill>
-        </p:spPr>
-        <p:txBody>
-          <a:bodyPr/>
-          <a:lstStyle/>
-          <a:p>
-            <a:endParaRPr lang="en-IN" dirty="0"/>
+          <a:effectLst>
+            <a:outerShdw blurRad="50800" dist="50800" dir="5400000" algn="ctr" rotWithShape="0">
+              <a:srgbClr val="000000"/>
+            </a:outerShdw>
+          </a:effectLst>
+        </p:spPr>
+        <p:style>
+          <a:lnRef idx="2">
+            <a:schemeClr val="accent1">
+              <a:shade val="50000"/>
+            </a:schemeClr>
+          </a:lnRef>
+          <a:fillRef idx="1">
+            <a:schemeClr val="accent1"/>
+          </a:fillRef>
+          <a:effectRef idx="0">
+            <a:schemeClr val="accent1"/>
+          </a:effectRef>
+          <a:fontRef idx="minor">
+            <a:schemeClr val="lt1"/>
+          </a:fontRef>
+        </p:style>
+        <p:txBody>
+          <a:bodyPr rtlCol="0" anchor="ctr"/>
+          <a:lstStyle/>
+          <a:p>
+            <a:pPr algn="ctr"/>
+            <a:r>
+              <a:rPr lang="en-IN" sz="6600" b="1" dirty="0" err="1">
+                <a:solidFill>
+                  <a:srgbClr val="92D050"/>
+                </a:solidFill>
+                <a:latin typeface="Algerian" panose="04020705040A02060702" pitchFamily="82" charset="0"/>
+              </a:rPr>
+              <a:t>ehCACHe</a:t>
+            </a:r>
+            <a:r>
+              <a:rPr lang="en-IN" sz="6600" b="1" dirty="0">
+                <a:solidFill>
+                  <a:srgbClr val="92D050"/>
+                </a:solidFill>
+                <a:latin typeface="Algerian" panose="04020705040A02060702" pitchFamily="82" charset="0"/>
+              </a:rPr>
+              <a:t> integration</a:t>
+            </a:r>
+          </a:p>
+          <a:p>
+            <a:pPr algn="ctr"/>
+            <a:r>
+              <a:rPr lang="en-IN" sz="6600" b="1" dirty="0">
+                <a:solidFill>
+                  <a:srgbClr val="92D050"/>
+                </a:solidFill>
+                <a:latin typeface="Algerian" panose="04020705040A02060702" pitchFamily="82" charset="0"/>
+              </a:rPr>
+              <a:t>WITH </a:t>
+            </a:r>
+          </a:p>
+          <a:p>
+            <a:pPr algn="ctr"/>
+            <a:r>
+              <a:rPr lang="en-IN" sz="6600" b="1" dirty="0">
+                <a:solidFill>
+                  <a:srgbClr val="92D050"/>
+                </a:solidFill>
+                <a:latin typeface="Algerian" panose="04020705040A02060702" pitchFamily="82" charset="0"/>
+              </a:rPr>
+              <a:t>Spring boot</a:t>
+            </a:r>
+          </a:p>
+        </p:txBody>
+      </p:sp>
+      <p:pic>
+        <p:nvPicPr>
+          <p:cNvPr id="1026" name="Picture 2" descr="Image result for spring boot">
+            <a:extLst>
+              <a:ext uri="{FF2B5EF4-FFF2-40B4-BE49-F238E27FC236}">
+                <a16:creationId xmlns:a16="http://schemas.microsoft.com/office/drawing/2014/main" id="{606C6BEF-BF9F-4CB9-89A3-46BA0245D926}"/>
+              </a:ext>
+            </a:extLst>
+          </p:cNvPr>
+          <p:cNvPicPr>
+            <a:picLocks noChangeAspect="1" noChangeArrowheads="1"/>
+          </p:cNvPicPr>
+          <p:nvPr/>
+        </p:nvPicPr>
+        <p:blipFill>
+          <a:blip r:embed="rId4">
+            <a:extLst>
+              <a:ext uri="{28A0092B-C50C-407E-A947-70E740481C1C}">
+                <a14:useLocalDpi xmlns:a14="http://schemas.microsoft.com/office/drawing/2010/main" val="0"/>
+              </a:ext>
+            </a:extLst>
+          </a:blip>
+          <a:srcRect/>
+          <a:stretch>
+            <a:fillRect/>
+          </a:stretch>
+        </p:blipFill>
+        <p:spPr bwMode="auto">
+          <a:xfrm>
+            <a:off x="9232231" y="5144519"/>
+            <a:ext cx="2904424" cy="1153755"/>
+          </a:xfrm>
+          <a:prstGeom prst="rect">
+            <a:avLst/>
+          </a:prstGeom>
+          <a:ln>
+            <a:noFill/>
+          </a:ln>
+          <a:effectLst>
+            <a:outerShdw blurRad="292100" dist="139700" dir="2700000" algn="tl" rotWithShape="0">
+              <a:srgbClr val="333333">
+                <a:alpha val="65000"/>
+              </a:srgbClr>
+            </a:outerShdw>
+          </a:effectLst>
+          <a:extLst>
+            <a:ext uri="{909E8E84-426E-40DD-AFC4-6F175D3DCCD1}">
+              <a14:hiddenFill xmlns:a14="http://schemas.microsoft.com/office/drawing/2010/main">
+                <a:solidFill>
+                  <a:srgbClr val="FFFFFF"/>
+                </a:solidFill>
+              </a14:hiddenFill>
+            </a:ext>
+          </a:extLst>
+        </p:spPr>
+      </p:pic>
+      <p:pic>
+        <p:nvPicPr>
+          <p:cNvPr id="1028" name="Picture 4" descr="Image result for ehcache">
+            <a:extLst>
+              <a:ext uri="{FF2B5EF4-FFF2-40B4-BE49-F238E27FC236}">
+                <a16:creationId xmlns:a16="http://schemas.microsoft.com/office/drawing/2014/main" id="{56043876-4729-42DA-B907-A56889B1AE30}"/>
+              </a:ext>
+            </a:extLst>
+          </p:cNvPr>
+          <p:cNvPicPr>
+            <a:picLocks noChangeAspect="1" noChangeArrowheads="1"/>
+          </p:cNvPicPr>
+          <p:nvPr/>
+        </p:nvPicPr>
+        <p:blipFill>
+          <a:blip r:embed="rId5">
+            <a:extLst>
+              <a:ext uri="{28A0092B-C50C-407E-A947-70E740481C1C}">
+                <a14:useLocalDpi xmlns:a14="http://schemas.microsoft.com/office/drawing/2010/main" val="0"/>
+              </a:ext>
+            </a:extLst>
+          </a:blip>
+          <a:srcRect/>
+          <a:stretch>
+            <a:fillRect/>
+          </a:stretch>
+        </p:blipFill>
+        <p:spPr bwMode="auto">
+          <a:xfrm>
+            <a:off x="1352550" y="153006"/>
+            <a:ext cx="9963150" cy="2253001"/>
+          </a:xfrm>
+          <a:prstGeom prst="rect">
+            <a:avLst/>
+          </a:prstGeom>
+          <a:ln>
+            <a:noFill/>
+          </a:ln>
+          <a:effectLst>
+            <a:softEdge rad="112500"/>
+          </a:effectLst>
+          <a:extLst>
+            <a:ext uri="{909E8E84-426E-40DD-AFC4-6F175D3DCCD1}">
+              <a14:hiddenFill xmlns:a14="http://schemas.microsoft.com/office/drawing/2010/main">
+                <a:solidFill>
+                  <a:srgbClr val="FFFFFF"/>
+                </a:solidFill>
+              </a14:hiddenFill>
+            </a:ext>
+          </a:extLst>
+        </p:spPr>
+      </p:pic>
+      <p:sp>
+        <p:nvSpPr>
+          <p:cNvPr id="6" name="Rectangle 5">
+            <a:extLst>
+              <a:ext uri="{FF2B5EF4-FFF2-40B4-BE49-F238E27FC236}">
+                <a16:creationId xmlns:a16="http://schemas.microsoft.com/office/drawing/2014/main" id="{69196CA5-46AC-41FC-A808-2046DD4EFEA6}"/>
+              </a:ext>
+            </a:extLst>
+          </p:cNvPr>
+          <p:cNvSpPr/>
+          <p:nvPr/>
+        </p:nvSpPr>
+        <p:spPr>
+          <a:xfrm>
+            <a:off x="55345" y="5408188"/>
+            <a:ext cx="6096000" cy="1011616"/>
+          </a:xfrm>
+          <a:prstGeom prst="rect">
+            <a:avLst/>
+          </a:prstGeom>
+        </p:spPr>
+        <p:style>
+          <a:lnRef idx="1">
+            <a:schemeClr val="accent5"/>
+          </a:lnRef>
+          <a:fillRef idx="3">
+            <a:schemeClr val="accent5"/>
+          </a:fillRef>
+          <a:effectRef idx="2">
+            <a:schemeClr val="accent5"/>
+          </a:effectRef>
+          <a:fontRef idx="minor">
+            <a:schemeClr val="lt1"/>
+          </a:fontRef>
+        </p:style>
+        <p:txBody>
+          <a:bodyPr rtlCol="0" anchor="ctr"/>
+          <a:lstStyle/>
+          <a:p>
+            <a:pPr algn="ctr"/>
+            <a:r>
+              <a:rPr lang="en-IN" sz="3200" dirty="0">
+                <a:latin typeface="Algerian" panose="04020705040A02060702" pitchFamily="82" charset="0"/>
+              </a:rPr>
+              <a:t>Microservices/Distributed system</a:t>
+            </a:r>
+          </a:p>
+        </p:txBody>
+      </p:sp>
+      <p:sp>
+        <p:nvSpPr>
+          <p:cNvPr id="7" name="Rectangle 6">
+            <a:extLst>
+              <a:ext uri="{FF2B5EF4-FFF2-40B4-BE49-F238E27FC236}">
+                <a16:creationId xmlns:a16="http://schemas.microsoft.com/office/drawing/2014/main" id="{C82DC5A3-9C1E-4E80-968C-32001CB999E7}"/>
+              </a:ext>
+            </a:extLst>
+          </p:cNvPr>
+          <p:cNvSpPr/>
+          <p:nvPr/>
+        </p:nvSpPr>
+        <p:spPr>
+          <a:xfrm>
+            <a:off x="8031778" y="6307183"/>
+            <a:ext cx="1137988" cy="254061"/>
+          </a:xfrm>
+          <a:prstGeom prst="rect">
+            <a:avLst/>
+          </a:prstGeom>
+          <a:solidFill>
+            <a:srgbClr val="92D050"/>
+          </a:solidFill>
+        </p:spPr>
+        <p:style>
+          <a:lnRef idx="1">
+            <a:schemeClr val="accent6"/>
+          </a:lnRef>
+          <a:fillRef idx="3">
+            <a:schemeClr val="accent6"/>
+          </a:fillRef>
+          <a:effectRef idx="2">
+            <a:schemeClr val="accent6"/>
+          </a:effectRef>
+          <a:fontRef idx="minor">
+            <a:schemeClr val="lt1"/>
+          </a:fontRef>
+        </p:style>
+        <p:txBody>
+          <a:bodyPr rtlCol="0" anchor="ctr"/>
+          <a:lstStyle/>
+          <a:p>
+            <a:pPr algn="ctr"/>
+            <a:r>
+              <a:rPr lang="en-IN" sz="2000" dirty="0" err="1">
+                <a:solidFill>
+                  <a:srgbClr val="FF0000"/>
+                </a:solidFill>
+                <a:latin typeface="Algerian" panose="04020705040A02060702" pitchFamily="82" charset="0"/>
+              </a:rPr>
+              <a:t>arvind</a:t>
+            </a:r>
+            <a:endParaRPr lang="en-IN" sz="1600" dirty="0">
+              <a:solidFill>
+                <a:srgbClr val="FF0000"/>
+              </a:solidFill>
+              <a:latin typeface="Algerian" panose="04020705040A02060702" pitchFamily="82" charset="0"/>
+            </a:endParaRPr>
+          </a:p>
+        </p:txBody>
+      </p:sp>
+      <p:sp>
+        <p:nvSpPr>
+          <p:cNvPr id="21" name="Rectangle 20">
+            <a:extLst>
+              <a:ext uri="{FF2B5EF4-FFF2-40B4-BE49-F238E27FC236}">
+                <a16:creationId xmlns:a16="http://schemas.microsoft.com/office/drawing/2014/main" id="{48B5738C-75F8-4C5D-A66A-40CE2A67572C}"/>
+              </a:ext>
+            </a:extLst>
+          </p:cNvPr>
+          <p:cNvSpPr/>
+          <p:nvPr/>
+        </p:nvSpPr>
+        <p:spPr>
+          <a:xfrm>
+            <a:off x="11201400" y="-1881"/>
+            <a:ext cx="957032" cy="525756"/>
+          </a:xfrm>
+          <a:prstGeom prst="rect">
+            <a:avLst/>
+          </a:prstGeom>
+          <a:solidFill>
+            <a:srgbClr val="92D050"/>
+          </a:solidFill>
+        </p:spPr>
+        <p:style>
+          <a:lnRef idx="1">
+            <a:schemeClr val="accent6"/>
+          </a:lnRef>
+          <a:fillRef idx="3">
+            <a:schemeClr val="accent6"/>
+          </a:fillRef>
+          <a:effectRef idx="2">
+            <a:schemeClr val="accent6"/>
+          </a:effectRef>
+          <a:fontRef idx="minor">
+            <a:schemeClr val="lt1"/>
+          </a:fontRef>
+        </p:style>
+        <p:txBody>
+          <a:bodyPr rtlCol="0" anchor="ctr"/>
+          <a:lstStyle/>
+          <a:p>
+            <a:pPr algn="ctr"/>
+            <a:r>
+              <a:rPr lang="en-IN" sz="4000" dirty="0"/>
+              <a:t>#3</a:t>
+            </a:r>
+          </a:p>
+        </p:txBody>
+      </p:sp>
+      <p:sp>
+        <p:nvSpPr>
+          <p:cNvPr id="8" name="Rectangle: Diagonal Corners Snipped 7">
+            <a:extLst>
+              <a:ext uri="{FF2B5EF4-FFF2-40B4-BE49-F238E27FC236}">
+                <a16:creationId xmlns:a16="http://schemas.microsoft.com/office/drawing/2014/main" id="{48FFD385-DDE6-479F-8DCF-893DD1468117}"/>
+              </a:ext>
+            </a:extLst>
+          </p:cNvPr>
+          <p:cNvSpPr/>
+          <p:nvPr/>
+        </p:nvSpPr>
+        <p:spPr>
+          <a:xfrm>
+            <a:off x="6357034" y="5499964"/>
+            <a:ext cx="1924050" cy="807219"/>
+          </a:xfrm>
+          <a:prstGeom prst="snip2DiagRect">
+            <a:avLst/>
+          </a:prstGeom>
+          <a:solidFill>
+            <a:srgbClr val="92D050"/>
+          </a:solidFill>
+        </p:spPr>
+        <p:style>
+          <a:lnRef idx="2">
+            <a:schemeClr val="accent1">
+              <a:shade val="50000"/>
+            </a:schemeClr>
+          </a:lnRef>
+          <a:fillRef idx="1">
+            <a:schemeClr val="accent1"/>
+          </a:fillRef>
+          <a:effectRef idx="0">
+            <a:schemeClr val="accent1"/>
+          </a:effectRef>
+          <a:fontRef idx="minor">
+            <a:schemeClr val="lt1"/>
+          </a:fontRef>
+        </p:style>
+        <p:txBody>
+          <a:bodyPr rtlCol="0" anchor="ctr"/>
+          <a:lstStyle/>
+          <a:p>
+            <a:pPr algn="ctr"/>
+            <a:r>
+              <a:rPr lang="en-IN" sz="2400" dirty="0">
+                <a:latin typeface="Algerian" panose="04020705040A02060702" pitchFamily="82" charset="0"/>
+              </a:rPr>
+              <a:t>GREEN LEARNER</a:t>
+            </a:r>
+          </a:p>
+        </p:txBody>
+      </p:sp>
+      <mc:AlternateContent xmlns:mc="http://schemas.openxmlformats.org/markup-compatibility/2006" xmlns:p14="http://schemas.microsoft.com/office/powerpoint/2010/main">
+        <mc:Choice Requires="p14">
+          <p:contentPart p14:bwMode="auto" r:id="rId6">
+            <p14:nvContentPartPr>
+              <p14:cNvPr id="9" name="Ink 8">
+                <a:extLst>
+                  <a:ext uri="{FF2B5EF4-FFF2-40B4-BE49-F238E27FC236}">
+                    <a16:creationId xmlns:a16="http://schemas.microsoft.com/office/drawing/2014/main" id="{71C31635-F142-4304-80D3-9B07B8AABF16}"/>
+                  </a:ext>
+                </a:extLst>
+              </p14:cNvPr>
+              <p14:cNvContentPartPr/>
+              <p14:nvPr/>
+            </p14:nvContentPartPr>
+            <p14:xfrm>
+              <a:off x="2508480" y="1856880"/>
+              <a:ext cx="8895240" cy="2795760"/>
+            </p14:xfrm>
+          </p:contentPart>
+        </mc:Choice>
+        <mc:Fallback xmlns="">
+          <p:pic>
+            <p:nvPicPr>
+              <p:cNvPr id="9" name="Ink 8">
+                <a:extLst>
+                  <a:ext uri="{FF2B5EF4-FFF2-40B4-BE49-F238E27FC236}">
+                    <a16:creationId xmlns:a16="http://schemas.microsoft.com/office/drawing/2014/main" id="{71C31635-F142-4304-80D3-9B07B8AABF16}"/>
+                  </a:ext>
+                </a:extLst>
+              </p:cNvPr>
+              <p:cNvPicPr/>
+              <p:nvPr/>
+            </p:nvPicPr>
+            <p:blipFill>
+              <a:blip r:embed="rId7"/>
+              <a:stretch>
+                <a:fillRect/>
+              </a:stretch>
+            </p:blipFill>
+            <p:spPr>
+              <a:xfrm>
+                <a:off x="2499120" y="1847520"/>
+                <a:ext cx="8913960" cy="2814480"/>
+              </a:xfrm>
+              <a:prstGeom prst="rect">
+                <a:avLst/>
+              </a:prstGeom>
+            </p:spPr>
+          </p:pic>
+        </mc:Fallback>
+      </mc:AlternateContent>
+      <p:sp>
+        <p:nvSpPr>
+          <p:cNvPr id="20" name="Rectangle: Rounded Corners 19">
+            <a:extLst>
+              <a:ext uri="{FF2B5EF4-FFF2-40B4-BE49-F238E27FC236}">
+                <a16:creationId xmlns:a16="http://schemas.microsoft.com/office/drawing/2014/main" id="{272E7F5F-4727-46AA-978E-1BB1AF9FD56A}"/>
+              </a:ext>
+            </a:extLst>
+          </p:cNvPr>
+          <p:cNvSpPr/>
+          <p:nvPr/>
+        </p:nvSpPr>
+        <p:spPr>
+          <a:xfrm>
+            <a:off x="1075422" y="2480481"/>
+            <a:ext cx="10648949" cy="2795759"/>
+          </a:xfrm>
+          <a:prstGeom prst="roundRect">
+            <a:avLst/>
+          </a:prstGeom>
+          <a:solidFill>
+            <a:schemeClr val="bg1">
+              <a:alpha val="21000"/>
+            </a:schemeClr>
+          </a:solidFill>
+          <a:effectLst>
+            <a:outerShdw blurRad="50800" dist="50800" dir="5400000" algn="ctr" rotWithShape="0">
+              <a:srgbClr val="000000"/>
+            </a:outerShdw>
+          </a:effectLst>
+        </p:spPr>
+        <p:style>
+          <a:lnRef idx="2">
+            <a:schemeClr val="accent1">
+              <a:shade val="50000"/>
+            </a:schemeClr>
+          </a:lnRef>
+          <a:fillRef idx="1">
+            <a:schemeClr val="accent1"/>
+          </a:fillRef>
+          <a:effectRef idx="0">
+            <a:schemeClr val="accent1"/>
+          </a:effectRef>
+          <a:fontRef idx="minor">
+            <a:schemeClr val="lt1"/>
+          </a:fontRef>
+        </p:style>
+        <p:txBody>
+          <a:bodyPr rtlCol="0" anchor="ctr"/>
+          <a:lstStyle/>
+          <a:p>
+            <a:pPr algn="ctr"/>
+            <a:r>
+              <a:rPr lang="en-IN" sz="6600" b="1" dirty="0" err="1">
+                <a:solidFill>
+                  <a:srgbClr val="92D050"/>
+                </a:solidFill>
+                <a:latin typeface="Algerian" panose="04020705040A02060702" pitchFamily="82" charset="0"/>
+              </a:rPr>
+              <a:t>ehCACHe</a:t>
+            </a:r>
+            <a:r>
+              <a:rPr lang="en-IN" sz="6600" b="1" dirty="0">
+                <a:solidFill>
+                  <a:srgbClr val="92D050"/>
+                </a:solidFill>
+                <a:latin typeface="Algerian" panose="04020705040A02060702" pitchFamily="82" charset="0"/>
+              </a:rPr>
+              <a:t> integration</a:t>
+            </a:r>
+          </a:p>
+          <a:p>
+            <a:pPr algn="ctr"/>
+            <a:r>
+              <a:rPr lang="en-IN" sz="6600" b="1" dirty="0">
+                <a:solidFill>
+                  <a:srgbClr val="92D050"/>
+                </a:solidFill>
+                <a:latin typeface="Algerian" panose="04020705040A02060702" pitchFamily="82" charset="0"/>
+              </a:rPr>
+              <a:t>WITH </a:t>
+            </a:r>
+          </a:p>
+          <a:p>
+            <a:pPr algn="ctr"/>
+            <a:r>
+              <a:rPr lang="en-IN" sz="6600" b="1" dirty="0">
+                <a:solidFill>
+                  <a:srgbClr val="92D050"/>
+                </a:solidFill>
+                <a:latin typeface="Algerian" panose="04020705040A02060702" pitchFamily="82" charset="0"/>
+              </a:rPr>
+              <a:t>Spring boot</a:t>
+            </a:r>
+          </a:p>
+        </p:txBody>
+      </p:sp>
+      <p:sp>
+        <p:nvSpPr>
+          <p:cNvPr id="22" name="Rectangle: Rounded Corners 21">
+            <a:extLst>
+              <a:ext uri="{FF2B5EF4-FFF2-40B4-BE49-F238E27FC236}">
+                <a16:creationId xmlns:a16="http://schemas.microsoft.com/office/drawing/2014/main" id="{EBE7F182-AE48-46A5-A63D-355561D77E8A}"/>
+              </a:ext>
+            </a:extLst>
+          </p:cNvPr>
+          <p:cNvSpPr/>
+          <p:nvPr/>
+        </p:nvSpPr>
+        <p:spPr>
+          <a:xfrm>
+            <a:off x="1103094" y="2488901"/>
+            <a:ext cx="10648949" cy="2795759"/>
+          </a:xfrm>
+          <a:prstGeom prst="roundRect">
+            <a:avLst/>
+          </a:prstGeom>
+          <a:solidFill>
+            <a:schemeClr val="bg1">
+              <a:alpha val="21000"/>
+            </a:schemeClr>
+          </a:solidFill>
+          <a:effectLst>
+            <a:outerShdw blurRad="50800" dist="50800" dir="5400000" algn="ctr" rotWithShape="0">
+              <a:srgbClr val="000000"/>
+            </a:outerShdw>
+          </a:effectLst>
+        </p:spPr>
+        <p:style>
+          <a:lnRef idx="2">
+            <a:schemeClr val="accent1">
+              <a:shade val="50000"/>
+            </a:schemeClr>
+          </a:lnRef>
+          <a:fillRef idx="1">
+            <a:schemeClr val="accent1"/>
+          </a:fillRef>
+          <a:effectRef idx="0">
+            <a:schemeClr val="accent1"/>
+          </a:effectRef>
+          <a:fontRef idx="minor">
+            <a:schemeClr val="lt1"/>
+          </a:fontRef>
+        </p:style>
+        <p:txBody>
+          <a:bodyPr rtlCol="0" anchor="ctr"/>
+          <a:lstStyle/>
+          <a:p>
+            <a:pPr algn="ctr"/>
+            <a:r>
+              <a:rPr lang="en-IN" sz="6600" b="1" dirty="0" err="1">
+                <a:solidFill>
+                  <a:srgbClr val="92D050"/>
+                </a:solidFill>
+                <a:latin typeface="Algerian" panose="04020705040A02060702" pitchFamily="82" charset="0"/>
+              </a:rPr>
+              <a:t>ehCACHe</a:t>
+            </a:r>
+            <a:r>
+              <a:rPr lang="en-IN" sz="6600" b="1" dirty="0">
+                <a:solidFill>
+                  <a:srgbClr val="92D050"/>
+                </a:solidFill>
+                <a:latin typeface="Algerian" panose="04020705040A02060702" pitchFamily="82" charset="0"/>
+              </a:rPr>
+              <a:t> integration</a:t>
+            </a:r>
+          </a:p>
+          <a:p>
+            <a:pPr algn="ctr"/>
+            <a:r>
+              <a:rPr lang="en-IN" sz="6600" b="1" dirty="0">
+                <a:solidFill>
+                  <a:srgbClr val="92D050"/>
+                </a:solidFill>
+                <a:latin typeface="Algerian" panose="04020705040A02060702" pitchFamily="82" charset="0"/>
+              </a:rPr>
+              <a:t>WITH </a:t>
+            </a:r>
+          </a:p>
+          <a:p>
+            <a:pPr algn="ctr"/>
+            <a:r>
+              <a:rPr lang="en-IN" sz="6600" b="1" dirty="0">
+                <a:solidFill>
+                  <a:srgbClr val="92D050"/>
+                </a:solidFill>
+                <a:latin typeface="Algerian" panose="04020705040A02060702" pitchFamily="82" charset="0"/>
+              </a:rPr>
+              <a:t>Spring boot</a:t>
+            </a:r>
+            <a:r>
+              <a:rPr lang="en-IN" sz="6600" b="1" dirty="0">
+                <a:solidFill>
+                  <a:srgbClr val="00B0F0"/>
+                </a:solidFill>
+                <a:latin typeface="Algerian" panose="04020705040A02060702" pitchFamily="82" charset="0"/>
+              </a:rPr>
+              <a:t>(#2)</a:t>
+            </a:r>
           </a:p>
         </p:txBody>
       </p:sp>
     </p:spTree>
     <p:extLst>
       <p:ext uri="{BB962C8B-B14F-4D97-AF65-F5344CB8AC3E}">
-        <p14:creationId xmlns:p14="http://schemas.microsoft.com/office/powerpoint/2010/main" val="2809015188"/>
+        <p14:creationId xmlns:p14="http://schemas.microsoft.com/office/powerpoint/2010/main" val="765179946"/>
       </p:ext>
     </p:extLst>
   </p:cSld>
   <p:clrMapOvr>
-    <a:masterClrMapping/>
+    <a:overrideClrMapping bg1="dk1" tx1="lt1" bg2="dk2" tx2="lt2" accent1="accent1" accent2="accent2" accent3="accent3" accent4="accent4" accent5="accent5" accent6="accent6" hlink="hlink" folHlink="folHlink"/>
   </p:clrMapOvr>
 </p:sld>
 </file>
@@ -5951,10 +7579,61 @@
           </a:p>
         </p:txBody>
       </p:sp>
+      <mc:AlternateContent xmlns:mc="http://schemas.openxmlformats.org/markup-compatibility/2006">
+        <mc:Choice xmlns:p14="http://schemas.microsoft.com/office/powerpoint/2010/main" Requires="p14">
+          <p:contentPart p14:bwMode="auto" r:id="rId2">
+            <p14:nvContentPartPr>
+              <p14:cNvPr id="4" name="Ink 3">
+                <a:extLst>
+                  <a:ext uri="{FF2B5EF4-FFF2-40B4-BE49-F238E27FC236}">
+                    <a16:creationId xmlns:a16="http://schemas.microsoft.com/office/drawing/2014/main" id="{CD78C2B8-A5E9-4AFC-A088-D844D5234DF7}"/>
+                  </a:ext>
+                </a:extLst>
+              </p14:cNvPr>
+              <p14:cNvContentPartPr/>
+              <p14:nvPr/>
+            </p14:nvContentPartPr>
+            <p14:xfrm>
+              <a:off x="11608200" y="528480"/>
+              <a:ext cx="341640" cy="138960"/>
+            </p14:xfrm>
+          </p:contentPart>
+        </mc:Choice>
+        <mc:Fallback>
+          <p:pic>
+            <p:nvPicPr>
+              <p:cNvPr id="4" name="Ink 3">
+                <a:extLst>
+                  <a:ext uri="{FF2B5EF4-FFF2-40B4-BE49-F238E27FC236}">
+                    <a16:creationId xmlns:a16="http://schemas.microsoft.com/office/drawing/2014/main" id="{CD78C2B8-A5E9-4AFC-A088-D844D5234DF7}"/>
+                  </a:ext>
+                </a:extLst>
+              </p:cNvPr>
+              <p:cNvPicPr/>
+              <p:nvPr/>
+            </p:nvPicPr>
+            <p:blipFill>
+              <a:blip r:embed="rId3"/>
+              <a:stretch>
+                <a:fillRect/>
+              </a:stretch>
+            </p:blipFill>
+            <p:spPr>
+              <a:xfrm>
+                <a:off x="11598840" y="519120"/>
+                <a:ext cx="360360" cy="157680"/>
+              </a:xfrm>
+              <a:prstGeom prst="rect">
+                <a:avLst/>
+              </a:prstGeom>
+            </p:spPr>
+          </p:pic>
+        </mc:Fallback>
+      </mc:AlternateContent>
     </p:spTree>
     <p:extLst>
       <p:ext uri="{BB962C8B-B14F-4D97-AF65-F5344CB8AC3E}">
-        <p14:creationId xmlns:p14="http://schemas.microsoft.com/office/powerpoint/2010/main" val="62242583"/>
+        <p14:creationId xmlns:p14="http://schemas.microsoft.com/office/powerpoint/2010/main" val="33380959"/>
       </p:ext>
     </p:extLst>
   </p:cSld>
@@ -6054,6 +7733,206 @@
     </p:spTree>
     <p:extLst>
       <p:ext uri="{BB962C8B-B14F-4D97-AF65-F5344CB8AC3E}">
+        <p14:creationId xmlns:p14="http://schemas.microsoft.com/office/powerpoint/2010/main" val="2809015188"/>
+      </p:ext>
+    </p:extLst>
+  </p:cSld>
+  <p:clrMapOvr>
+    <a:masterClrMapping/>
+  </p:clrMapOvr>
+</p:sld>
+</file>
+
+<file path=ppt/slides/slide16.xml><?xml version="1.0" encoding="utf-8"?>
+<p:sld xmlns:a="http://schemas.openxmlformats.org/drawingml/2006/main" xmlns:r="http://schemas.openxmlformats.org/officeDocument/2006/relationships" xmlns:p="http://schemas.openxmlformats.org/presentationml/2006/main">
+  <p:cSld>
+    <p:spTree>
+      <p:nvGrpSpPr>
+        <p:cNvPr id="1" name=""/>
+        <p:cNvGrpSpPr/>
+        <p:nvPr/>
+      </p:nvGrpSpPr>
+      <p:grpSpPr>
+        <a:xfrm>
+          <a:off x="0" y="0"/>
+          <a:ext cx="0" cy="0"/>
+          <a:chOff x="0" y="0"/>
+          <a:chExt cx="0" cy="0"/>
+        </a:xfrm>
+      </p:grpSpPr>
+      <p:sp>
+        <p:nvSpPr>
+          <p:cNvPr id="2" name="Title 1">
+            <a:extLst>
+              <a:ext uri="{FF2B5EF4-FFF2-40B4-BE49-F238E27FC236}">
+                <a16:creationId xmlns:a16="http://schemas.microsoft.com/office/drawing/2014/main" id="{2C90EF4B-60F8-4E42-8E9C-7E3252505BCB}"/>
+              </a:ext>
+            </a:extLst>
+          </p:cNvPr>
+          <p:cNvSpPr>
+            <a:spLocks noGrp="1"/>
+          </p:cNvSpPr>
+          <p:nvPr>
+            <p:ph type="title"/>
+          </p:nvPr>
+        </p:nvSpPr>
+        <p:spPr>
+          <a:solidFill>
+            <a:schemeClr val="accent5">
+              <a:lumMod val="60000"/>
+              <a:lumOff val="40000"/>
+            </a:schemeClr>
+          </a:solidFill>
+        </p:spPr>
+        <p:txBody>
+          <a:bodyPr/>
+          <a:lstStyle/>
+          <a:p>
+            <a:endParaRPr lang="en-IN" dirty="0">
+              <a:latin typeface="Algerian" panose="04020705040A02060702" pitchFamily="82" charset="0"/>
+            </a:endParaRPr>
+          </a:p>
+        </p:txBody>
+      </p:sp>
+      <p:sp>
+        <p:nvSpPr>
+          <p:cNvPr id="3" name="Content Placeholder 2">
+            <a:extLst>
+              <a:ext uri="{FF2B5EF4-FFF2-40B4-BE49-F238E27FC236}">
+                <a16:creationId xmlns:a16="http://schemas.microsoft.com/office/drawing/2014/main" id="{3398CEA2-8BE4-4D46-8D1D-8045EA59B578}"/>
+              </a:ext>
+            </a:extLst>
+          </p:cNvPr>
+          <p:cNvSpPr>
+            <a:spLocks noGrp="1"/>
+          </p:cNvSpPr>
+          <p:nvPr>
+            <p:ph idx="1"/>
+          </p:nvPr>
+        </p:nvSpPr>
+        <p:spPr>
+          <a:xfrm>
+            <a:off x="581192" y="2340864"/>
+            <a:ext cx="11029616" cy="3634486"/>
+          </a:xfrm>
+          <a:solidFill>
+            <a:schemeClr val="accent1">
+              <a:lumMod val="20000"/>
+              <a:lumOff val="80000"/>
+            </a:schemeClr>
+          </a:solidFill>
+        </p:spPr>
+        <p:txBody>
+          <a:bodyPr/>
+          <a:lstStyle/>
+          <a:p>
+            <a:endParaRPr lang="en-IN" dirty="0"/>
+          </a:p>
+        </p:txBody>
+      </p:sp>
+    </p:spTree>
+    <p:extLst>
+      <p:ext uri="{BB962C8B-B14F-4D97-AF65-F5344CB8AC3E}">
+        <p14:creationId xmlns:p14="http://schemas.microsoft.com/office/powerpoint/2010/main" val="62242583"/>
+      </p:ext>
+    </p:extLst>
+  </p:cSld>
+  <p:clrMapOvr>
+    <a:masterClrMapping/>
+  </p:clrMapOvr>
+</p:sld>
+</file>
+
+<file path=ppt/slides/slide17.xml><?xml version="1.0" encoding="utf-8"?>
+<p:sld xmlns:a="http://schemas.openxmlformats.org/drawingml/2006/main" xmlns:r="http://schemas.openxmlformats.org/officeDocument/2006/relationships" xmlns:p="http://schemas.openxmlformats.org/presentationml/2006/main">
+  <p:cSld>
+    <p:spTree>
+      <p:nvGrpSpPr>
+        <p:cNvPr id="1" name=""/>
+        <p:cNvGrpSpPr/>
+        <p:nvPr/>
+      </p:nvGrpSpPr>
+      <p:grpSpPr>
+        <a:xfrm>
+          <a:off x="0" y="0"/>
+          <a:ext cx="0" cy="0"/>
+          <a:chOff x="0" y="0"/>
+          <a:chExt cx="0" cy="0"/>
+        </a:xfrm>
+      </p:grpSpPr>
+      <p:sp>
+        <p:nvSpPr>
+          <p:cNvPr id="2" name="Title 1">
+            <a:extLst>
+              <a:ext uri="{FF2B5EF4-FFF2-40B4-BE49-F238E27FC236}">
+                <a16:creationId xmlns:a16="http://schemas.microsoft.com/office/drawing/2014/main" id="{2C90EF4B-60F8-4E42-8E9C-7E3252505BCB}"/>
+              </a:ext>
+            </a:extLst>
+          </p:cNvPr>
+          <p:cNvSpPr>
+            <a:spLocks noGrp="1"/>
+          </p:cNvSpPr>
+          <p:nvPr>
+            <p:ph type="title"/>
+          </p:nvPr>
+        </p:nvSpPr>
+        <p:spPr>
+          <a:solidFill>
+            <a:schemeClr val="accent5">
+              <a:lumMod val="60000"/>
+              <a:lumOff val="40000"/>
+            </a:schemeClr>
+          </a:solidFill>
+        </p:spPr>
+        <p:txBody>
+          <a:bodyPr/>
+          <a:lstStyle/>
+          <a:p>
+            <a:endParaRPr lang="en-IN" dirty="0">
+              <a:latin typeface="Algerian" panose="04020705040A02060702" pitchFamily="82" charset="0"/>
+            </a:endParaRPr>
+          </a:p>
+        </p:txBody>
+      </p:sp>
+      <p:sp>
+        <p:nvSpPr>
+          <p:cNvPr id="3" name="Content Placeholder 2">
+            <a:extLst>
+              <a:ext uri="{FF2B5EF4-FFF2-40B4-BE49-F238E27FC236}">
+                <a16:creationId xmlns:a16="http://schemas.microsoft.com/office/drawing/2014/main" id="{3398CEA2-8BE4-4D46-8D1D-8045EA59B578}"/>
+              </a:ext>
+            </a:extLst>
+          </p:cNvPr>
+          <p:cNvSpPr>
+            <a:spLocks noGrp="1"/>
+          </p:cNvSpPr>
+          <p:nvPr>
+            <p:ph idx="1"/>
+          </p:nvPr>
+        </p:nvSpPr>
+        <p:spPr>
+          <a:xfrm>
+            <a:off x="581192" y="2340864"/>
+            <a:ext cx="11029616" cy="3634486"/>
+          </a:xfrm>
+          <a:solidFill>
+            <a:schemeClr val="accent1">
+              <a:lumMod val="20000"/>
+              <a:lumOff val="80000"/>
+            </a:schemeClr>
+          </a:solidFill>
+        </p:spPr>
+        <p:txBody>
+          <a:bodyPr/>
+          <a:lstStyle/>
+          <a:p>
+            <a:endParaRPr lang="en-IN" dirty="0"/>
+          </a:p>
+        </p:txBody>
+      </p:sp>
+    </p:spTree>
+    <p:extLst>
+      <p:ext uri="{BB962C8B-B14F-4D97-AF65-F5344CB8AC3E}">
         <p14:creationId xmlns:p14="http://schemas.microsoft.com/office/powerpoint/2010/main" val="2755257029"/>
       </p:ext>
     </p:extLst>
@@ -6064,7 +7943,7 @@
 </p:sld>
 </file>
 
-<file path=ppt/slides/slide16.xml><?xml version="1.0" encoding="utf-8"?>
+<file path=ppt/slides/slide18.xml><?xml version="1.0" encoding="utf-8"?>
 <p:sld xmlns:a="http://schemas.openxmlformats.org/drawingml/2006/main" xmlns:r="http://schemas.openxmlformats.org/officeDocument/2006/relationships" xmlns:p="http://schemas.openxmlformats.org/presentationml/2006/main">
   <p:cSld>
     <p:spTree>
@@ -6279,8 +8158,8 @@
           </a:p>
         </p:txBody>
       </p:sp>
-      <mc:AlternateContent xmlns:mc="http://schemas.openxmlformats.org/markup-compatibility/2006">
-        <mc:Choice xmlns:p14="http://schemas.microsoft.com/office/powerpoint/2010/main" Requires="p14">
+      <mc:AlternateContent xmlns:mc="http://schemas.openxmlformats.org/markup-compatibility/2006" xmlns:p14="http://schemas.microsoft.com/office/powerpoint/2010/main">
+        <mc:Choice Requires="p14">
           <p:contentPart p14:bwMode="auto" r:id="rId2">
             <p14:nvContentPartPr>
               <p14:cNvPr id="4" name="Ink 3">
@@ -6299,7 +8178,7 @@
             </p14:xfrm>
           </p:contentPart>
         </mc:Choice>
-        <mc:Fallback>
+        <mc:Fallback xmlns="">
           <p:pic>
             <p:nvPicPr>
               <p:cNvPr id="4" name="Ink 3">
@@ -6474,8 +8353,8 @@
           </a:p>
         </p:txBody>
       </p:sp>
-      <mc:AlternateContent xmlns:mc="http://schemas.openxmlformats.org/markup-compatibility/2006">
-        <mc:Choice xmlns:p14="http://schemas.microsoft.com/office/powerpoint/2010/main" Requires="p14">
+      <mc:AlternateContent xmlns:mc="http://schemas.openxmlformats.org/markup-compatibility/2006" xmlns:p14="http://schemas.microsoft.com/office/powerpoint/2010/main">
+        <mc:Choice Requires="p14">
           <p:contentPart p14:bwMode="auto" r:id="rId2">
             <p14:nvContentPartPr>
               <p14:cNvPr id="4" name="Ink 3">
@@ -6494,7 +8373,7 @@
             </p14:xfrm>
           </p:contentPart>
         </mc:Choice>
-        <mc:Fallback>
+        <mc:Fallback xmlns="">
           <p:pic>
             <p:nvPicPr>
               <p:cNvPr id="4" name="Ink 3">
@@ -6667,8 +8546,8 @@
           </a:p>
         </p:txBody>
       </p:sp>
-      <mc:AlternateContent xmlns:mc="http://schemas.openxmlformats.org/markup-compatibility/2006">
-        <mc:Choice xmlns:p14="http://schemas.microsoft.com/office/powerpoint/2010/main" Requires="p14">
+      <mc:AlternateContent xmlns:mc="http://schemas.openxmlformats.org/markup-compatibility/2006" xmlns:p14="http://schemas.microsoft.com/office/powerpoint/2010/main">
+        <mc:Choice Requires="p14">
           <p:contentPart p14:bwMode="auto" r:id="rId2">
             <p14:nvContentPartPr>
               <p14:cNvPr id="4" name="Ink 3">
@@ -6687,7 +8566,7 @@
             </p14:xfrm>
           </p:contentPart>
         </mc:Choice>
-        <mc:Fallback>
+        <mc:Fallback xmlns="">
           <p:pic>
             <p:nvPicPr>
               <p:cNvPr id="4" name="Ink 3">
@@ -6838,8 +8717,8 @@
           </a:p>
         </p:txBody>
       </p:sp>
-      <mc:AlternateContent xmlns:mc="http://schemas.openxmlformats.org/markup-compatibility/2006">
-        <mc:Choice xmlns:p14="http://schemas.microsoft.com/office/powerpoint/2010/main" Requires="p14">
+      <mc:AlternateContent xmlns:mc="http://schemas.openxmlformats.org/markup-compatibility/2006" xmlns:p14="http://schemas.microsoft.com/office/powerpoint/2010/main">
+        <mc:Choice Requires="p14">
           <p:contentPart p14:bwMode="auto" r:id="rId2">
             <p14:nvContentPartPr>
               <p14:cNvPr id="4" name="Ink 3">
@@ -6858,7 +8737,7 @@
             </p14:xfrm>
           </p:contentPart>
         </mc:Choice>
-        <mc:Fallback>
+        <mc:Fallback xmlns="">
           <p:pic>
             <p:nvPicPr>
               <p:cNvPr id="4" name="Ink 3">
@@ -7009,8 +8888,8 @@
           </a:p>
         </p:txBody>
       </p:sp>
-      <mc:AlternateContent xmlns:mc="http://schemas.openxmlformats.org/markup-compatibility/2006">
-        <mc:Choice xmlns:p14="http://schemas.microsoft.com/office/powerpoint/2010/main" Requires="p14">
+      <mc:AlternateContent xmlns:mc="http://schemas.openxmlformats.org/markup-compatibility/2006" xmlns:p14="http://schemas.microsoft.com/office/powerpoint/2010/main">
+        <mc:Choice Requires="p14">
           <p:contentPart p14:bwMode="auto" r:id="rId2">
             <p14:nvContentPartPr>
               <p14:cNvPr id="4" name="Ink 3">
@@ -7029,7 +8908,7 @@
             </p14:xfrm>
           </p:contentPart>
         </mc:Choice>
-        <mc:Fallback>
+        <mc:Fallback xmlns="">
           <p:pic>
             <p:nvPicPr>
               <p:cNvPr id="4" name="Ink 3">
@@ -7189,8 +9068,8 @@
           </a:p>
         </p:txBody>
       </p:sp>
-      <mc:AlternateContent xmlns:mc="http://schemas.openxmlformats.org/markup-compatibility/2006">
-        <mc:Choice xmlns:p14="http://schemas.microsoft.com/office/powerpoint/2010/main" Requires="p14">
+      <mc:AlternateContent xmlns:mc="http://schemas.openxmlformats.org/markup-compatibility/2006" xmlns:p14="http://schemas.microsoft.com/office/powerpoint/2010/main">
+        <mc:Choice Requires="p14">
           <p:contentPart p14:bwMode="auto" r:id="rId2">
             <p14:nvContentPartPr>
               <p14:cNvPr id="4" name="Ink 3">
@@ -7209,7 +9088,7 @@
             </p14:xfrm>
           </p:contentPart>
         </mc:Choice>
-        <mc:Fallback>
+        <mc:Fallback xmlns="">
           <p:pic>
             <p:nvPicPr>
               <p:cNvPr id="4" name="Ink 3">
@@ -7363,8 +9242,8 @@
           </a:p>
         </p:txBody>
       </p:sp>
-      <mc:AlternateContent xmlns:mc="http://schemas.openxmlformats.org/markup-compatibility/2006">
-        <mc:Choice xmlns:p14="http://schemas.microsoft.com/office/powerpoint/2010/main" Requires="p14">
+      <mc:AlternateContent xmlns:mc="http://schemas.openxmlformats.org/markup-compatibility/2006" xmlns:p14="http://schemas.microsoft.com/office/powerpoint/2010/main">
+        <mc:Choice Requires="p14">
           <p:contentPart p14:bwMode="auto" r:id="rId2">
             <p14:nvContentPartPr>
               <p14:cNvPr id="4" name="Ink 3">
@@ -7383,7 +9262,7 @@
             </p14:xfrm>
           </p:contentPart>
         </mc:Choice>
-        <mc:Fallback>
+        <mc:Fallback xmlns="">
           <p:pic>
             <p:nvPicPr>
               <p:cNvPr id="4" name="Ink 3">
@@ -7546,8 +9425,8 @@
           </a:p>
         </p:txBody>
       </p:sp>
-      <mc:AlternateContent xmlns:mc="http://schemas.openxmlformats.org/markup-compatibility/2006">
-        <mc:Choice xmlns:p14="http://schemas.microsoft.com/office/powerpoint/2010/main" Requires="p14">
+      <mc:AlternateContent xmlns:mc="http://schemas.openxmlformats.org/markup-compatibility/2006" xmlns:p14="http://schemas.microsoft.com/office/powerpoint/2010/main">
+        <mc:Choice Requires="p14">
           <p:contentPart p14:bwMode="auto" r:id="rId2">
             <p14:nvContentPartPr>
               <p14:cNvPr id="4" name="Ink 3">
@@ -7566,7 +9445,7 @@
             </p14:xfrm>
           </p:contentPart>
         </mc:Choice>
-        <mc:Fallback>
+        <mc:Fallback xmlns="">
           <p:pic>
             <p:nvPicPr>
               <p:cNvPr id="4" name="Ink 3">
@@ -7877,4 +9756,90 @@
     </a:ext>
   </a:extLst>
 </a:theme>
+</file>
+
+<file path=ppt/theme/themeOverride1.xml><?xml version="1.0" encoding="utf-8"?>
+<a:themeOverride xmlns:a="http://schemas.openxmlformats.org/drawingml/2006/main">
+  <a:clrScheme name="AnalogousFromRegularSeedLeftStep">
+    <a:dk1>
+      <a:srgbClr val="000000"/>
+    </a:dk1>
+    <a:lt1>
+      <a:srgbClr val="FFFFFF"/>
+    </a:lt1>
+    <a:dk2>
+      <a:srgbClr val="243941"/>
+    </a:dk2>
+    <a:lt2>
+      <a:srgbClr val="E5E8E2"/>
+    </a:lt2>
+    <a:accent1>
+      <a:srgbClr val="894DC3"/>
+    </a:accent1>
+    <a:accent2>
+      <a:srgbClr val="6057BD"/>
+    </a:accent2>
+    <a:accent3>
+      <a:srgbClr val="4D73C3"/>
+    </a:accent3>
+    <a:accent4>
+      <a:srgbClr val="3B93B1"/>
+    </a:accent4>
+    <a:accent5>
+      <a:srgbClr val="46B3A2"/>
+    </a:accent5>
+    <a:accent6>
+      <a:srgbClr val="3BB16D"/>
+    </a:accent6>
+    <a:hlink>
+      <a:srgbClr val="5F9030"/>
+    </a:hlink>
+    <a:folHlink>
+      <a:srgbClr val="7F7F7F"/>
+    </a:folHlink>
+  </a:clrScheme>
+</a:themeOverride>
+</file>
+
+<file path=ppt/theme/themeOverride2.xml><?xml version="1.0" encoding="utf-8"?>
+<a:themeOverride xmlns:a="http://schemas.openxmlformats.org/drawingml/2006/main">
+  <a:clrScheme name="AnalogousFromRegularSeedLeftStep">
+    <a:dk1>
+      <a:srgbClr val="000000"/>
+    </a:dk1>
+    <a:lt1>
+      <a:srgbClr val="FFFFFF"/>
+    </a:lt1>
+    <a:dk2>
+      <a:srgbClr val="243941"/>
+    </a:dk2>
+    <a:lt2>
+      <a:srgbClr val="E5E8E2"/>
+    </a:lt2>
+    <a:accent1>
+      <a:srgbClr val="894DC3"/>
+    </a:accent1>
+    <a:accent2>
+      <a:srgbClr val="6057BD"/>
+    </a:accent2>
+    <a:accent3>
+      <a:srgbClr val="4D73C3"/>
+    </a:accent3>
+    <a:accent4>
+      <a:srgbClr val="3B93B1"/>
+    </a:accent4>
+    <a:accent5>
+      <a:srgbClr val="46B3A2"/>
+    </a:accent5>
+    <a:accent6>
+      <a:srgbClr val="3BB16D"/>
+    </a:accent6>
+    <a:hlink>
+      <a:srgbClr val="5F9030"/>
+    </a:hlink>
+    <a:folHlink>
+      <a:srgbClr val="7F7F7F"/>
+    </a:folHlink>
+  </a:clrScheme>
+</a:themeOverride>
 </file>
</xml_diff>